<commit_message>
Added Qualimap to MultiQC report
</commit_message>
<xml_diff>
--- a/Shave_presentation.pptx
+++ b/Shave_presentation.pptx
@@ -232,7 +232,7 @@
           <a:p>
             <a:fld id="{F379CF59-8695-2243-97D0-ACBD370A26B9}" type="datetimeFigureOut">
               <a:rPr lang="fr-FR" smtClean="0"/>
-              <a:t>10/01/2023</a:t>
+              <a:t>16/01/2023</a:t>
             </a:fld>
             <a:endParaRPr lang="fr-FR"/>
           </a:p>
@@ -2496,7 +2496,7 @@
           <a:p>
             <a:fld id="{FC70CC4D-BB28-BD40-98C7-74BC0DD3C304}" type="datetimeFigureOut">
               <a:rPr lang="fr-FR" smtClean="0"/>
-              <a:t>10/01/2023</a:t>
+              <a:t>16/01/2023</a:t>
             </a:fld>
             <a:endParaRPr lang="fr-FR"/>
           </a:p>
@@ -2694,7 +2694,7 @@
           <a:p>
             <a:fld id="{FC70CC4D-BB28-BD40-98C7-74BC0DD3C304}" type="datetimeFigureOut">
               <a:rPr lang="fr-FR" smtClean="0"/>
-              <a:t>10/01/2023</a:t>
+              <a:t>16/01/2023</a:t>
             </a:fld>
             <a:endParaRPr lang="fr-FR"/>
           </a:p>
@@ -2902,7 +2902,7 @@
           <a:p>
             <a:fld id="{FC70CC4D-BB28-BD40-98C7-74BC0DD3C304}" type="datetimeFigureOut">
               <a:rPr lang="fr-FR" smtClean="0"/>
-              <a:t>10/01/2023</a:t>
+              <a:t>16/01/2023</a:t>
             </a:fld>
             <a:endParaRPr lang="fr-FR"/>
           </a:p>
@@ -3100,7 +3100,7 @@
           <a:p>
             <a:fld id="{FC70CC4D-BB28-BD40-98C7-74BC0DD3C304}" type="datetimeFigureOut">
               <a:rPr lang="fr-FR" smtClean="0"/>
-              <a:t>10/01/2023</a:t>
+              <a:t>16/01/2023</a:t>
             </a:fld>
             <a:endParaRPr lang="fr-FR"/>
           </a:p>
@@ -3375,7 +3375,7 @@
           <a:p>
             <a:fld id="{FC70CC4D-BB28-BD40-98C7-74BC0DD3C304}" type="datetimeFigureOut">
               <a:rPr lang="fr-FR" smtClean="0"/>
-              <a:t>10/01/2023</a:t>
+              <a:t>16/01/2023</a:t>
             </a:fld>
             <a:endParaRPr lang="fr-FR"/>
           </a:p>
@@ -3640,7 +3640,7 @@
           <a:p>
             <a:fld id="{FC70CC4D-BB28-BD40-98C7-74BC0DD3C304}" type="datetimeFigureOut">
               <a:rPr lang="fr-FR" smtClean="0"/>
-              <a:t>10/01/2023</a:t>
+              <a:t>16/01/2023</a:t>
             </a:fld>
             <a:endParaRPr lang="fr-FR"/>
           </a:p>
@@ -4052,7 +4052,7 @@
           <a:p>
             <a:fld id="{FC70CC4D-BB28-BD40-98C7-74BC0DD3C304}" type="datetimeFigureOut">
               <a:rPr lang="fr-FR" smtClean="0"/>
-              <a:t>10/01/2023</a:t>
+              <a:t>16/01/2023</a:t>
             </a:fld>
             <a:endParaRPr lang="fr-FR"/>
           </a:p>
@@ -4193,7 +4193,7 @@
           <a:p>
             <a:fld id="{FC70CC4D-BB28-BD40-98C7-74BC0DD3C304}" type="datetimeFigureOut">
               <a:rPr lang="fr-FR" smtClean="0"/>
-              <a:t>10/01/2023</a:t>
+              <a:t>16/01/2023</a:t>
             </a:fld>
             <a:endParaRPr lang="fr-FR"/>
           </a:p>
@@ -4306,7 +4306,7 @@
           <a:p>
             <a:fld id="{FC70CC4D-BB28-BD40-98C7-74BC0DD3C304}" type="datetimeFigureOut">
               <a:rPr lang="fr-FR" smtClean="0"/>
-              <a:t>10/01/2023</a:t>
+              <a:t>16/01/2023</a:t>
             </a:fld>
             <a:endParaRPr lang="fr-FR"/>
           </a:p>
@@ -4617,7 +4617,7 @@
           <a:p>
             <a:fld id="{FC70CC4D-BB28-BD40-98C7-74BC0DD3C304}" type="datetimeFigureOut">
               <a:rPr lang="fr-FR" smtClean="0"/>
-              <a:t>10/01/2023</a:t>
+              <a:t>16/01/2023</a:t>
             </a:fld>
             <a:endParaRPr lang="fr-FR"/>
           </a:p>
@@ -4905,7 +4905,7 @@
           <a:p>
             <a:fld id="{FC70CC4D-BB28-BD40-98C7-74BC0DD3C304}" type="datetimeFigureOut">
               <a:rPr lang="fr-FR" smtClean="0"/>
-              <a:t>10/01/2023</a:t>
+              <a:t>16/01/2023</a:t>
             </a:fld>
             <a:endParaRPr lang="fr-FR"/>
           </a:p>
@@ -5146,7 +5146,7 @@
           <a:p>
             <a:fld id="{FC70CC4D-BB28-BD40-98C7-74BC0DD3C304}" type="datetimeFigureOut">
               <a:rPr lang="fr-FR" smtClean="0"/>
-              <a:t>10/01/2023</a:t>
+              <a:t>16/01/2023</a:t>
             </a:fld>
             <a:endParaRPr lang="fr-FR"/>
           </a:p>
@@ -5987,7 +5987,7 @@
 </file>
 
 <file path=ppt/slides/slide10.xml><?xml version="1.0" encoding="utf-8"?>
-<p:sld xmlns:a="http://schemas.openxmlformats.org/drawingml/2006/main" xmlns:r="http://schemas.openxmlformats.org/officeDocument/2006/relationships" xmlns:p="http://schemas.openxmlformats.org/presentationml/2006/main">
+<p:sld xmlns:a="http://schemas.openxmlformats.org/drawingml/2006/main" xmlns:r="http://schemas.openxmlformats.org/officeDocument/2006/relationships" xmlns:p="http://schemas.openxmlformats.org/presentationml/2006/main" show="0">
   <p:cSld>
     <p:spTree>
       <p:nvGrpSpPr>
@@ -7968,10 +7968,10 @@
       </p:cxnSp>
       <p:sp>
         <p:nvSpPr>
-          <p:cNvPr id="7" name="ZoneTexte 6">
+          <p:cNvPr id="5" name="ZoneTexte 4">
             <a:extLst>
               <a:ext uri="{FF2B5EF4-FFF2-40B4-BE49-F238E27FC236}">
-                <a16:creationId xmlns:a16="http://schemas.microsoft.com/office/drawing/2014/main" id="{EBF3E171-805F-81B4-94AC-CB5813DF32FD}"/>
+                <a16:creationId xmlns:a16="http://schemas.microsoft.com/office/drawing/2014/main" id="{03967DA4-910C-E468-F602-0A5C1CBE447B}"/>
               </a:ext>
             </a:extLst>
           </p:cNvPr>
@@ -7980,8 +7980,8 @@
         </p:nvSpPr>
         <p:spPr>
           <a:xfrm>
-            <a:off x="4809" y="5863037"/>
-            <a:ext cx="1642180" cy="584775"/>
+            <a:off x="4809" y="5686576"/>
+            <a:ext cx="1642180" cy="338554"/>
           </a:xfrm>
           <a:prstGeom prst="rect">
             <a:avLst/>
@@ -8066,93 +8066,6 @@
               </a:rPr>
               <a:t>{aligner}</a:t>
             </a:r>
-          </a:p>
-          <a:p>
-            <a:r>
-              <a:rPr lang="fr-FR" sz="800" b="0" dirty="0">
-                <a:solidFill>
-                  <a:srgbClr val="D19A66"/>
-                </a:solidFill>
-                <a:effectLst/>
-                <a:latin typeface="Fira Code" panose="020B0809050000020004" pitchFamily="49" charset="0"/>
-              </a:rPr>
-              <a:t>{md}:</a:t>
-            </a:r>
-            <a:r>
-              <a:rPr lang="fr-FR" sz="800" b="0" dirty="0">
-                <a:solidFill>
-                  <a:srgbClr val="98C379"/>
-                </a:solidFill>
-                <a:effectLst/>
-                <a:latin typeface="Fira Code" panose="020B0809050000020004" pitchFamily="49" charset="0"/>
-              </a:rPr>
-              <a:t> {</a:t>
-            </a:r>
-            <a:r>
-              <a:rPr lang="fr-FR" sz="800" b="0" dirty="0" err="1">
-                <a:solidFill>
-                  <a:srgbClr val="98C379"/>
-                </a:solidFill>
-                <a:effectLst/>
-                <a:latin typeface="Fira Code" panose="020B0809050000020004" pitchFamily="49" charset="0"/>
-              </a:rPr>
-              <a:t>markdup</a:t>
-            </a:r>
-            <a:r>
-              <a:rPr lang="fr-FR" sz="800" b="0" dirty="0">
-                <a:solidFill>
-                  <a:srgbClr val="98C379"/>
-                </a:solidFill>
-                <a:effectLst/>
-                <a:latin typeface="Fira Code" panose="020B0809050000020004" pitchFamily="49" charset="0"/>
-              </a:rPr>
-              <a:t>}</a:t>
-            </a:r>
-          </a:p>
-          <a:p>
-            <a:r>
-              <a:rPr lang="fr-FR" sz="800" dirty="0">
-                <a:solidFill>
-                  <a:srgbClr val="D19A66"/>
-                </a:solidFill>
-                <a:latin typeface="Fira Code" panose="020B0809050000020004" pitchFamily="49" charset="0"/>
-              </a:rPr>
-              <a:t>{mc}:</a:t>
-            </a:r>
-            <a:r>
-              <a:rPr lang="fr-FR" sz="800" dirty="0">
-                <a:solidFill>
-                  <a:srgbClr val="98C379"/>
-                </a:solidFill>
-                <a:latin typeface="Fira Code" panose="020B0809050000020004" pitchFamily="49" charset="0"/>
-              </a:rPr>
-              <a:t> {</a:t>
-            </a:r>
-            <a:r>
-              <a:rPr lang="fr-FR" sz="800" dirty="0" err="1">
-                <a:solidFill>
-                  <a:srgbClr val="98C379"/>
-                </a:solidFill>
-                <a:latin typeface="Fira Code" panose="020B0809050000020004" pitchFamily="49" charset="0"/>
-              </a:rPr>
-              <a:t>minimumcoverage</a:t>
-            </a:r>
-            <a:r>
-              <a:rPr lang="fr-FR" sz="800" dirty="0">
-                <a:solidFill>
-                  <a:srgbClr val="98C379"/>
-                </a:solidFill>
-                <a:latin typeface="Fira Code" panose="020B0809050000020004" pitchFamily="49" charset="0"/>
-              </a:rPr>
-              <a:t>}</a:t>
-            </a:r>
-            <a:endParaRPr lang="fr-FR" sz="800" b="0" dirty="0">
-              <a:solidFill>
-                <a:srgbClr val="D19A66"/>
-              </a:solidFill>
-              <a:effectLst/>
-              <a:latin typeface="Fira Code" panose="020B0809050000020004" pitchFamily="49" charset="0"/>
-            </a:endParaRPr>
           </a:p>
         </p:txBody>
       </p:sp>
@@ -17369,8 +17282,8 @@
           </p:nvSpPr>
           <p:spPr>
             <a:xfrm>
-              <a:off x="3933359" y="4432778"/>
-              <a:ext cx="1401661" cy="369332"/>
+              <a:off x="3267834" y="4432778"/>
+              <a:ext cx="762608" cy="369332"/>
             </a:xfrm>
             <a:prstGeom prst="rect">
               <a:avLst/>
@@ -18049,14 +17962,24 @@
                 <a:p>
                   <a:pPr algn="ctr"/>
                   <a:r>
-                    <a:rPr lang="fr-FR" sz="800" b="0" dirty="0" err="1">
+                    <a:rPr lang="fr-FR" sz="800" b="0" dirty="0">
                       <a:solidFill>
                         <a:srgbClr val="D19A66"/>
                       </a:solidFill>
                       <a:effectLst/>
                       <a:latin typeface="Fira Code" panose="020B0809050000020004" pitchFamily="49" charset="0"/>
                     </a:rPr>
-                    <a:t>merged</a:t>
+                    <a:t>{s}</a:t>
+                  </a:r>
+                  <a:r>
+                    <a:rPr lang="fr-FR" sz="800" b="0" dirty="0">
+                      <a:solidFill>
+                        <a:srgbClr val="98C379"/>
+                      </a:solidFill>
+                      <a:effectLst/>
+                      <a:latin typeface="Fira Code" panose="020B0809050000020004" pitchFamily="49" charset="0"/>
+                    </a:rPr>
+                    <a:t>_</a:t>
                   </a:r>
                   <a:r>
                     <a:rPr lang="fr-FR" sz="800" b="0" dirty="0">
@@ -18066,7 +17989,7 @@
                       <a:effectLst/>
                       <a:latin typeface="Fira Code" panose="020B0809050000020004" pitchFamily="49" charset="0"/>
                     </a:rPr>
-                    <a:t>-</a:t>
+                    <a:t>{a}</a:t>
                   </a:r>
                   <a:r>
                     <a:rPr lang="fr-FR" sz="800" b="0" dirty="0">
@@ -18076,7 +17999,7 @@
                       <a:effectLst/>
                       <a:latin typeface="Fira Code" panose="020B0809050000020004" pitchFamily="49" charset="0"/>
                     </a:rPr>
-                    <a:t>mark-</a:t>
+                    <a:t>_</a:t>
                   </a:r>
                   <a:r>
                     <a:rPr lang="fr-FR" sz="800" b="0" dirty="0" err="1">
@@ -18086,7 +18009,47 @@
                       <a:effectLst/>
                       <a:latin typeface="Fira Code" panose="020B0809050000020004" pitchFamily="49" charset="0"/>
                     </a:rPr>
-                    <a:t>dup.bai</a:t>
+                    <a:t>sorted</a:t>
+                  </a:r>
+                  <a:r>
+                    <a:rPr lang="fr-FR" sz="800" b="0" dirty="0">
+                      <a:solidFill>
+                        <a:srgbClr val="98C379"/>
+                      </a:solidFill>
+                      <a:effectLst/>
+                      <a:latin typeface="Fira Code" panose="020B0809050000020004" pitchFamily="49" charset="0"/>
+                    </a:rPr>
+                    <a:t>-mark-</a:t>
+                  </a:r>
+                  <a:r>
+                    <a:rPr lang="fr-FR" sz="800" b="0" dirty="0" err="1">
+                      <a:solidFill>
+                        <a:srgbClr val="98C379"/>
+                      </a:solidFill>
+                      <a:effectLst/>
+                      <a:latin typeface="Fira Code" panose="020B0809050000020004" pitchFamily="49" charset="0"/>
+                    </a:rPr>
+                    <a:t>dup</a:t>
+                  </a:r>
+                  <a:r>
+                    <a:rPr lang="fr-FR" sz="800" b="0" dirty="0">
+                      <a:solidFill>
+                        <a:srgbClr val="98C379"/>
+                      </a:solidFill>
+                      <a:effectLst/>
+                      <a:latin typeface="Fira Code" panose="020B0809050000020004" pitchFamily="49" charset="0"/>
+                    </a:rPr>
+                    <a:t>-</a:t>
+                  </a:r>
+                  <a:r>
+                    <a:rPr lang="fr-FR" sz="800" b="0" dirty="0" err="1">
+                      <a:solidFill>
+                        <a:srgbClr val="98C379"/>
+                      </a:solidFill>
+                      <a:effectLst/>
+                      <a:latin typeface="Fira Code" panose="020B0809050000020004" pitchFamily="49" charset="0"/>
+                    </a:rPr>
+                    <a:t>fx.bai</a:t>
                   </a:r>
                   <a:endParaRPr lang="fr-FR" sz="800" b="0" dirty="0">
                     <a:solidFill>
@@ -18129,14 +18092,24 @@
               <a:p>
                 <a:pPr algn="ctr"/>
                 <a:r>
-                  <a:rPr lang="fr-FR" sz="800" b="0" dirty="0" err="1">
+                  <a:rPr lang="fr-FR" sz="800" b="0" dirty="0">
                     <a:solidFill>
                       <a:srgbClr val="D19A66"/>
                     </a:solidFill>
                     <a:effectLst/>
                     <a:latin typeface="Fira Code" panose="020B0809050000020004" pitchFamily="49" charset="0"/>
                   </a:rPr>
-                  <a:t>merged</a:t>
+                  <a:t>{s}</a:t>
+                </a:r>
+                <a:r>
+                  <a:rPr lang="fr-FR" sz="800" b="0" dirty="0">
+                    <a:solidFill>
+                      <a:srgbClr val="98C379"/>
+                    </a:solidFill>
+                    <a:effectLst/>
+                    <a:latin typeface="Fira Code" panose="020B0809050000020004" pitchFamily="49" charset="0"/>
+                  </a:rPr>
+                  <a:t>_</a:t>
                 </a:r>
                 <a:r>
                   <a:rPr lang="fr-FR" sz="800" b="0" dirty="0">
@@ -18146,7 +18119,7 @@
                     <a:effectLst/>
                     <a:latin typeface="Fira Code" panose="020B0809050000020004" pitchFamily="49" charset="0"/>
                   </a:rPr>
-                  <a:t>-</a:t>
+                  <a:t>{a}</a:t>
                 </a:r>
                 <a:r>
                   <a:rPr lang="fr-FR" sz="800" b="0" dirty="0">
@@ -18156,7 +18129,7 @@
                     <a:effectLst/>
                     <a:latin typeface="Fira Code" panose="020B0809050000020004" pitchFamily="49" charset="0"/>
                   </a:rPr>
-                  <a:t>mark-</a:t>
+                  <a:t>_</a:t>
                 </a:r>
                 <a:r>
                   <a:rPr lang="fr-FR" sz="800" b="0" dirty="0" err="1">
@@ -18166,7 +18139,47 @@
                     <a:effectLst/>
                     <a:latin typeface="Fira Code" panose="020B0809050000020004" pitchFamily="49" charset="0"/>
                   </a:rPr>
-                  <a:t>dup.bam</a:t>
+                  <a:t>sorted</a:t>
+                </a:r>
+                <a:r>
+                  <a:rPr lang="fr-FR" sz="800" b="0" dirty="0">
+                    <a:solidFill>
+                      <a:srgbClr val="98C379"/>
+                    </a:solidFill>
+                    <a:effectLst/>
+                    <a:latin typeface="Fira Code" panose="020B0809050000020004" pitchFamily="49" charset="0"/>
+                  </a:rPr>
+                  <a:t>-mark-</a:t>
+                </a:r>
+                <a:r>
+                  <a:rPr lang="fr-FR" sz="800" b="0" dirty="0" err="1">
+                    <a:solidFill>
+                      <a:srgbClr val="98C379"/>
+                    </a:solidFill>
+                    <a:effectLst/>
+                    <a:latin typeface="Fira Code" panose="020B0809050000020004" pitchFamily="49" charset="0"/>
+                  </a:rPr>
+                  <a:t>dup</a:t>
+                </a:r>
+                <a:r>
+                  <a:rPr lang="fr-FR" sz="800" b="0" dirty="0">
+                    <a:solidFill>
+                      <a:srgbClr val="98C379"/>
+                    </a:solidFill>
+                    <a:effectLst/>
+                    <a:latin typeface="Fira Code" panose="020B0809050000020004" pitchFamily="49" charset="0"/>
+                  </a:rPr>
+                  <a:t>-</a:t>
+                </a:r>
+                <a:r>
+                  <a:rPr lang="fr-FR" sz="800" b="0" dirty="0" err="1">
+                    <a:solidFill>
+                      <a:srgbClr val="98C379"/>
+                    </a:solidFill>
+                    <a:effectLst/>
+                    <a:latin typeface="Fira Code" panose="020B0809050000020004" pitchFamily="49" charset="0"/>
+                  </a:rPr>
+                  <a:t>fx.bam</a:t>
                 </a:r>
                 <a:endParaRPr lang="fr-FR" sz="800" b="0" dirty="0">
                   <a:solidFill>
@@ -18457,7 +18470,7 @@
                 <a:ea typeface="Menlo" panose="020B0609030804020204" pitchFamily="49" charset="0"/>
                 <a:cs typeface="Menlo" panose="020B0609030804020204" pitchFamily="49" charset="0"/>
               </a:rPr>
-              <a:t>picard</a:t>
+              <a:t>Samtools</a:t>
             </a:r>
             <a:r>
               <a:rPr lang="en-US" sz="900" dirty="0">
@@ -18468,8 +18481,54 @@
                 <a:ea typeface="Menlo" panose="020B0609030804020204" pitchFamily="49" charset="0"/>
                 <a:cs typeface="Menlo" panose="020B0609030804020204" pitchFamily="49" charset="0"/>
               </a:rPr>
-              <a:t> </a:t>
-            </a:r>
+              <a:t> sort</a:t>
+            </a:r>
+          </a:p>
+          <a:p>
+            <a:pPr algn="ctr"/>
+            <a:r>
+              <a:rPr lang="en-US" sz="900" dirty="0">
+                <a:solidFill>
+                  <a:schemeClr val="bg1"/>
+                </a:solidFill>
+                <a:latin typeface="SF Pro Display" pitchFamily="2" charset="0"/>
+                <a:ea typeface="SF Pro Display" pitchFamily="2" charset="0"/>
+                <a:cs typeface="SF Pro Display" pitchFamily="2" charset="0"/>
+              </a:rPr>
+              <a:t>Sort by coordinates</a:t>
+            </a:r>
+          </a:p>
+        </p:txBody>
+      </p:sp>
+      <p:sp>
+        <p:nvSpPr>
+          <p:cNvPr id="9" name="ZoneTexte 8">
+            <a:extLst>
+              <a:ext uri="{FF2B5EF4-FFF2-40B4-BE49-F238E27FC236}">
+                <a16:creationId xmlns:a16="http://schemas.microsoft.com/office/drawing/2014/main" id="{F1BF9E10-A1B5-9AE9-F185-24F3E3FCD290}"/>
+              </a:ext>
+            </a:extLst>
+          </p:cNvPr>
+          <p:cNvSpPr txBox="1"/>
+          <p:nvPr/>
+        </p:nvSpPr>
+        <p:spPr>
+          <a:xfrm>
+            <a:off x="8107680" y="4623430"/>
+            <a:ext cx="2109655" cy="369332"/>
+          </a:xfrm>
+          <a:prstGeom prst="rect">
+            <a:avLst/>
+          </a:prstGeom>
+          <a:noFill/>
+        </p:spPr>
+        <p:txBody>
+          <a:bodyPr wrap="square" rtlCol="0">
+            <a:spAutoFit/>
+          </a:bodyPr>
+          <a:lstStyle/>
+          <a:p>
+            <a:pPr algn="ctr"/>
             <a:r>
               <a:rPr lang="en-US" sz="900" dirty="0" err="1">
                 <a:solidFill>
@@ -18479,7 +18538,29 @@
                 <a:ea typeface="Menlo" panose="020B0609030804020204" pitchFamily="49" charset="0"/>
                 <a:cs typeface="Menlo" panose="020B0609030804020204" pitchFamily="49" charset="0"/>
               </a:rPr>
-              <a:t>MergeSamFiles</a:t>
+              <a:t>picard</a:t>
+            </a:r>
+            <a:r>
+              <a:rPr lang="en-US" sz="900" dirty="0">
+                <a:solidFill>
+                  <a:srgbClr val="FF0000"/>
+                </a:solidFill>
+                <a:latin typeface="Menlo" panose="020B0609030804020204" pitchFamily="49" charset="0"/>
+                <a:ea typeface="Menlo" panose="020B0609030804020204" pitchFamily="49" charset="0"/>
+                <a:cs typeface="Menlo" panose="020B0609030804020204" pitchFamily="49" charset="0"/>
+              </a:rPr>
+              <a:t> </a:t>
+            </a:r>
+            <a:r>
+              <a:rPr lang="en-US" sz="900" dirty="0" err="1">
+                <a:solidFill>
+                  <a:srgbClr val="FF0000"/>
+                </a:solidFill>
+                <a:latin typeface="Menlo" panose="020B0609030804020204" pitchFamily="49" charset="0"/>
+                <a:ea typeface="Menlo" panose="020B0609030804020204" pitchFamily="49" charset="0"/>
+                <a:cs typeface="Menlo" panose="020B0609030804020204" pitchFamily="49" charset="0"/>
+              </a:rPr>
+              <a:t>SetNmMdAndUqTags</a:t>
             </a:r>
             <a:endParaRPr lang="en-US" sz="900" dirty="0">
               <a:solidFill>
@@ -18501,7 +18582,7 @@
                 <a:ea typeface="SF Pro Display" pitchFamily="2" charset="0"/>
                 <a:cs typeface="SF Pro Display" pitchFamily="2" charset="0"/>
               </a:rPr>
-              <a:t>Merge bam files</a:t>
+              <a:t>Add NM, MD, and UQ tags</a:t>
             </a:r>
           </a:p>
         </p:txBody>
@@ -18520,7 +18601,7 @@
 </file>
 
 <file path=ppt/slides/slide6.xml><?xml version="1.0" encoding="utf-8"?>
-<p:sld xmlns:a="http://schemas.openxmlformats.org/drawingml/2006/main" xmlns:r="http://schemas.openxmlformats.org/officeDocument/2006/relationships" xmlns:p="http://schemas.openxmlformats.org/presentationml/2006/main">
+<p:sld xmlns:a="http://schemas.openxmlformats.org/drawingml/2006/main" xmlns:r="http://schemas.openxmlformats.org/officeDocument/2006/relationships" xmlns:p="http://schemas.openxmlformats.org/presentationml/2006/main" show="0">
   <p:cSld>
     <p:spTree>
       <p:nvGrpSpPr>
@@ -20500,14 +20581,44 @@
                 <a:p>
                   <a:pPr algn="ctr"/>
                   <a:r>
-                    <a:rPr lang="fr-FR" sz="800" b="0" dirty="0" err="1">
+                    <a:rPr lang="fr-FR" sz="800" b="0" dirty="0">
                       <a:solidFill>
                         <a:srgbClr val="D19A66"/>
                       </a:solidFill>
                       <a:effectLst/>
                       <a:latin typeface="Fira Code" panose="020B0809050000020004" pitchFamily="49" charset="0"/>
                     </a:rPr>
-                    <a:t>merged</a:t>
+                    <a:t>{s}</a:t>
+                  </a:r>
+                  <a:r>
+                    <a:rPr lang="fr-FR" sz="800" b="0" dirty="0">
+                      <a:solidFill>
+                        <a:srgbClr val="98C379"/>
+                      </a:solidFill>
+                      <a:effectLst/>
+                      <a:latin typeface="Fira Code" panose="020B0809050000020004" pitchFamily="49" charset="0"/>
+                    </a:rPr>
+                    <a:t>_</a:t>
+                  </a:r>
+                  <a:r>
+                    <a:rPr lang="fr-FR" sz="800" b="0" dirty="0">
+                      <a:solidFill>
+                        <a:srgbClr val="D19A66"/>
+                      </a:solidFill>
+                      <a:effectLst/>
+                      <a:latin typeface="Fira Code" panose="020B0809050000020004" pitchFamily="49" charset="0"/>
+                    </a:rPr>
+                    <a:t>{a}</a:t>
+                  </a:r>
+                  <a:r>
+                    <a:rPr lang="fr-FR" sz="800" b="0" dirty="0">
+                      <a:solidFill>
+                        <a:srgbClr val="98C379"/>
+                      </a:solidFill>
+                      <a:effectLst/>
+                      <a:latin typeface="Fira Code" panose="020B0809050000020004" pitchFamily="49" charset="0"/>
+                    </a:rPr>
+                    <a:t>_</a:t>
                   </a:r>
                   <a:r>
                     <a:rPr lang="fr-FR" sz="800" b="0" dirty="0" err="1">
@@ -20517,7 +20628,7 @@
                       <a:effectLst/>
                       <a:latin typeface="Fira Code" panose="020B0809050000020004" pitchFamily="49" charset="0"/>
                     </a:rPr>
-                    <a:t>_realignertargetcreator.bed</a:t>
+                    <a:t>realignertargetcreator.bed</a:t>
                   </a:r>
                   <a:endParaRPr lang="fr-FR" sz="800" b="0" dirty="0">
                     <a:solidFill>
@@ -20607,14 +20718,44 @@
               <a:p>
                 <a:pPr algn="ctr"/>
                 <a:r>
-                  <a:rPr lang="fr-FR" sz="800" b="0" dirty="0" err="1">
+                  <a:rPr lang="fr-FR" sz="800" b="0" dirty="0">
                     <a:solidFill>
                       <a:srgbClr val="D19A66"/>
                     </a:solidFill>
                     <a:effectLst/>
                     <a:latin typeface="Fira Code" panose="020B0809050000020004" pitchFamily="49" charset="0"/>
                   </a:rPr>
-                  <a:t>merged</a:t>
+                  <a:t>{s}</a:t>
+                </a:r>
+                <a:r>
+                  <a:rPr lang="fr-FR" sz="800" b="0" dirty="0">
+                    <a:solidFill>
+                      <a:srgbClr val="98C379"/>
+                    </a:solidFill>
+                    <a:effectLst/>
+                    <a:latin typeface="Fira Code" panose="020B0809050000020004" pitchFamily="49" charset="0"/>
+                  </a:rPr>
+                  <a:t>_</a:t>
+                </a:r>
+                <a:r>
+                  <a:rPr lang="fr-FR" sz="800" b="0" dirty="0">
+                    <a:solidFill>
+                      <a:srgbClr val="D19A66"/>
+                    </a:solidFill>
+                    <a:effectLst/>
+                    <a:latin typeface="Fira Code" panose="020B0809050000020004" pitchFamily="49" charset="0"/>
+                  </a:rPr>
+                  <a:t>{a}</a:t>
+                </a:r>
+                <a:r>
+                  <a:rPr lang="fr-FR" sz="800" b="0" dirty="0">
+                    <a:solidFill>
+                      <a:srgbClr val="98C379"/>
+                    </a:solidFill>
+                    <a:effectLst/>
+                    <a:latin typeface="Fira Code" panose="020B0809050000020004" pitchFamily="49" charset="0"/>
+                  </a:rPr>
+                  <a:t>.</a:t>
                 </a:r>
                 <a:r>
                   <a:rPr lang="fr-FR" sz="800" b="0" dirty="0" err="1">
@@ -20624,7 +20765,7 @@
                     <a:effectLst/>
                     <a:latin typeface="Fira Code" panose="020B0809050000020004" pitchFamily="49" charset="0"/>
                   </a:rPr>
-                  <a:t>.intervals</a:t>
+                  <a:t>intervals</a:t>
                 </a:r>
                 <a:endParaRPr lang="fr-FR" sz="800" b="0" dirty="0">
                   <a:solidFill>
@@ -20767,17 +20908,57 @@
             <a:p>
               <a:pPr algn="ctr"/>
               <a:r>
-                <a:rPr lang="fr-FR" sz="700" b="0" dirty="0" err="1">
+                <a:rPr lang="fr-FR" sz="800" b="0" dirty="0">
                   <a:solidFill>
                     <a:srgbClr val="D19A66"/>
                   </a:solidFill>
                   <a:effectLst/>
                   <a:latin typeface="Fira Code" panose="020B0809050000020004" pitchFamily="49" charset="0"/>
                 </a:rPr>
-                <a:t>merged</a:t>
+                <a:t>{</a:t>
               </a:r>
               <a:r>
-                <a:rPr lang="fr-FR" sz="700" b="0" dirty="0" err="1">
+                <a:rPr lang="fr-FR" sz="800" b="0" dirty="0" err="1">
+                  <a:solidFill>
+                    <a:srgbClr val="D19A66"/>
+                  </a:solidFill>
+                  <a:effectLst/>
+                  <a:latin typeface="Fira Code" panose="020B0809050000020004" pitchFamily="49" charset="0"/>
+                </a:rPr>
+                <a:t>sample</a:t>
+              </a:r>
+              <a:r>
+                <a:rPr lang="fr-FR" sz="800" b="0" dirty="0">
+                  <a:solidFill>
+                    <a:srgbClr val="D19A66"/>
+                  </a:solidFill>
+                  <a:effectLst/>
+                  <a:latin typeface="Fira Code" panose="020B0809050000020004" pitchFamily="49" charset="0"/>
+                </a:rPr>
+                <a:t>}</a:t>
+              </a:r>
+              <a:r>
+                <a:rPr lang="fr-FR" sz="800" b="0" dirty="0">
+                  <a:solidFill>
+                    <a:srgbClr val="98C379"/>
+                  </a:solidFill>
+                  <a:effectLst/>
+                  <a:latin typeface="Fira Code" panose="020B0809050000020004" pitchFamily="49" charset="0"/>
+                </a:rPr>
+                <a:t>_</a:t>
+              </a:r>
+              <a:r>
+                <a:rPr lang="fr-FR" sz="800" b="0" dirty="0">
+                  <a:solidFill>
+                    <a:srgbClr val="D19A66"/>
+                  </a:solidFill>
+                  <a:effectLst/>
+                  <a:latin typeface="Fira Code" panose="020B0809050000020004" pitchFamily="49" charset="0"/>
+                </a:rPr>
+                <a:t>{aligner}</a:t>
+              </a:r>
+              <a:r>
+                <a:rPr lang="fr-FR" sz="800" b="0" dirty="0">
                   <a:solidFill>
                     <a:srgbClr val="98C379"/>
                   </a:solidFill>
@@ -20796,7 +20977,7 @@
                 </a:rPr>
                 <a:t>intervals</a:t>
               </a:r>
-              <a:endParaRPr lang="fr-FR" sz="700" b="0" dirty="0">
+              <a:endParaRPr lang="fr-FR" sz="800" b="0" dirty="0">
                 <a:solidFill>
                   <a:srgbClr val="ABB2BF"/>
                 </a:solidFill>
@@ -21351,14 +21532,44 @@
               <a:p>
                 <a:pPr algn="ctr"/>
                 <a:r>
-                  <a:rPr lang="fr-FR" sz="800" b="0" dirty="0" err="1">
+                  <a:rPr lang="fr-FR" sz="800" b="0" dirty="0">
                     <a:solidFill>
                       <a:srgbClr val="D19A66"/>
                     </a:solidFill>
                     <a:effectLst/>
                     <a:latin typeface="Fira Code" panose="020B0809050000020004" pitchFamily="49" charset="0"/>
                   </a:rPr>
-                  <a:t>merged</a:t>
+                  <a:t>{s}</a:t>
+                </a:r>
+                <a:r>
+                  <a:rPr lang="fr-FR" sz="800" b="0" dirty="0">
+                    <a:solidFill>
+                      <a:srgbClr val="98C379"/>
+                    </a:solidFill>
+                    <a:effectLst/>
+                    <a:latin typeface="Fira Code" panose="020B0809050000020004" pitchFamily="49" charset="0"/>
+                  </a:rPr>
+                  <a:t>_</a:t>
+                </a:r>
+                <a:r>
+                  <a:rPr lang="fr-FR" sz="800" b="0" dirty="0">
+                    <a:solidFill>
+                      <a:srgbClr val="D19A66"/>
+                    </a:solidFill>
+                    <a:effectLst/>
+                    <a:latin typeface="Fira Code" panose="020B0809050000020004" pitchFamily="49" charset="0"/>
+                  </a:rPr>
+                  <a:t>{a}</a:t>
+                </a:r>
+                <a:r>
+                  <a:rPr lang="fr-FR" sz="800" b="0" dirty="0">
+                    <a:solidFill>
+                      <a:srgbClr val="98C379"/>
+                    </a:solidFill>
+                    <a:effectLst/>
+                    <a:latin typeface="Fira Code" panose="020B0809050000020004" pitchFamily="49" charset="0"/>
+                  </a:rPr>
+                  <a:t>_</a:t>
                 </a:r>
                 <a:r>
                   <a:rPr lang="fr-FR" sz="800" b="0" dirty="0" err="1">
@@ -21368,7 +21579,7 @@
                     <a:effectLst/>
                     <a:latin typeface="Fira Code" panose="020B0809050000020004" pitchFamily="49" charset="0"/>
                   </a:rPr>
-                  <a:t>_realign.bam</a:t>
+                  <a:t>md_realigned.bam</a:t>
                 </a:r>
                 <a:endParaRPr lang="fr-FR" sz="800" b="0" dirty="0">
                   <a:solidFill>
@@ -21948,14 +22159,44 @@
             <a:p>
               <a:pPr algn="ctr"/>
               <a:r>
-                <a:rPr lang="fr-FR" sz="800" b="0" dirty="0" err="1">
+                <a:rPr lang="fr-FR" sz="800" b="0" dirty="0">
                   <a:solidFill>
                     <a:srgbClr val="D19A66"/>
                   </a:solidFill>
                   <a:effectLst/>
                   <a:latin typeface="Fira Code" panose="020B0809050000020004" pitchFamily="49" charset="0"/>
                 </a:rPr>
-                <a:t>merged</a:t>
+                <a:t>{s}</a:t>
+              </a:r>
+              <a:r>
+                <a:rPr lang="fr-FR" sz="800" b="0" dirty="0">
+                  <a:solidFill>
+                    <a:srgbClr val="98C379"/>
+                  </a:solidFill>
+                  <a:effectLst/>
+                  <a:latin typeface="Fira Code" panose="020B0809050000020004" pitchFamily="49" charset="0"/>
+                </a:rPr>
+                <a:t>_</a:t>
+              </a:r>
+              <a:r>
+                <a:rPr lang="fr-FR" sz="800" b="0" dirty="0">
+                  <a:solidFill>
+                    <a:srgbClr val="D19A66"/>
+                  </a:solidFill>
+                  <a:effectLst/>
+                  <a:latin typeface="Fira Code" panose="020B0809050000020004" pitchFamily="49" charset="0"/>
+                </a:rPr>
+                <a:t>{a}</a:t>
+              </a:r>
+              <a:r>
+                <a:rPr lang="fr-FR" sz="800" b="0" dirty="0">
+                  <a:solidFill>
+                    <a:srgbClr val="98C379"/>
+                  </a:solidFill>
+                  <a:effectLst/>
+                  <a:latin typeface="Fira Code" panose="020B0809050000020004" pitchFamily="49" charset="0"/>
+                </a:rPr>
+                <a:t>_</a:t>
               </a:r>
               <a:r>
                 <a:rPr lang="fr-FR" sz="800" b="0" dirty="0" err="1">
@@ -21965,7 +22206,7 @@
                   <a:effectLst/>
                   <a:latin typeface="Fira Code" panose="020B0809050000020004" pitchFamily="49" charset="0"/>
                 </a:rPr>
-                <a:t>_realign.bai</a:t>
+                <a:t>md_realigned.bai</a:t>
               </a:r>
               <a:endParaRPr lang="fr-FR" sz="800" b="0" dirty="0">
                 <a:solidFill>
@@ -22250,44 +22491,94 @@
           <a:p>
             <a:pPr algn="ctr"/>
             <a:r>
-              <a:rPr lang="fr-FR" sz="800" b="0" dirty="0" err="1">
+              <a:rPr lang="fr-FR" sz="800" b="0" dirty="0">
                 <a:solidFill>
                   <a:srgbClr val="D19A66"/>
                 </a:solidFill>
                 <a:effectLst/>
                 <a:latin typeface="Fira Code" panose="020B0809050000020004" pitchFamily="49" charset="0"/>
               </a:rPr>
-              <a:t>merged</a:t>
+              <a:t>{s}</a:t>
             </a:r>
             <a:r>
               <a:rPr lang="fr-FR" sz="800" b="0" dirty="0">
                 <a:solidFill>
-                  <a:srgbClr val="D19A66"/>
+                  <a:srgbClr val="98C379"/>
                 </a:solidFill>
                 <a:effectLst/>
                 <a:latin typeface="Fira Code" panose="020B0809050000020004" pitchFamily="49" charset="0"/>
               </a:rPr>
-              <a:t>-</a:t>
+              <a:t>_</a:t>
             </a:r>
             <a:r>
               <a:rPr lang="fr-FR" sz="800" b="0" dirty="0">
                 <a:solidFill>
-                  <a:srgbClr val="98C379"/>
+                  <a:srgbClr val="D19A66"/>
                 </a:solidFill>
                 <a:effectLst/>
                 <a:latin typeface="Fira Code" panose="020B0809050000020004" pitchFamily="49" charset="0"/>
               </a:rPr>
-              <a:t>mark-</a:t>
-            </a:r>
-            <a:r>
-              <a:rPr lang="fr-FR" sz="800" b="0" dirty="0" err="1">
+              <a:t>{a}</a:t>
+            </a:r>
+            <a:r>
+              <a:rPr lang="fr-FR" sz="800" b="0" dirty="0">
                 <a:solidFill>
                   <a:srgbClr val="98C379"/>
                 </a:solidFill>
                 <a:effectLst/>
                 <a:latin typeface="Fira Code" panose="020B0809050000020004" pitchFamily="49" charset="0"/>
               </a:rPr>
-              <a:t>dup.bai</a:t>
+              <a:t>_</a:t>
+            </a:r>
+            <a:r>
+              <a:rPr lang="fr-FR" sz="800" b="0" dirty="0" err="1">
+                <a:solidFill>
+                  <a:srgbClr val="98C379"/>
+                </a:solidFill>
+                <a:effectLst/>
+                <a:latin typeface="Fira Code" panose="020B0809050000020004" pitchFamily="49" charset="0"/>
+              </a:rPr>
+              <a:t>sorted</a:t>
+            </a:r>
+            <a:r>
+              <a:rPr lang="fr-FR" sz="800" b="0" dirty="0">
+                <a:solidFill>
+                  <a:srgbClr val="98C379"/>
+                </a:solidFill>
+                <a:effectLst/>
+                <a:latin typeface="Fira Code" panose="020B0809050000020004" pitchFamily="49" charset="0"/>
+              </a:rPr>
+              <a:t>-mark-</a:t>
+            </a:r>
+            <a:r>
+              <a:rPr lang="fr-FR" sz="800" b="0" dirty="0" err="1">
+                <a:solidFill>
+                  <a:srgbClr val="98C379"/>
+                </a:solidFill>
+                <a:effectLst/>
+                <a:latin typeface="Fira Code" panose="020B0809050000020004" pitchFamily="49" charset="0"/>
+              </a:rPr>
+              <a:t>dup</a:t>
+            </a:r>
+            <a:r>
+              <a:rPr lang="fr-FR" sz="800" b="0" dirty="0">
+                <a:solidFill>
+                  <a:srgbClr val="98C379"/>
+                </a:solidFill>
+                <a:effectLst/>
+                <a:latin typeface="Fira Code" panose="020B0809050000020004" pitchFamily="49" charset="0"/>
+              </a:rPr>
+              <a:t>-</a:t>
+            </a:r>
+            <a:r>
+              <a:rPr lang="fr-FR" sz="800" b="0" dirty="0" err="1">
+                <a:solidFill>
+                  <a:srgbClr val="98C379"/>
+                </a:solidFill>
+                <a:effectLst/>
+                <a:latin typeface="Fira Code" panose="020B0809050000020004" pitchFamily="49" charset="0"/>
+              </a:rPr>
+              <a:t>fx.bai</a:t>
             </a:r>
             <a:endParaRPr lang="fr-FR" sz="800" b="0" dirty="0">
               <a:solidFill>
@@ -22329,44 +22620,94 @@
           <a:p>
             <a:pPr algn="ctr"/>
             <a:r>
-              <a:rPr lang="fr-FR" sz="800" b="0" dirty="0" err="1">
+              <a:rPr lang="fr-FR" sz="800" b="0" dirty="0">
                 <a:solidFill>
                   <a:srgbClr val="D19A66"/>
                 </a:solidFill>
                 <a:effectLst/>
                 <a:latin typeface="Fira Code" panose="020B0809050000020004" pitchFamily="49" charset="0"/>
               </a:rPr>
-              <a:t>merged</a:t>
+              <a:t>{s}</a:t>
             </a:r>
             <a:r>
               <a:rPr lang="fr-FR" sz="800" b="0" dirty="0">
                 <a:solidFill>
-                  <a:srgbClr val="D19A66"/>
+                  <a:srgbClr val="98C379"/>
                 </a:solidFill>
                 <a:effectLst/>
                 <a:latin typeface="Fira Code" panose="020B0809050000020004" pitchFamily="49" charset="0"/>
               </a:rPr>
-              <a:t>-</a:t>
+              <a:t>_</a:t>
             </a:r>
             <a:r>
               <a:rPr lang="fr-FR" sz="800" b="0" dirty="0">
                 <a:solidFill>
-                  <a:srgbClr val="98C379"/>
+                  <a:srgbClr val="D19A66"/>
                 </a:solidFill>
                 <a:effectLst/>
                 <a:latin typeface="Fira Code" panose="020B0809050000020004" pitchFamily="49" charset="0"/>
               </a:rPr>
-              <a:t>mark-</a:t>
-            </a:r>
-            <a:r>
-              <a:rPr lang="fr-FR" sz="800" b="0" dirty="0" err="1">
+              <a:t>{a}</a:t>
+            </a:r>
+            <a:r>
+              <a:rPr lang="fr-FR" sz="800" b="0" dirty="0">
                 <a:solidFill>
                   <a:srgbClr val="98C379"/>
                 </a:solidFill>
                 <a:effectLst/>
                 <a:latin typeface="Fira Code" panose="020B0809050000020004" pitchFamily="49" charset="0"/>
               </a:rPr>
-              <a:t>dup.bam</a:t>
+              <a:t>_</a:t>
+            </a:r>
+            <a:r>
+              <a:rPr lang="fr-FR" sz="800" b="0" dirty="0" err="1">
+                <a:solidFill>
+                  <a:srgbClr val="98C379"/>
+                </a:solidFill>
+                <a:effectLst/>
+                <a:latin typeface="Fira Code" panose="020B0809050000020004" pitchFamily="49" charset="0"/>
+              </a:rPr>
+              <a:t>sorted</a:t>
+            </a:r>
+            <a:r>
+              <a:rPr lang="fr-FR" sz="800" b="0" dirty="0">
+                <a:solidFill>
+                  <a:srgbClr val="98C379"/>
+                </a:solidFill>
+                <a:effectLst/>
+                <a:latin typeface="Fira Code" panose="020B0809050000020004" pitchFamily="49" charset="0"/>
+              </a:rPr>
+              <a:t>-mark-</a:t>
+            </a:r>
+            <a:r>
+              <a:rPr lang="fr-FR" sz="800" b="0" dirty="0" err="1">
+                <a:solidFill>
+                  <a:srgbClr val="98C379"/>
+                </a:solidFill>
+                <a:effectLst/>
+                <a:latin typeface="Fira Code" panose="020B0809050000020004" pitchFamily="49" charset="0"/>
+              </a:rPr>
+              <a:t>dup</a:t>
+            </a:r>
+            <a:r>
+              <a:rPr lang="fr-FR" sz="800" b="0" dirty="0">
+                <a:solidFill>
+                  <a:srgbClr val="98C379"/>
+                </a:solidFill>
+                <a:effectLst/>
+                <a:latin typeface="Fira Code" panose="020B0809050000020004" pitchFamily="49" charset="0"/>
+              </a:rPr>
+              <a:t>-</a:t>
+            </a:r>
+            <a:r>
+              <a:rPr lang="fr-FR" sz="800" b="0" dirty="0" err="1">
+                <a:solidFill>
+                  <a:srgbClr val="98C379"/>
+                </a:solidFill>
+                <a:effectLst/>
+                <a:latin typeface="Fira Code" panose="020B0809050000020004" pitchFamily="49" charset="0"/>
+              </a:rPr>
+              <a:t>fx.bam</a:t>
             </a:r>
             <a:endParaRPr lang="fr-FR" sz="800" b="0" dirty="0">
               <a:solidFill>
@@ -22408,44 +22749,94 @@
           <a:p>
             <a:pPr algn="ctr"/>
             <a:r>
-              <a:rPr lang="fr-FR" sz="800" b="0" dirty="0" err="1">
+              <a:rPr lang="fr-FR" sz="800" b="0" dirty="0">
                 <a:solidFill>
                   <a:srgbClr val="D19A66"/>
                 </a:solidFill>
                 <a:effectLst/>
                 <a:latin typeface="Fira Code" panose="020B0809050000020004" pitchFamily="49" charset="0"/>
               </a:rPr>
-              <a:t>merged</a:t>
+              <a:t>{s}</a:t>
             </a:r>
             <a:r>
               <a:rPr lang="fr-FR" sz="800" b="0" dirty="0">
                 <a:solidFill>
-                  <a:srgbClr val="D19A66"/>
+                  <a:srgbClr val="98C379"/>
                 </a:solidFill>
                 <a:effectLst/>
                 <a:latin typeface="Fira Code" panose="020B0809050000020004" pitchFamily="49" charset="0"/>
               </a:rPr>
-              <a:t>-</a:t>
+              <a:t>_</a:t>
             </a:r>
             <a:r>
               <a:rPr lang="fr-FR" sz="800" b="0" dirty="0">
                 <a:solidFill>
-                  <a:srgbClr val="98C379"/>
+                  <a:srgbClr val="D19A66"/>
                 </a:solidFill>
                 <a:effectLst/>
                 <a:latin typeface="Fira Code" panose="020B0809050000020004" pitchFamily="49" charset="0"/>
               </a:rPr>
-              <a:t>mark-</a:t>
-            </a:r>
-            <a:r>
-              <a:rPr lang="fr-FR" sz="800" b="0" dirty="0" err="1">
+              <a:t>{a}</a:t>
+            </a:r>
+            <a:r>
+              <a:rPr lang="fr-FR" sz="800" b="0" dirty="0">
                 <a:solidFill>
                   <a:srgbClr val="98C379"/>
                 </a:solidFill>
                 <a:effectLst/>
                 <a:latin typeface="Fira Code" panose="020B0809050000020004" pitchFamily="49" charset="0"/>
               </a:rPr>
-              <a:t>dup.bai</a:t>
+              <a:t>_</a:t>
+            </a:r>
+            <a:r>
+              <a:rPr lang="fr-FR" sz="800" b="0" dirty="0" err="1">
+                <a:solidFill>
+                  <a:srgbClr val="98C379"/>
+                </a:solidFill>
+                <a:effectLst/>
+                <a:latin typeface="Fira Code" panose="020B0809050000020004" pitchFamily="49" charset="0"/>
+              </a:rPr>
+              <a:t>sorted</a:t>
+            </a:r>
+            <a:r>
+              <a:rPr lang="fr-FR" sz="800" b="0" dirty="0">
+                <a:solidFill>
+                  <a:srgbClr val="98C379"/>
+                </a:solidFill>
+                <a:effectLst/>
+                <a:latin typeface="Fira Code" panose="020B0809050000020004" pitchFamily="49" charset="0"/>
+              </a:rPr>
+              <a:t>-mark-</a:t>
+            </a:r>
+            <a:r>
+              <a:rPr lang="fr-FR" sz="800" b="0" dirty="0" err="1">
+                <a:solidFill>
+                  <a:srgbClr val="98C379"/>
+                </a:solidFill>
+                <a:effectLst/>
+                <a:latin typeface="Fira Code" panose="020B0809050000020004" pitchFamily="49" charset="0"/>
+              </a:rPr>
+              <a:t>dup</a:t>
+            </a:r>
+            <a:r>
+              <a:rPr lang="fr-FR" sz="800" b="0" dirty="0">
+                <a:solidFill>
+                  <a:srgbClr val="98C379"/>
+                </a:solidFill>
+                <a:effectLst/>
+                <a:latin typeface="Fira Code" panose="020B0809050000020004" pitchFamily="49" charset="0"/>
+              </a:rPr>
+              <a:t>-</a:t>
+            </a:r>
+            <a:r>
+              <a:rPr lang="fr-FR" sz="800" b="0" dirty="0" err="1">
+                <a:solidFill>
+                  <a:srgbClr val="98C379"/>
+                </a:solidFill>
+                <a:effectLst/>
+                <a:latin typeface="Fira Code" panose="020B0809050000020004" pitchFamily="49" charset="0"/>
+              </a:rPr>
+              <a:t>fx.bai</a:t>
             </a:r>
             <a:endParaRPr lang="fr-FR" sz="800" b="0" dirty="0">
               <a:solidFill>
@@ -22487,44 +22878,94 @@
           <a:p>
             <a:pPr algn="ctr"/>
             <a:r>
-              <a:rPr lang="fr-FR" sz="800" b="0" dirty="0" err="1">
+              <a:rPr lang="fr-FR" sz="800" b="0" dirty="0">
                 <a:solidFill>
                   <a:srgbClr val="D19A66"/>
                 </a:solidFill>
                 <a:effectLst/>
                 <a:latin typeface="Fira Code" panose="020B0809050000020004" pitchFamily="49" charset="0"/>
               </a:rPr>
-              <a:t>merged</a:t>
+              <a:t>{s}</a:t>
             </a:r>
             <a:r>
               <a:rPr lang="fr-FR" sz="800" b="0" dirty="0">
                 <a:solidFill>
-                  <a:srgbClr val="D19A66"/>
+                  <a:srgbClr val="98C379"/>
                 </a:solidFill>
                 <a:effectLst/>
                 <a:latin typeface="Fira Code" panose="020B0809050000020004" pitchFamily="49" charset="0"/>
               </a:rPr>
-              <a:t>-</a:t>
+              <a:t>_</a:t>
             </a:r>
             <a:r>
               <a:rPr lang="fr-FR" sz="800" b="0" dirty="0">
                 <a:solidFill>
-                  <a:srgbClr val="98C379"/>
+                  <a:srgbClr val="D19A66"/>
                 </a:solidFill>
                 <a:effectLst/>
                 <a:latin typeface="Fira Code" panose="020B0809050000020004" pitchFamily="49" charset="0"/>
               </a:rPr>
-              <a:t>mark-</a:t>
-            </a:r>
-            <a:r>
-              <a:rPr lang="fr-FR" sz="800" b="0" dirty="0" err="1">
+              <a:t>{a}</a:t>
+            </a:r>
+            <a:r>
+              <a:rPr lang="fr-FR" sz="800" b="0" dirty="0">
                 <a:solidFill>
                   <a:srgbClr val="98C379"/>
                 </a:solidFill>
                 <a:effectLst/>
                 <a:latin typeface="Fira Code" panose="020B0809050000020004" pitchFamily="49" charset="0"/>
               </a:rPr>
-              <a:t>dup.bam</a:t>
+              <a:t>_</a:t>
+            </a:r>
+            <a:r>
+              <a:rPr lang="fr-FR" sz="800" b="0" dirty="0" err="1">
+                <a:solidFill>
+                  <a:srgbClr val="98C379"/>
+                </a:solidFill>
+                <a:effectLst/>
+                <a:latin typeface="Fira Code" panose="020B0809050000020004" pitchFamily="49" charset="0"/>
+              </a:rPr>
+              <a:t>sorted</a:t>
+            </a:r>
+            <a:r>
+              <a:rPr lang="fr-FR" sz="800" b="0" dirty="0">
+                <a:solidFill>
+                  <a:srgbClr val="98C379"/>
+                </a:solidFill>
+                <a:effectLst/>
+                <a:latin typeface="Fira Code" panose="020B0809050000020004" pitchFamily="49" charset="0"/>
+              </a:rPr>
+              <a:t>-mark-</a:t>
+            </a:r>
+            <a:r>
+              <a:rPr lang="fr-FR" sz="800" b="0" dirty="0" err="1">
+                <a:solidFill>
+                  <a:srgbClr val="98C379"/>
+                </a:solidFill>
+                <a:effectLst/>
+                <a:latin typeface="Fira Code" panose="020B0809050000020004" pitchFamily="49" charset="0"/>
+              </a:rPr>
+              <a:t>dup</a:t>
+            </a:r>
+            <a:r>
+              <a:rPr lang="fr-FR" sz="800" b="0" dirty="0">
+                <a:solidFill>
+                  <a:srgbClr val="98C379"/>
+                </a:solidFill>
+                <a:effectLst/>
+                <a:latin typeface="Fira Code" panose="020B0809050000020004" pitchFamily="49" charset="0"/>
+              </a:rPr>
+              <a:t>-</a:t>
+            </a:r>
+            <a:r>
+              <a:rPr lang="fr-FR" sz="800" b="0" dirty="0" err="1">
+                <a:solidFill>
+                  <a:srgbClr val="98C379"/>
+                </a:solidFill>
+                <a:effectLst/>
+                <a:latin typeface="Fira Code" panose="020B0809050000020004" pitchFamily="49" charset="0"/>
+              </a:rPr>
+              <a:t>fx.bam</a:t>
             </a:r>
             <a:endParaRPr lang="fr-FR" sz="800" b="0" dirty="0">
               <a:solidFill>
@@ -22533,6 +22974,109 @@
               <a:effectLst/>
               <a:latin typeface="Fira Code" panose="020B0809050000020004" pitchFamily="49" charset="0"/>
             </a:endParaRPr>
+          </a:p>
+        </p:txBody>
+      </p:sp>
+      <p:sp>
+        <p:nvSpPr>
+          <p:cNvPr id="9" name="ZoneTexte 8">
+            <a:extLst>
+              <a:ext uri="{FF2B5EF4-FFF2-40B4-BE49-F238E27FC236}">
+                <a16:creationId xmlns:a16="http://schemas.microsoft.com/office/drawing/2014/main" id="{62EC6118-25E1-439F-5027-B055981083CF}"/>
+              </a:ext>
+            </a:extLst>
+          </p:cNvPr>
+          <p:cNvSpPr txBox="1"/>
+          <p:nvPr/>
+        </p:nvSpPr>
+        <p:spPr>
+          <a:xfrm>
+            <a:off x="4809" y="5686576"/>
+            <a:ext cx="1642180" cy="338554"/>
+          </a:xfrm>
+          <a:prstGeom prst="rect">
+            <a:avLst/>
+          </a:prstGeom>
+          <a:noFill/>
+          <a:ln>
+            <a:solidFill>
+              <a:schemeClr val="accent1"/>
+            </a:solidFill>
+          </a:ln>
+        </p:spPr>
+        <p:txBody>
+          <a:bodyPr wrap="square" rtlCol="0">
+            <a:spAutoFit/>
+          </a:bodyPr>
+          <a:lstStyle/>
+          <a:p>
+            <a:r>
+              <a:rPr lang="fr-FR" sz="800" b="0" dirty="0">
+                <a:solidFill>
+                  <a:srgbClr val="D19A66"/>
+                </a:solidFill>
+                <a:effectLst/>
+                <a:latin typeface="Fira Code" panose="020B0809050000020004" pitchFamily="49" charset="0"/>
+              </a:rPr>
+              <a:t>{</a:t>
+            </a:r>
+            <a:r>
+              <a:rPr lang="fr-FR" sz="800" dirty="0">
+                <a:solidFill>
+                  <a:srgbClr val="D19A66"/>
+                </a:solidFill>
+                <a:latin typeface="Fira Code" panose="020B0809050000020004" pitchFamily="49" charset="0"/>
+              </a:rPr>
+              <a:t>s}:</a:t>
+            </a:r>
+            <a:r>
+              <a:rPr lang="fr-FR" sz="800" dirty="0">
+                <a:solidFill>
+                  <a:srgbClr val="98C379"/>
+                </a:solidFill>
+                <a:latin typeface="Fira Code" panose="020B0809050000020004" pitchFamily="49" charset="0"/>
+              </a:rPr>
+              <a:t> {</a:t>
+            </a:r>
+            <a:r>
+              <a:rPr lang="fr-FR" sz="800" dirty="0" err="1">
+                <a:solidFill>
+                  <a:srgbClr val="98C379"/>
+                </a:solidFill>
+                <a:latin typeface="Fira Code" panose="020B0809050000020004" pitchFamily="49" charset="0"/>
+              </a:rPr>
+              <a:t>sample</a:t>
+            </a:r>
+            <a:r>
+              <a:rPr lang="fr-FR" sz="800" dirty="0">
+                <a:solidFill>
+                  <a:srgbClr val="98C379"/>
+                </a:solidFill>
+                <a:latin typeface="Fira Code" panose="020B0809050000020004" pitchFamily="49" charset="0"/>
+              </a:rPr>
+              <a:t>}</a:t>
+            </a:r>
+          </a:p>
+          <a:p>
+            <a:r>
+              <a:rPr lang="fr-FR" sz="800" b="0" dirty="0">
+                <a:solidFill>
+                  <a:srgbClr val="D19A66"/>
+                </a:solidFill>
+                <a:effectLst/>
+                <a:latin typeface="Fira Code" panose="020B0809050000020004" pitchFamily="49" charset="0"/>
+              </a:rPr>
+              <a:t>{a}: </a:t>
+            </a:r>
+            <a:r>
+              <a:rPr lang="fr-FR" sz="800" dirty="0">
+                <a:solidFill>
+                  <a:srgbClr val="98C379"/>
+                </a:solidFill>
+                <a:latin typeface="Fira Code" panose="020B0809050000020004" pitchFamily="49" charset="0"/>
+              </a:rPr>
+              <a:t>{aligner}</a:t>
+            </a:r>
           </a:p>
         </p:txBody>
       </p:sp>
@@ -23279,8 +23823,8 @@
         </p:nvCxnSpPr>
         <p:spPr>
           <a:xfrm>
-            <a:off x="-168678" y="1098619"/>
-            <a:ext cx="3711253" cy="323587"/>
+            <a:off x="-59" y="1098619"/>
+            <a:ext cx="3542634" cy="323587"/>
           </a:xfrm>
           <a:prstGeom prst="bentConnector2">
             <a:avLst/>
@@ -24545,9 +25089,9 @@
         <p:grpSpPr>
           <a:xfrm>
             <a:off x="1485871" y="1422206"/>
-            <a:ext cx="4158041" cy="4862537"/>
+            <a:ext cx="4107829" cy="4862537"/>
             <a:chOff x="1485871" y="1422206"/>
-            <a:chExt cx="4158041" cy="4862537"/>
+            <a:chExt cx="4107829" cy="4862537"/>
           </a:xfrm>
         </p:grpSpPr>
         <p:sp>
@@ -24580,6 +25124,46 @@
             <a:p>
               <a:pPr algn="ctr"/>
               <a:r>
+                <a:rPr lang="fr-FR" sz="800" b="0" dirty="0">
+                  <a:solidFill>
+                    <a:srgbClr val="D19A66"/>
+                  </a:solidFill>
+                  <a:effectLst/>
+                  <a:latin typeface="Fira Code" panose="020B0809050000020004" pitchFamily="49" charset="0"/>
+                </a:rPr>
+                <a:t>{s}</a:t>
+              </a:r>
+              <a:r>
+                <a:rPr lang="fr-FR" sz="800" b="0" dirty="0">
+                  <a:solidFill>
+                    <a:srgbClr val="98C379"/>
+                  </a:solidFill>
+                  <a:effectLst/>
+                  <a:latin typeface="Fira Code" panose="020B0809050000020004" pitchFamily="49" charset="0"/>
+                </a:rPr>
+                <a:t>_</a:t>
+              </a:r>
+              <a:r>
+                <a:rPr lang="fr-FR" sz="800" b="0" dirty="0">
+                  <a:solidFill>
+                    <a:srgbClr val="D19A66"/>
+                  </a:solidFill>
+                  <a:effectLst/>
+                  <a:latin typeface="Fira Code" panose="020B0809050000020004" pitchFamily="49" charset="0"/>
+                </a:rPr>
+                <a:t>{a}</a:t>
+              </a:r>
+              <a:r>
+                <a:rPr lang="fr-FR" sz="800" b="0" dirty="0">
+                  <a:solidFill>
+                    <a:srgbClr val="98C379"/>
+                  </a:solidFill>
+                  <a:effectLst/>
+                  <a:latin typeface="Fira Code" panose="020B0809050000020004" pitchFamily="49" charset="0"/>
+                </a:rPr>
+                <a:t>_</a:t>
+              </a:r>
+              <a:r>
                 <a:rPr lang="fr-FR" sz="800" b="0" dirty="0" err="1">
                   <a:solidFill>
                     <a:srgbClr val="98C379"/>
@@ -24587,7 +25171,7 @@
                   <a:effectLst/>
                   <a:latin typeface="Fira Code" panose="020B0809050000020004" pitchFamily="49" charset="0"/>
                 </a:rPr>
-                <a:t>merged_realign_fixed_bam.flagstat</a:t>
+                <a:t>md_realigned.flagstat</a:t>
               </a:r>
               <a:endParaRPr lang="fr-FR" sz="800" b="0" dirty="0">
                 <a:solidFill>
@@ -24614,9 +25198,9 @@
           <p:grpSpPr>
             <a:xfrm>
               <a:off x="1485871" y="1422206"/>
-              <a:ext cx="4158041" cy="4862537"/>
+              <a:ext cx="4107829" cy="4862537"/>
               <a:chOff x="1485871" y="1422206"/>
-              <a:chExt cx="4158041" cy="4862537"/>
+              <a:chExt cx="4107829" cy="4862537"/>
             </a:xfrm>
           </p:grpSpPr>
           <p:grpSp>
@@ -24634,9 +25218,9 @@
             <p:grpSpPr>
               <a:xfrm>
                 <a:off x="1485871" y="1422206"/>
-                <a:ext cx="4158041" cy="4862537"/>
+                <a:ext cx="4107829" cy="4862537"/>
                 <a:chOff x="7638057" y="1821707"/>
-                <a:chExt cx="4158041" cy="4862537"/>
+                <a:chExt cx="4107829" cy="4862537"/>
               </a:xfrm>
             </p:grpSpPr>
             <p:grpSp>
@@ -24654,9 +25238,9 @@
               <p:grpSpPr>
                 <a:xfrm>
                   <a:off x="7638058" y="1821707"/>
-                  <a:ext cx="4158040" cy="4862537"/>
+                  <a:ext cx="4107828" cy="4862537"/>
                   <a:chOff x="7638058" y="2626144"/>
-                  <a:chExt cx="4158040" cy="4862537"/>
+                  <a:chExt cx="4107828" cy="4862537"/>
                 </a:xfrm>
               </p:grpSpPr>
               <p:grpSp>
@@ -24674,9 +25258,9 @@
                 <p:grpSpPr>
                   <a:xfrm>
                     <a:off x="7638058" y="2626144"/>
-                    <a:ext cx="4158040" cy="4862537"/>
+                    <a:ext cx="4107828" cy="4862537"/>
                     <a:chOff x="7638058" y="3100704"/>
-                    <a:chExt cx="4158040" cy="4862537"/>
+                    <a:chExt cx="4107828" cy="4862537"/>
                   </a:xfrm>
                 </p:grpSpPr>
                 <p:grpSp>
@@ -24694,9 +25278,9 @@
                   <p:grpSpPr>
                     <a:xfrm>
                       <a:off x="7638058" y="3100704"/>
-                      <a:ext cx="4158040" cy="4862537"/>
+                      <a:ext cx="4107828" cy="4862537"/>
                       <a:chOff x="2833394" y="2299122"/>
-                      <a:chExt cx="4158040" cy="4862537"/>
+                      <a:chExt cx="4107828" cy="4862537"/>
                     </a:xfrm>
                   </p:grpSpPr>
                   <p:sp>
@@ -24829,9 +25413,9 @@
                     <p:grpSpPr>
                       <a:xfrm>
                         <a:off x="2833394" y="2299122"/>
-                        <a:ext cx="4158040" cy="4862537"/>
+                        <a:ext cx="4107828" cy="4862537"/>
                         <a:chOff x="2833394" y="2299122"/>
-                        <a:chExt cx="4158040" cy="4862537"/>
+                        <a:chExt cx="4107828" cy="4862537"/>
                       </a:xfrm>
                     </p:grpSpPr>
                     <p:grpSp>
@@ -24849,9 +25433,9 @@
                       <p:grpSpPr>
                         <a:xfrm>
                           <a:off x="2833394" y="2299122"/>
-                          <a:ext cx="4158040" cy="4862537"/>
+                          <a:ext cx="4107828" cy="4862537"/>
                           <a:chOff x="2833394" y="2299122"/>
-                          <a:chExt cx="4158040" cy="4862537"/>
+                          <a:chExt cx="4107828" cy="4862537"/>
                         </a:xfrm>
                       </p:grpSpPr>
                       <p:grpSp>
@@ -24869,9 +25453,9 @@
                         <p:grpSpPr>
                           <a:xfrm>
                             <a:off x="2838971" y="2299122"/>
-                            <a:ext cx="4152463" cy="4862537"/>
+                            <a:ext cx="4102251" cy="4862537"/>
                             <a:chOff x="2975888" y="2592514"/>
-                            <a:chExt cx="4152463" cy="4862537"/>
+                            <a:chExt cx="4102251" cy="4862537"/>
                           </a:xfrm>
                         </p:grpSpPr>
                         <p:sp>
@@ -24888,8 +25472,8 @@
                           </p:nvSpPr>
                           <p:spPr>
                             <a:xfrm>
-                              <a:off x="3396278" y="2966322"/>
-                              <a:ext cx="3732073" cy="215444"/>
+                              <a:off x="2979076" y="2966322"/>
+                              <a:ext cx="4083651" cy="215444"/>
                             </a:xfrm>
                             <a:prstGeom prst="rect">
                               <a:avLst/>
@@ -24904,14 +25488,44 @@
                             <a:p>
                               <a:pPr algn="ctr"/>
                               <a:r>
-                                <a:rPr lang="fr-FR" sz="800" b="0" dirty="0" err="1">
+                                <a:rPr lang="fr-FR" sz="800" b="0" dirty="0">
                                   <a:solidFill>
                                     <a:srgbClr val="D19A66"/>
                                   </a:solidFill>
                                   <a:effectLst/>
                                   <a:latin typeface="Fira Code" panose="020B0809050000020004" pitchFamily="49" charset="0"/>
                                 </a:rPr>
-                                <a:t>merged</a:t>
+                                <a:t>{s}</a:t>
+                              </a:r>
+                              <a:r>
+                                <a:rPr lang="fr-FR" sz="800" b="0" dirty="0">
+                                  <a:solidFill>
+                                    <a:srgbClr val="98C379"/>
+                                  </a:solidFill>
+                                  <a:effectLst/>
+                                  <a:latin typeface="Fira Code" panose="020B0809050000020004" pitchFamily="49" charset="0"/>
+                                </a:rPr>
+                                <a:t>_</a:t>
+                              </a:r>
+                              <a:r>
+                                <a:rPr lang="fr-FR" sz="800" b="0" dirty="0">
+                                  <a:solidFill>
+                                    <a:srgbClr val="D19A66"/>
+                                  </a:solidFill>
+                                  <a:effectLst/>
+                                  <a:latin typeface="Fira Code" panose="020B0809050000020004" pitchFamily="49" charset="0"/>
+                                </a:rPr>
+                                <a:t>{a}</a:t>
+                              </a:r>
+                              <a:r>
+                                <a:rPr lang="fr-FR" sz="800" b="0" dirty="0">
+                                  <a:solidFill>
+                                    <a:srgbClr val="98C379"/>
+                                  </a:solidFill>
+                                  <a:effectLst/>
+                                  <a:latin typeface="Fira Code" panose="020B0809050000020004" pitchFamily="49" charset="0"/>
+                                </a:rPr>
+                                <a:t>_</a:t>
                               </a:r>
                               <a:r>
                                 <a:rPr lang="fr-FR" sz="800" b="0" dirty="0" err="1">
@@ -24921,7 +25535,7 @@
                                   <a:effectLst/>
                                   <a:latin typeface="Fira Code" panose="020B0809050000020004" pitchFamily="49" charset="0"/>
                                 </a:rPr>
-                                <a:t>_realign.bam</a:t>
+                                <a:t>md_realigned.bam</a:t>
                               </a:r>
                               <a:endParaRPr lang="fr-FR" sz="800" b="0" dirty="0">
                                 <a:solidFill>
@@ -25285,14 +25899,44 @@
                           <a:p>
                             <a:pPr algn="ctr"/>
                             <a:r>
-                              <a:rPr lang="fr-FR" sz="800" b="0" dirty="0" err="1">
+                              <a:rPr lang="fr-FR" sz="800" b="0" dirty="0">
                                 <a:solidFill>
                                   <a:srgbClr val="D19A66"/>
                                 </a:solidFill>
                                 <a:effectLst/>
                                 <a:latin typeface="Fira Code" panose="020B0809050000020004" pitchFamily="49" charset="0"/>
                               </a:rPr>
-                              <a:t>merged</a:t>
+                              <a:t>{s}</a:t>
+                            </a:r>
+                            <a:r>
+                              <a:rPr lang="fr-FR" sz="800" b="0" dirty="0">
+                                <a:solidFill>
+                                  <a:srgbClr val="98C379"/>
+                                </a:solidFill>
+                                <a:effectLst/>
+                                <a:latin typeface="Fira Code" panose="020B0809050000020004" pitchFamily="49" charset="0"/>
+                              </a:rPr>
+                              <a:t>_</a:t>
+                            </a:r>
+                            <a:r>
+                              <a:rPr lang="fr-FR" sz="800" b="0" dirty="0">
+                                <a:solidFill>
+                                  <a:srgbClr val="D19A66"/>
+                                </a:solidFill>
+                                <a:effectLst/>
+                                <a:latin typeface="Fira Code" panose="020B0809050000020004" pitchFamily="49" charset="0"/>
+                              </a:rPr>
+                              <a:t>{a}</a:t>
+                            </a:r>
+                            <a:r>
+                              <a:rPr lang="fr-FR" sz="800" b="0" dirty="0">
+                                <a:solidFill>
+                                  <a:srgbClr val="98C379"/>
+                                </a:solidFill>
+                                <a:effectLst/>
+                                <a:latin typeface="Fira Code" panose="020B0809050000020004" pitchFamily="49" charset="0"/>
+                              </a:rPr>
+                              <a:t>_</a:t>
                             </a:r>
                             <a:r>
                               <a:rPr lang="fr-FR" sz="800" b="0" dirty="0" err="1">
@@ -25302,7 +25946,7 @@
                                 <a:effectLst/>
                                 <a:latin typeface="Fira Code" panose="020B0809050000020004" pitchFamily="49" charset="0"/>
                               </a:rPr>
-                              <a:t>_realign_fixed.bai</a:t>
+                              <a:t>md_realigned_fixed.bai</a:t>
                             </a:r>
                             <a:endParaRPr lang="fr-FR" sz="800" b="0" dirty="0">
                               <a:solidFill>
@@ -25345,14 +25989,44 @@
                         <a:p>
                           <a:pPr algn="ctr"/>
                           <a:r>
-                            <a:rPr lang="fr-FR" sz="800" b="0" dirty="0" err="1">
+                            <a:rPr lang="fr-FR" sz="800" b="0" dirty="0">
                               <a:solidFill>
                                 <a:srgbClr val="D19A66"/>
                               </a:solidFill>
                               <a:effectLst/>
                               <a:latin typeface="Fira Code" panose="020B0809050000020004" pitchFamily="49" charset="0"/>
                             </a:rPr>
-                            <a:t>merged</a:t>
+                            <a:t>{s}</a:t>
+                          </a:r>
+                          <a:r>
+                            <a:rPr lang="fr-FR" sz="800" b="0" dirty="0">
+                              <a:solidFill>
+                                <a:srgbClr val="98C379"/>
+                              </a:solidFill>
+                              <a:effectLst/>
+                              <a:latin typeface="Fira Code" panose="020B0809050000020004" pitchFamily="49" charset="0"/>
+                            </a:rPr>
+                            <a:t>_</a:t>
+                          </a:r>
+                          <a:r>
+                            <a:rPr lang="fr-FR" sz="800" b="0" dirty="0">
+                              <a:solidFill>
+                                <a:srgbClr val="D19A66"/>
+                              </a:solidFill>
+                              <a:effectLst/>
+                              <a:latin typeface="Fira Code" panose="020B0809050000020004" pitchFamily="49" charset="0"/>
+                            </a:rPr>
+                            <a:t>{a}</a:t>
+                          </a:r>
+                          <a:r>
+                            <a:rPr lang="fr-FR" sz="800" b="0" dirty="0">
+                              <a:solidFill>
+                                <a:srgbClr val="98C379"/>
+                              </a:solidFill>
+                              <a:effectLst/>
+                              <a:latin typeface="Fira Code" panose="020B0809050000020004" pitchFamily="49" charset="0"/>
+                            </a:rPr>
+                            <a:t>_</a:t>
                           </a:r>
                           <a:r>
                             <a:rPr lang="fr-FR" sz="800" b="0" dirty="0" err="1">
@@ -25362,7 +26036,7 @@
                               <a:effectLst/>
                               <a:latin typeface="Fira Code" panose="020B0809050000020004" pitchFamily="49" charset="0"/>
                             </a:rPr>
-                            <a:t>_realign_fixed.bam</a:t>
+                            <a:t>md_realigned_fixed.bam</a:t>
                           </a:r>
                           <a:endParaRPr lang="fr-FR" sz="800" b="0" dirty="0">
                             <a:solidFill>
@@ -25788,7 +26462,7 @@
             </p:nvSpPr>
             <p:spPr>
               <a:xfrm>
-                <a:off x="1498773" y="5998519"/>
+                <a:off x="1498773" y="6007228"/>
                 <a:ext cx="4092418" cy="215444"/>
               </a:xfrm>
               <a:prstGeom prst="rect">
@@ -25804,6 +26478,46 @@
               <a:p>
                 <a:pPr algn="ctr"/>
                 <a:r>
+                  <a:rPr lang="fr-FR" sz="800" b="0" dirty="0">
+                    <a:solidFill>
+                      <a:srgbClr val="D19A66"/>
+                    </a:solidFill>
+                    <a:effectLst/>
+                    <a:latin typeface="Fira Code" panose="020B0809050000020004" pitchFamily="49" charset="0"/>
+                  </a:rPr>
+                  <a:t>{s}</a:t>
+                </a:r>
+                <a:r>
+                  <a:rPr lang="fr-FR" sz="800" b="0" dirty="0">
+                    <a:solidFill>
+                      <a:srgbClr val="98C379"/>
+                    </a:solidFill>
+                    <a:effectLst/>
+                    <a:latin typeface="Fira Code" panose="020B0809050000020004" pitchFamily="49" charset="0"/>
+                  </a:rPr>
+                  <a:t>_</a:t>
+                </a:r>
+                <a:r>
+                  <a:rPr lang="fr-FR" sz="800" b="0" dirty="0">
+                    <a:solidFill>
+                      <a:srgbClr val="D19A66"/>
+                    </a:solidFill>
+                    <a:effectLst/>
+                    <a:latin typeface="Fira Code" panose="020B0809050000020004" pitchFamily="49" charset="0"/>
+                  </a:rPr>
+                  <a:t>{s}</a:t>
+                </a:r>
+                <a:r>
+                  <a:rPr lang="fr-FR" sz="800" b="0" dirty="0">
+                    <a:solidFill>
+                      <a:srgbClr val="98C379"/>
+                    </a:solidFill>
+                    <a:effectLst/>
+                    <a:latin typeface="Fira Code" panose="020B0809050000020004" pitchFamily="49" charset="0"/>
+                  </a:rPr>
+                  <a:t>_</a:t>
+                </a:r>
+                <a:r>
                   <a:rPr lang="fr-FR" sz="800" b="0" dirty="0" err="1">
                     <a:solidFill>
                       <a:srgbClr val="98C379"/>
@@ -25811,7 +26525,7 @@
                     <a:effectLst/>
                     <a:latin typeface="Fira Code" panose="020B0809050000020004" pitchFamily="49" charset="0"/>
                   </a:rPr>
-                  <a:t>merged_realign_fixed_bam.idxstats</a:t>
+                  <a:t>md_realigned_fixed.idxstats</a:t>
                 </a:r>
                 <a:endParaRPr lang="fr-FR" sz="800" b="0" dirty="0">
                   <a:solidFill>
@@ -25855,24 +26569,54 @@
           <a:p>
             <a:pPr algn="ctr"/>
             <a:r>
-              <a:rPr lang="fr-FR" sz="800" b="0" dirty="0" err="1">
+              <a:rPr lang="fr-FR" sz="800" b="0" dirty="0">
                 <a:solidFill>
                   <a:srgbClr val="D19A66"/>
                 </a:solidFill>
                 <a:effectLst/>
                 <a:latin typeface="Fira Code" panose="020B0809050000020004" pitchFamily="49" charset="0"/>
               </a:rPr>
-              <a:t>merged</a:t>
-            </a:r>
-            <a:r>
-              <a:rPr lang="fr-FR" sz="800" b="0" dirty="0" err="1">
+              <a:t>{s}</a:t>
+            </a:r>
+            <a:r>
+              <a:rPr lang="fr-FR" sz="800" b="0" dirty="0">
                 <a:solidFill>
                   <a:srgbClr val="98C379"/>
                 </a:solidFill>
                 <a:effectLst/>
                 <a:latin typeface="Fira Code" panose="020B0809050000020004" pitchFamily="49" charset="0"/>
               </a:rPr>
-              <a:t>_realign_fixed.bam</a:t>
+              <a:t>_</a:t>
+            </a:r>
+            <a:r>
+              <a:rPr lang="fr-FR" sz="800" b="0" dirty="0">
+                <a:solidFill>
+                  <a:srgbClr val="D19A66"/>
+                </a:solidFill>
+                <a:effectLst/>
+                <a:latin typeface="Fira Code" panose="020B0809050000020004" pitchFamily="49" charset="0"/>
+              </a:rPr>
+              <a:t>{a}</a:t>
+            </a:r>
+            <a:r>
+              <a:rPr lang="fr-FR" sz="800" b="0" dirty="0">
+                <a:solidFill>
+                  <a:srgbClr val="98C379"/>
+                </a:solidFill>
+                <a:effectLst/>
+                <a:latin typeface="Fira Code" panose="020B0809050000020004" pitchFamily="49" charset="0"/>
+              </a:rPr>
+              <a:t>_</a:t>
+            </a:r>
+            <a:r>
+              <a:rPr lang="fr-FR" sz="800" b="0" dirty="0" err="1">
+                <a:solidFill>
+                  <a:srgbClr val="98C379"/>
+                </a:solidFill>
+                <a:effectLst/>
+                <a:latin typeface="Fira Code" panose="020B0809050000020004" pitchFamily="49" charset="0"/>
+              </a:rPr>
+              <a:t>md_realigned.bam</a:t>
             </a:r>
             <a:endParaRPr lang="fr-FR" sz="800" b="0" dirty="0">
               <a:solidFill>
@@ -25881,6 +26625,109 @@
               <a:effectLst/>
               <a:latin typeface="Fira Code" panose="020B0809050000020004" pitchFamily="49" charset="0"/>
             </a:endParaRPr>
+          </a:p>
+        </p:txBody>
+      </p:sp>
+      <p:sp>
+        <p:nvSpPr>
+          <p:cNvPr id="9" name="ZoneTexte 8">
+            <a:extLst>
+              <a:ext uri="{FF2B5EF4-FFF2-40B4-BE49-F238E27FC236}">
+                <a16:creationId xmlns:a16="http://schemas.microsoft.com/office/drawing/2014/main" id="{367E0160-A7F1-5E61-C40E-AD87D59FB585}"/>
+              </a:ext>
+            </a:extLst>
+          </p:cNvPr>
+          <p:cNvSpPr txBox="1"/>
+          <p:nvPr/>
+        </p:nvSpPr>
+        <p:spPr>
+          <a:xfrm>
+            <a:off x="4809" y="5686576"/>
+            <a:ext cx="1642180" cy="338554"/>
+          </a:xfrm>
+          <a:prstGeom prst="rect">
+            <a:avLst/>
+          </a:prstGeom>
+          <a:noFill/>
+          <a:ln>
+            <a:solidFill>
+              <a:schemeClr val="accent1"/>
+            </a:solidFill>
+          </a:ln>
+        </p:spPr>
+        <p:txBody>
+          <a:bodyPr wrap="square" rtlCol="0">
+            <a:spAutoFit/>
+          </a:bodyPr>
+          <a:lstStyle/>
+          <a:p>
+            <a:r>
+              <a:rPr lang="fr-FR" sz="800" b="0" dirty="0">
+                <a:solidFill>
+                  <a:srgbClr val="D19A66"/>
+                </a:solidFill>
+                <a:effectLst/>
+                <a:latin typeface="Fira Code" panose="020B0809050000020004" pitchFamily="49" charset="0"/>
+              </a:rPr>
+              <a:t>{</a:t>
+            </a:r>
+            <a:r>
+              <a:rPr lang="fr-FR" sz="800" dirty="0">
+                <a:solidFill>
+                  <a:srgbClr val="D19A66"/>
+                </a:solidFill>
+                <a:latin typeface="Fira Code" panose="020B0809050000020004" pitchFamily="49" charset="0"/>
+              </a:rPr>
+              <a:t>s}:</a:t>
+            </a:r>
+            <a:r>
+              <a:rPr lang="fr-FR" sz="800" dirty="0">
+                <a:solidFill>
+                  <a:srgbClr val="98C379"/>
+                </a:solidFill>
+                <a:latin typeface="Fira Code" panose="020B0809050000020004" pitchFamily="49" charset="0"/>
+              </a:rPr>
+              <a:t> {</a:t>
+            </a:r>
+            <a:r>
+              <a:rPr lang="fr-FR" sz="800" dirty="0" err="1">
+                <a:solidFill>
+                  <a:srgbClr val="98C379"/>
+                </a:solidFill>
+                <a:latin typeface="Fira Code" panose="020B0809050000020004" pitchFamily="49" charset="0"/>
+              </a:rPr>
+              <a:t>sample</a:t>
+            </a:r>
+            <a:r>
+              <a:rPr lang="fr-FR" sz="800" dirty="0">
+                <a:solidFill>
+                  <a:srgbClr val="98C379"/>
+                </a:solidFill>
+                <a:latin typeface="Fira Code" panose="020B0809050000020004" pitchFamily="49" charset="0"/>
+              </a:rPr>
+              <a:t>}</a:t>
+            </a:r>
+          </a:p>
+          <a:p>
+            <a:r>
+              <a:rPr lang="fr-FR" sz="800" b="0" dirty="0">
+                <a:solidFill>
+                  <a:srgbClr val="D19A66"/>
+                </a:solidFill>
+                <a:effectLst/>
+                <a:latin typeface="Fira Code" panose="020B0809050000020004" pitchFamily="49" charset="0"/>
+              </a:rPr>
+              <a:t>{a}: </a:t>
+            </a:r>
+            <a:r>
+              <a:rPr lang="fr-FR" sz="800" dirty="0">
+                <a:solidFill>
+                  <a:srgbClr val="98C379"/>
+                </a:solidFill>
+                <a:latin typeface="Fira Code" panose="020B0809050000020004" pitchFamily="49" charset="0"/>
+              </a:rPr>
+              <a:t>{aligner}</a:t>
+            </a:r>
           </a:p>
         </p:txBody>
       </p:sp>
@@ -26314,7 +27161,7 @@
         </p:nvGrpSpPr>
         <p:grpSpPr>
           <a:xfrm>
-            <a:off x="1723733" y="1476050"/>
+            <a:off x="548075" y="1476050"/>
             <a:ext cx="3307488" cy="2358301"/>
             <a:chOff x="190681" y="1150503"/>
             <a:chExt cx="3307488" cy="2358301"/>
@@ -26387,37 +27234,7 @@
                   <a:effectLst/>
                   <a:latin typeface="Fira Code" panose="020B0809050000020004" pitchFamily="49" charset="0"/>
                 </a:rPr>
-                <a:t>_</a:t>
-              </a:r>
-              <a:r>
-                <a:rPr lang="fr-FR" sz="800" b="0" dirty="0">
-                  <a:solidFill>
-                    <a:srgbClr val="D19A66"/>
-                  </a:solidFill>
-                  <a:effectLst/>
-                  <a:latin typeface="Fira Code" panose="020B0809050000020004" pitchFamily="49" charset="0"/>
-                </a:rPr>
-                <a:t>{md}</a:t>
-              </a:r>
-              <a:r>
-                <a:rPr lang="fr-FR" sz="800" b="0" dirty="0">
-                  <a:solidFill>
-                    <a:srgbClr val="98C379"/>
-                  </a:solidFill>
-                  <a:effectLst/>
-                  <a:latin typeface="Fira Code" panose="020B0809050000020004" pitchFamily="49" charset="0"/>
-                </a:rPr>
-                <a:t>_</a:t>
-              </a:r>
-              <a:r>
-                <a:rPr lang="fr-FR" sz="800" b="0" dirty="0">
-                  <a:solidFill>
-                    <a:srgbClr val="D19A66"/>
-                  </a:solidFill>
-                  <a:effectLst/>
-                  <a:latin typeface="Fira Code" panose="020B0809050000020004" pitchFamily="49" charset="0"/>
-                </a:rPr>
-                <a:t>{mc}</a:t>
+                <a:t>.</a:t>
               </a:r>
               <a:r>
                 <a:rPr lang="fr-FR" sz="800" b="0" dirty="0" err="1">
@@ -26427,7 +27244,7 @@
                   <a:effectLst/>
                   <a:latin typeface="Fira Code" panose="020B0809050000020004" pitchFamily="49" charset="0"/>
                 </a:rPr>
-                <a:t>X_indels.vcf</a:t>
+                <a:t>vcf</a:t>
               </a:r>
               <a:endParaRPr lang="fr-FR" sz="800" b="0" dirty="0">
                 <a:solidFill>
@@ -26870,36 +27687,6 @@
                     <a:t>_</a:t>
                   </a:r>
                   <a:r>
-                    <a:rPr lang="fr-FR" sz="800" b="0" dirty="0">
-                      <a:solidFill>
-                        <a:srgbClr val="D19A66"/>
-                      </a:solidFill>
-                      <a:effectLst/>
-                      <a:latin typeface="Fira Code" panose="020B0809050000020004" pitchFamily="49" charset="0"/>
-                    </a:rPr>
-                    <a:t>{md}</a:t>
-                  </a:r>
-                  <a:r>
-                    <a:rPr lang="fr-FR" sz="800" b="0" dirty="0">
-                      <a:solidFill>
-                        <a:srgbClr val="98C379"/>
-                      </a:solidFill>
-                      <a:effectLst/>
-                      <a:latin typeface="Fira Code" panose="020B0809050000020004" pitchFamily="49" charset="0"/>
-                    </a:rPr>
-                    <a:t>_</a:t>
-                  </a:r>
-                  <a:r>
-                    <a:rPr lang="fr-FR" sz="800" b="0" dirty="0">
-                      <a:solidFill>
-                        <a:srgbClr val="D19A66"/>
-                      </a:solidFill>
-                      <a:effectLst/>
-                      <a:latin typeface="Fira Code" panose="020B0809050000020004" pitchFamily="49" charset="0"/>
-                    </a:rPr>
-                    <a:t>{mc}</a:t>
-                  </a:r>
-                  <a:r>
                     <a:rPr lang="fr-FR" sz="800" b="0" dirty="0" err="1">
                       <a:solidFill>
                         <a:srgbClr val="98C379"/>
@@ -26907,7 +27694,7 @@
                       <a:effectLst/>
                       <a:latin typeface="Fira Code" panose="020B0809050000020004" pitchFamily="49" charset="0"/>
                     </a:rPr>
-                    <a:t>X_realign_fixed-mate_sorted.bam</a:t>
+                    <a:t>md_realigned_fixed.bam</a:t>
                   </a:r>
                   <a:endParaRPr lang="fr-FR" sz="800" b="0" dirty="0">
                     <a:solidFill>
@@ -26989,36 +27776,6 @@
                     <a:t>_</a:t>
                   </a:r>
                   <a:r>
-                    <a:rPr lang="fr-FR" sz="800" b="0" dirty="0">
-                      <a:solidFill>
-                        <a:srgbClr val="D19A66"/>
-                      </a:solidFill>
-                      <a:effectLst/>
-                      <a:latin typeface="Fira Code" panose="020B0809050000020004" pitchFamily="49" charset="0"/>
-                    </a:rPr>
-                    <a:t>{md}</a:t>
-                  </a:r>
-                  <a:r>
-                    <a:rPr lang="fr-FR" sz="800" b="0" dirty="0">
-                      <a:solidFill>
-                        <a:srgbClr val="98C379"/>
-                      </a:solidFill>
-                      <a:effectLst/>
-                      <a:latin typeface="Fira Code" panose="020B0809050000020004" pitchFamily="49" charset="0"/>
-                    </a:rPr>
-                    <a:t>_</a:t>
-                  </a:r>
-                  <a:r>
-                    <a:rPr lang="fr-FR" sz="800" b="0" dirty="0">
-                      <a:solidFill>
-                        <a:srgbClr val="D19A66"/>
-                      </a:solidFill>
-                      <a:effectLst/>
-                      <a:latin typeface="Fira Code" panose="020B0809050000020004" pitchFamily="49" charset="0"/>
-                    </a:rPr>
-                    <a:t>{mc}</a:t>
-                  </a:r>
-                  <a:r>
                     <a:rPr lang="fr-FR" sz="800" b="0" dirty="0" err="1">
                       <a:solidFill>
                         <a:srgbClr val="98C379"/>
@@ -27026,7 +27783,7 @@
                       <a:effectLst/>
                       <a:latin typeface="Fira Code" panose="020B0809050000020004" pitchFamily="49" charset="0"/>
                     </a:rPr>
-                    <a:t>X_realign_fixed-mate_sorted.bai</a:t>
+                    <a:t>md_realigned_fixed.bai</a:t>
                   </a:r>
                   <a:endParaRPr lang="fr-FR" sz="800" b="0" dirty="0">
                     <a:solidFill>
@@ -27137,12 +27894,205 @@
           </p:sp>
         </p:grpSp>
       </p:grpSp>
+      <p:cxnSp>
+        <p:nvCxnSpPr>
+          <p:cNvPr id="111" name="Connecteur en angle 110">
+            <a:extLst>
+              <a:ext uri="{FF2B5EF4-FFF2-40B4-BE49-F238E27FC236}">
+                <a16:creationId xmlns:a16="http://schemas.microsoft.com/office/drawing/2014/main" id="{21D3DDBD-930E-9612-3E6D-43653333DA4D}"/>
+              </a:ext>
+            </a:extLst>
+          </p:cNvPr>
+          <p:cNvCxnSpPr>
+            <a:cxnSpLocks/>
+            <a:endCxn id="33" idx="0"/>
+          </p:cNvCxnSpPr>
+          <p:nvPr/>
+        </p:nvCxnSpPr>
+        <p:spPr>
+          <a:xfrm>
+            <a:off x="0" y="1166949"/>
+            <a:ext cx="2202034" cy="309101"/>
+          </a:xfrm>
+          <a:prstGeom prst="bentConnector2">
+            <a:avLst/>
+          </a:prstGeom>
+          <a:ln w="12700">
+            <a:solidFill>
+              <a:schemeClr val="bg1"/>
+            </a:solidFill>
+            <a:tailEnd type="arrow"/>
+          </a:ln>
+        </p:spPr>
+        <p:style>
+          <a:lnRef idx="1">
+            <a:schemeClr val="accent1"/>
+          </a:lnRef>
+          <a:fillRef idx="0">
+            <a:schemeClr val="accent1"/>
+          </a:fillRef>
+          <a:effectRef idx="0">
+            <a:schemeClr val="accent1"/>
+          </a:effectRef>
+          <a:fontRef idx="minor">
+            <a:schemeClr val="tx1"/>
+          </a:fontRef>
+        </p:style>
+      </p:cxnSp>
+      <p:cxnSp>
+        <p:nvCxnSpPr>
+          <p:cNvPr id="115" name="Connecteur en angle 114">
+            <a:extLst>
+              <a:ext uri="{FF2B5EF4-FFF2-40B4-BE49-F238E27FC236}">
+                <a16:creationId xmlns:a16="http://schemas.microsoft.com/office/drawing/2014/main" id="{6B23D0F4-5382-000E-C147-3A36372F4DEF}"/>
+              </a:ext>
+            </a:extLst>
+          </p:cNvPr>
+          <p:cNvCxnSpPr>
+            <a:cxnSpLocks/>
+            <a:endCxn id="15" idx="0"/>
+          </p:cNvCxnSpPr>
+          <p:nvPr/>
+        </p:nvCxnSpPr>
+        <p:spPr>
+          <a:xfrm>
+            <a:off x="3855134" y="2580376"/>
+            <a:ext cx="2183230" cy="382110"/>
+          </a:xfrm>
+          <a:prstGeom prst="bentConnector2">
+            <a:avLst/>
+          </a:prstGeom>
+          <a:ln w="12700">
+            <a:solidFill>
+              <a:schemeClr val="bg1"/>
+            </a:solidFill>
+            <a:tailEnd type="arrow"/>
+          </a:ln>
+        </p:spPr>
+        <p:style>
+          <a:lnRef idx="1">
+            <a:schemeClr val="accent1"/>
+          </a:lnRef>
+          <a:fillRef idx="0">
+            <a:schemeClr val="accent1"/>
+          </a:fillRef>
+          <a:effectRef idx="0">
+            <a:schemeClr val="accent1"/>
+          </a:effectRef>
+          <a:fontRef idx="minor">
+            <a:schemeClr val="tx1"/>
+          </a:fontRef>
+        </p:style>
+      </p:cxnSp>
+      <p:sp>
+        <p:nvSpPr>
+          <p:cNvPr id="51" name="ZoneTexte 50">
+            <a:extLst>
+              <a:ext uri="{FF2B5EF4-FFF2-40B4-BE49-F238E27FC236}">
+                <a16:creationId xmlns:a16="http://schemas.microsoft.com/office/drawing/2014/main" id="{6BB52E0C-24B9-E3DE-0629-4EA880A648DD}"/>
+              </a:ext>
+            </a:extLst>
+          </p:cNvPr>
+          <p:cNvSpPr txBox="1"/>
+          <p:nvPr/>
+        </p:nvSpPr>
+        <p:spPr>
+          <a:xfrm>
+            <a:off x="4809" y="5863037"/>
+            <a:ext cx="1642180" cy="338554"/>
+          </a:xfrm>
+          <a:prstGeom prst="rect">
+            <a:avLst/>
+          </a:prstGeom>
+          <a:noFill/>
+          <a:ln>
+            <a:solidFill>
+              <a:schemeClr val="accent1"/>
+            </a:solidFill>
+          </a:ln>
+        </p:spPr>
+        <p:txBody>
+          <a:bodyPr wrap="square" rtlCol="0">
+            <a:spAutoFit/>
+          </a:bodyPr>
+          <a:lstStyle/>
+          <a:p>
+            <a:r>
+              <a:rPr lang="fr-FR" sz="800" b="0" dirty="0">
+                <a:solidFill>
+                  <a:srgbClr val="D19A66"/>
+                </a:solidFill>
+                <a:effectLst/>
+                <a:latin typeface="Fira Code" panose="020B0809050000020004" pitchFamily="49" charset="0"/>
+              </a:rPr>
+              <a:t>{</a:t>
+            </a:r>
+            <a:r>
+              <a:rPr lang="fr-FR" sz="800" dirty="0">
+                <a:solidFill>
+                  <a:srgbClr val="D19A66"/>
+                </a:solidFill>
+                <a:latin typeface="Fira Code" panose="020B0809050000020004" pitchFamily="49" charset="0"/>
+              </a:rPr>
+              <a:t>s}:</a:t>
+            </a:r>
+            <a:r>
+              <a:rPr lang="fr-FR" sz="800" dirty="0">
+                <a:solidFill>
+                  <a:srgbClr val="98C379"/>
+                </a:solidFill>
+                <a:latin typeface="Fira Code" panose="020B0809050000020004" pitchFamily="49" charset="0"/>
+              </a:rPr>
+              <a:t> {</a:t>
+            </a:r>
+            <a:r>
+              <a:rPr lang="fr-FR" sz="800" dirty="0" err="1">
+                <a:solidFill>
+                  <a:srgbClr val="98C379"/>
+                </a:solidFill>
+                <a:latin typeface="Fira Code" panose="020B0809050000020004" pitchFamily="49" charset="0"/>
+              </a:rPr>
+              <a:t>sample</a:t>
+            </a:r>
+            <a:r>
+              <a:rPr lang="fr-FR" sz="800" dirty="0">
+                <a:solidFill>
+                  <a:srgbClr val="98C379"/>
+                </a:solidFill>
+                <a:latin typeface="Fira Code" panose="020B0809050000020004" pitchFamily="49" charset="0"/>
+              </a:rPr>
+              <a:t>}</a:t>
+            </a:r>
+          </a:p>
+          <a:p>
+            <a:r>
+              <a:rPr lang="fr-FR" sz="800" b="0" dirty="0">
+                <a:solidFill>
+                  <a:srgbClr val="D19A66"/>
+                </a:solidFill>
+                <a:effectLst/>
+                <a:latin typeface="Fira Code" panose="020B0809050000020004" pitchFamily="49" charset="0"/>
+              </a:rPr>
+              <a:t>{a}: </a:t>
+            </a:r>
+            <a:r>
+              <a:rPr lang="fr-FR" sz="800" dirty="0">
+                <a:solidFill>
+                  <a:srgbClr val="98C379"/>
+                </a:solidFill>
+                <a:latin typeface="Fira Code" panose="020B0809050000020004" pitchFamily="49" charset="0"/>
+              </a:rPr>
+              <a:t>{aligner}</a:t>
+            </a:r>
+          </a:p>
+        </p:txBody>
+      </p:sp>
       <p:grpSp>
         <p:nvGrpSpPr>
-          <p:cNvPr id="59" name="Groupe 58">
+          <p:cNvPr id="5" name="Groupe 4">
             <a:extLst>
               <a:ext uri="{FF2B5EF4-FFF2-40B4-BE49-F238E27FC236}">
-                <a16:creationId xmlns:a16="http://schemas.microsoft.com/office/drawing/2014/main" id="{79ED35B2-AB4F-449E-902B-CCDA9709CBF5}"/>
+                <a16:creationId xmlns:a16="http://schemas.microsoft.com/office/drawing/2014/main" id="{B638F7F5-60A4-33B3-D32C-A8D5301084B3}"/>
               </a:ext>
             </a:extLst>
           </p:cNvPr>
@@ -27151,445 +28101,18 @@
         </p:nvGrpSpPr>
         <p:grpSpPr>
           <a:xfrm>
-            <a:off x="6085982" y="2892197"/>
-            <a:ext cx="3718697" cy="2483725"/>
-            <a:chOff x="3151686" y="2052718"/>
-            <a:chExt cx="2512951" cy="2483725"/>
+            <a:off x="4384409" y="2962486"/>
+            <a:ext cx="3307484" cy="1925733"/>
+            <a:chOff x="190685" y="1295185"/>
+            <a:chExt cx="3307484" cy="1925733"/>
           </a:xfrm>
         </p:grpSpPr>
-        <p:grpSp>
-          <p:nvGrpSpPr>
-            <p:cNvPr id="74" name="Groupe 73">
+        <p:sp>
+          <p:nvSpPr>
+            <p:cNvPr id="7" name="ZoneTexte 6">
               <a:extLst>
                 <a:ext uri="{FF2B5EF4-FFF2-40B4-BE49-F238E27FC236}">
-                  <a16:creationId xmlns:a16="http://schemas.microsoft.com/office/drawing/2014/main" id="{45407BCF-FAB2-3116-42E1-3934D9939271}"/>
-                </a:ext>
-              </a:extLst>
-            </p:cNvPr>
-            <p:cNvGrpSpPr/>
-            <p:nvPr/>
-          </p:nvGrpSpPr>
-          <p:grpSpPr>
-            <a:xfrm>
-              <a:off x="3151687" y="2052718"/>
-              <a:ext cx="2512950" cy="2483725"/>
-              <a:chOff x="3288604" y="2346110"/>
-              <a:chExt cx="2512950" cy="2483725"/>
-            </a:xfrm>
-          </p:grpSpPr>
-          <p:sp>
-            <p:nvSpPr>
-              <p:cNvPr id="75" name="ZoneTexte 74">
-                <a:extLst>
-                  <a:ext uri="{FF2B5EF4-FFF2-40B4-BE49-F238E27FC236}">
-                    <a16:creationId xmlns:a16="http://schemas.microsoft.com/office/drawing/2014/main" id="{CF77EDB5-F8C4-A534-CB34-E43A10FF0829}"/>
-                  </a:ext>
-                </a:extLst>
-              </p:cNvPr>
-              <p:cNvSpPr txBox="1"/>
-              <p:nvPr/>
-            </p:nvSpPr>
-            <p:spPr>
-              <a:xfrm>
-                <a:off x="3288604" y="2966322"/>
-                <a:ext cx="2512950" cy="215444"/>
-              </a:xfrm>
-              <a:prstGeom prst="rect">
-                <a:avLst/>
-              </a:prstGeom>
-              <a:noFill/>
-            </p:spPr>
-            <p:txBody>
-              <a:bodyPr wrap="square">
-                <a:spAutoFit/>
-              </a:bodyPr>
-              <a:lstStyle/>
-              <a:p>
-                <a:pPr algn="ctr"/>
-                <a:r>
-                  <a:rPr lang="fr-FR" sz="800" b="0" dirty="0">
-                    <a:solidFill>
-                      <a:srgbClr val="D19A66"/>
-                    </a:solidFill>
-                    <a:effectLst/>
-                    <a:latin typeface="Fira Code" panose="020B0809050000020004" pitchFamily="49" charset="0"/>
-                  </a:rPr>
-                  <a:t>{s}</a:t>
-                </a:r>
-                <a:r>
-                  <a:rPr lang="fr-FR" sz="800" b="0" dirty="0">
-                    <a:solidFill>
-                      <a:srgbClr val="98C379"/>
-                    </a:solidFill>
-                    <a:effectLst/>
-                    <a:latin typeface="Fira Code" panose="020B0809050000020004" pitchFamily="49" charset="0"/>
-                  </a:rPr>
-                  <a:t>_</a:t>
-                </a:r>
-                <a:r>
-                  <a:rPr lang="fr-FR" sz="800" b="0" dirty="0">
-                    <a:solidFill>
-                      <a:srgbClr val="D19A66"/>
-                    </a:solidFill>
-                    <a:effectLst/>
-                    <a:latin typeface="Fira Code" panose="020B0809050000020004" pitchFamily="49" charset="0"/>
-                  </a:rPr>
-                  <a:t>{a}</a:t>
-                </a:r>
-                <a:r>
-                  <a:rPr lang="fr-FR" sz="800" b="0" dirty="0">
-                    <a:solidFill>
-                      <a:srgbClr val="98C379"/>
-                    </a:solidFill>
-                    <a:effectLst/>
-                    <a:latin typeface="Fira Code" panose="020B0809050000020004" pitchFamily="49" charset="0"/>
-                  </a:rPr>
-                  <a:t>_</a:t>
-                </a:r>
-                <a:r>
-                  <a:rPr lang="fr-FR" sz="800" b="0" dirty="0">
-                    <a:solidFill>
-                      <a:srgbClr val="D19A66"/>
-                    </a:solidFill>
-                    <a:effectLst/>
-                    <a:latin typeface="Fira Code" panose="020B0809050000020004" pitchFamily="49" charset="0"/>
-                  </a:rPr>
-                  <a:t>{md}</a:t>
-                </a:r>
-                <a:r>
-                  <a:rPr lang="fr-FR" sz="800" b="0" dirty="0">
-                    <a:solidFill>
-                      <a:srgbClr val="98C379"/>
-                    </a:solidFill>
-                    <a:effectLst/>
-                    <a:latin typeface="Fira Code" panose="020B0809050000020004" pitchFamily="49" charset="0"/>
-                  </a:rPr>
-                  <a:t>_</a:t>
-                </a:r>
-                <a:r>
-                  <a:rPr lang="fr-FR" sz="800" b="0" dirty="0">
-                    <a:solidFill>
-                      <a:srgbClr val="D19A66"/>
-                    </a:solidFill>
-                    <a:effectLst/>
-                    <a:latin typeface="Fira Code" panose="020B0809050000020004" pitchFamily="49" charset="0"/>
-                  </a:rPr>
-                  <a:t>{mc}</a:t>
-                </a:r>
-                <a:r>
-                  <a:rPr lang="fr-FR" sz="800" b="0" dirty="0" err="1">
-                    <a:solidFill>
-                      <a:srgbClr val="98C379"/>
-                    </a:solidFill>
-                    <a:effectLst/>
-                    <a:latin typeface="Fira Code" panose="020B0809050000020004" pitchFamily="49" charset="0"/>
-                  </a:rPr>
-                  <a:t>X_indels.vcf</a:t>
-                </a:r>
-                <a:endParaRPr lang="fr-FR" sz="800" b="0" dirty="0">
-                  <a:solidFill>
-                    <a:srgbClr val="ABB2BF"/>
-                  </a:solidFill>
-                  <a:effectLst/>
-                  <a:latin typeface="Fira Code" panose="020B0809050000020004" pitchFamily="49" charset="0"/>
-                </a:endParaRPr>
-              </a:p>
-            </p:txBody>
-          </p:sp>
-          <p:grpSp>
-            <p:nvGrpSpPr>
-              <p:cNvPr id="80" name="Groupe 79">
-                <a:extLst>
-                  <a:ext uri="{FF2B5EF4-FFF2-40B4-BE49-F238E27FC236}">
-                    <a16:creationId xmlns:a16="http://schemas.microsoft.com/office/drawing/2014/main" id="{D3DCDF37-D7EF-4F79-748B-05A758A1582B}"/>
-                  </a:ext>
-                </a:extLst>
-              </p:cNvPr>
-              <p:cNvGrpSpPr/>
-              <p:nvPr/>
-            </p:nvGrpSpPr>
-            <p:grpSpPr>
-              <a:xfrm>
-                <a:off x="3288604" y="2346110"/>
-                <a:ext cx="2512950" cy="2483725"/>
-                <a:chOff x="7555043" y="2292581"/>
-                <a:chExt cx="2512950" cy="2483725"/>
-              </a:xfrm>
-            </p:grpSpPr>
-            <p:sp>
-              <p:nvSpPr>
-                <p:cNvPr id="85" name="ZoneTexte 84">
-                  <a:extLst>
-                    <a:ext uri="{FF2B5EF4-FFF2-40B4-BE49-F238E27FC236}">
-                      <a16:creationId xmlns:a16="http://schemas.microsoft.com/office/drawing/2014/main" id="{3E637C89-7D0B-0938-E670-57B8CD0BF6C8}"/>
-                    </a:ext>
-                  </a:extLst>
-                </p:cNvPr>
-                <p:cNvSpPr txBox="1"/>
-                <p:nvPr/>
-              </p:nvSpPr>
-              <p:spPr>
-                <a:xfrm>
-                  <a:off x="7743739" y="3657143"/>
-                  <a:ext cx="2156421" cy="230832"/>
-                </a:xfrm>
-                <a:prstGeom prst="rect">
-                  <a:avLst/>
-                </a:prstGeom>
-                <a:noFill/>
-              </p:spPr>
-              <p:txBody>
-                <a:bodyPr wrap="square" rtlCol="0">
-                  <a:spAutoFit/>
-                </a:bodyPr>
-                <a:lstStyle/>
-                <a:p>
-                  <a:pPr algn="ctr"/>
-                  <a:r>
-                    <a:rPr lang="en-US" sz="900" dirty="0" err="1">
-                      <a:solidFill>
-                        <a:srgbClr val="FF0000"/>
-                      </a:solidFill>
-                      <a:latin typeface="Menlo" panose="020B0609030804020204" pitchFamily="49" charset="0"/>
-                      <a:ea typeface="Menlo" panose="020B0609030804020204" pitchFamily="49" charset="0"/>
-                      <a:cs typeface="Menlo" panose="020B0609030804020204" pitchFamily="49" charset="0"/>
-                    </a:rPr>
-                    <a:t>gatk</a:t>
-                  </a:r>
-                  <a:r>
-                    <a:rPr lang="en-US" sz="900" dirty="0">
-                      <a:solidFill>
-                        <a:srgbClr val="FF0000"/>
-                      </a:solidFill>
-                      <a:latin typeface="Menlo" panose="020B0609030804020204" pitchFamily="49" charset="0"/>
-                      <a:ea typeface="Menlo" panose="020B0609030804020204" pitchFamily="49" charset="0"/>
-                      <a:cs typeface="Menlo" panose="020B0609030804020204" pitchFamily="49" charset="0"/>
-                    </a:rPr>
-                    <a:t> </a:t>
-                  </a:r>
-                  <a:r>
-                    <a:rPr lang="en-US" sz="900" dirty="0" err="1">
-                      <a:solidFill>
-                        <a:srgbClr val="FF0000"/>
-                      </a:solidFill>
-                      <a:latin typeface="Menlo" panose="020B0609030804020204" pitchFamily="49" charset="0"/>
-                      <a:ea typeface="Menlo" panose="020B0609030804020204" pitchFamily="49" charset="0"/>
-                      <a:cs typeface="Menlo" panose="020B0609030804020204" pitchFamily="49" charset="0"/>
-                    </a:rPr>
-                    <a:t>Variantfiltration</a:t>
-                  </a:r>
-                  <a:endParaRPr lang="en-US" sz="900" dirty="0">
-                    <a:solidFill>
-                      <a:srgbClr val="FF0000"/>
-                    </a:solidFill>
-                    <a:latin typeface="SF Pro Display" pitchFamily="2" charset="0"/>
-                    <a:ea typeface="SF Pro Display" pitchFamily="2" charset="0"/>
-                    <a:cs typeface="SF Pro Display" pitchFamily="2" charset="0"/>
-                  </a:endParaRPr>
-                </a:p>
-              </p:txBody>
-            </p:sp>
-            <p:sp>
-              <p:nvSpPr>
-                <p:cNvPr id="86" name="ZoneTexte 85">
-                  <a:extLst>
-                    <a:ext uri="{FF2B5EF4-FFF2-40B4-BE49-F238E27FC236}">
-                      <a16:creationId xmlns:a16="http://schemas.microsoft.com/office/drawing/2014/main" id="{9E5B4929-D356-47DA-3556-0C3900E4D450}"/>
-                    </a:ext>
-                  </a:extLst>
-                </p:cNvPr>
-                <p:cNvSpPr txBox="1"/>
-                <p:nvPr/>
-              </p:nvSpPr>
-              <p:spPr>
-                <a:xfrm>
-                  <a:off x="7555043" y="2292581"/>
-                  <a:ext cx="2512950" cy="507831"/>
-                </a:xfrm>
-                <a:prstGeom prst="rect">
-                  <a:avLst/>
-                </a:prstGeom>
-                <a:noFill/>
-              </p:spPr>
-              <p:txBody>
-                <a:bodyPr wrap="square" rtlCol="0">
-                  <a:spAutoFit/>
-                </a:bodyPr>
-                <a:lstStyle/>
-                <a:p>
-                  <a:pPr algn="ctr"/>
-                  <a:r>
-                    <a:rPr lang="fr-FR" sz="900" dirty="0">
-                      <a:solidFill>
-                        <a:schemeClr val="accent6"/>
-                      </a:solidFill>
-                      <a:latin typeface="SF Pro Display" pitchFamily="2" charset="0"/>
-                      <a:ea typeface="SF Pro Display" pitchFamily="2" charset="0"/>
-                      <a:cs typeface="SF Pro Display" pitchFamily="2" charset="0"/>
-                    </a:rPr>
-                    <a:t>HARD FILTERING</a:t>
-                  </a:r>
-                </a:p>
-                <a:p>
-                  <a:pPr algn="ctr"/>
-                  <a:r>
-                    <a:rPr lang="fr-FR" sz="900" b="0" dirty="0" err="1">
-                      <a:solidFill>
-                        <a:schemeClr val="bg1"/>
-                      </a:solidFill>
-                      <a:effectLst/>
-                      <a:latin typeface="SF Pro Display" pitchFamily="2" charset="0"/>
-                      <a:ea typeface="SF Pro Display" pitchFamily="2" charset="0"/>
-                      <a:cs typeface="SF Pro Display" pitchFamily="2" charset="0"/>
-                    </a:rPr>
-                    <a:t>Filter</a:t>
-                  </a:r>
-                  <a:r>
-                    <a:rPr lang="fr-FR" sz="900" b="0" dirty="0">
-                      <a:solidFill>
-                        <a:schemeClr val="bg1"/>
-                      </a:solidFill>
-                      <a:effectLst/>
-                      <a:latin typeface="SF Pro Display" pitchFamily="2" charset="0"/>
-                      <a:ea typeface="SF Pro Display" pitchFamily="2" charset="0"/>
-                      <a:cs typeface="SF Pro Display" pitchFamily="2" charset="0"/>
-                    </a:rPr>
-                    <a:t> variant calls </a:t>
-                  </a:r>
-                  <a:r>
-                    <a:rPr lang="fr-FR" sz="900" b="0" dirty="0" err="1">
-                      <a:solidFill>
-                        <a:schemeClr val="bg1"/>
-                      </a:solidFill>
-                      <a:effectLst/>
-                      <a:latin typeface="SF Pro Display" pitchFamily="2" charset="0"/>
-                      <a:ea typeface="SF Pro Display" pitchFamily="2" charset="0"/>
-                      <a:cs typeface="SF Pro Display" pitchFamily="2" charset="0"/>
-                    </a:rPr>
-                    <a:t>based</a:t>
-                  </a:r>
-                  <a:r>
-                    <a:rPr lang="fr-FR" sz="900" b="0" dirty="0">
-                      <a:solidFill>
-                        <a:schemeClr val="bg1"/>
-                      </a:solidFill>
-                      <a:effectLst/>
-                      <a:latin typeface="SF Pro Display" pitchFamily="2" charset="0"/>
-                      <a:ea typeface="SF Pro Display" pitchFamily="2" charset="0"/>
-                      <a:cs typeface="SF Pro Display" pitchFamily="2" charset="0"/>
-                    </a:rPr>
-                    <a:t> on INFO and/or FORMAT annotations</a:t>
-                  </a:r>
-                </a:p>
-              </p:txBody>
-            </p:sp>
-            <p:sp>
-              <p:nvSpPr>
-                <p:cNvPr id="87" name="Rectangle 86">
-                  <a:extLst>
-                    <a:ext uri="{FF2B5EF4-FFF2-40B4-BE49-F238E27FC236}">
-                      <a16:creationId xmlns:a16="http://schemas.microsoft.com/office/drawing/2014/main" id="{F46A396C-BAB7-C8DC-CA67-6F3165D1E02A}"/>
-                    </a:ext>
-                  </a:extLst>
-                </p:cNvPr>
-                <p:cNvSpPr/>
-                <p:nvPr/>
-              </p:nvSpPr>
-              <p:spPr>
-                <a:xfrm>
-                  <a:off x="7555043" y="2805514"/>
-                  <a:ext cx="2512950" cy="1970792"/>
-                </a:xfrm>
-                <a:prstGeom prst="rect">
-                  <a:avLst/>
-                </a:prstGeom>
-                <a:noFill/>
-                <a:ln>
-                  <a:solidFill>
-                    <a:schemeClr val="bg1"/>
-                  </a:solidFill>
-                </a:ln>
-              </p:spPr>
-              <p:style>
-                <a:lnRef idx="2">
-                  <a:schemeClr val="accent1">
-                    <a:shade val="50000"/>
-                  </a:schemeClr>
-                </a:lnRef>
-                <a:fillRef idx="1">
-                  <a:schemeClr val="accent1"/>
-                </a:fillRef>
-                <a:effectRef idx="0">
-                  <a:schemeClr val="accent1"/>
-                </a:effectRef>
-                <a:fontRef idx="minor">
-                  <a:schemeClr val="lt1"/>
-                </a:fontRef>
-              </p:style>
-              <p:txBody>
-                <a:bodyPr rtlCol="0" anchor="ctr"/>
-                <a:lstStyle/>
-                <a:p>
-                  <a:pPr algn="ctr"/>
-                  <a:endParaRPr lang="fr-FR" dirty="0"/>
-                </a:p>
-              </p:txBody>
-            </p:sp>
-            <p:sp>
-              <p:nvSpPr>
-                <p:cNvPr id="88" name="Rectangle 87">
-                  <a:extLst>
-                    <a:ext uri="{FF2B5EF4-FFF2-40B4-BE49-F238E27FC236}">
-                      <a16:creationId xmlns:a16="http://schemas.microsoft.com/office/drawing/2014/main" id="{30C4441D-704E-9285-2222-9295DA124FBC}"/>
-                    </a:ext>
-                  </a:extLst>
-                </p:cNvPr>
-                <p:cNvSpPr/>
-                <p:nvPr/>
-              </p:nvSpPr>
-              <p:spPr>
-                <a:xfrm>
-                  <a:off x="7743739" y="3438186"/>
-                  <a:ext cx="2156421" cy="681059"/>
-                </a:xfrm>
-                <a:prstGeom prst="rect">
-                  <a:avLst/>
-                </a:prstGeom>
-                <a:noFill/>
-              </p:spPr>
-              <p:style>
-                <a:lnRef idx="2">
-                  <a:schemeClr val="accent1">
-                    <a:shade val="50000"/>
-                  </a:schemeClr>
-                </a:lnRef>
-                <a:fillRef idx="1">
-                  <a:schemeClr val="accent1"/>
-                </a:fillRef>
-                <a:effectRef idx="0">
-                  <a:schemeClr val="accent1"/>
-                </a:effectRef>
-                <a:fontRef idx="minor">
-                  <a:schemeClr val="lt1"/>
-                </a:fontRef>
-              </p:style>
-              <p:txBody>
-                <a:bodyPr rtlCol="0" anchor="ctr"/>
-                <a:lstStyle/>
-                <a:p>
-                  <a:pPr algn="ctr"/>
-                  <a:endParaRPr lang="fr-FR" dirty="0"/>
-                </a:p>
-              </p:txBody>
-            </p:sp>
-          </p:grpSp>
-        </p:grpSp>
-        <p:sp>
-          <p:nvSpPr>
-            <p:cNvPr id="69" name="ZoneTexte 68">
-              <a:extLst>
-                <a:ext uri="{FF2B5EF4-FFF2-40B4-BE49-F238E27FC236}">
-                  <a16:creationId xmlns:a16="http://schemas.microsoft.com/office/drawing/2014/main" id="{DFE5322E-6AE6-638D-D970-91A2E62D023D}"/>
+                  <a16:creationId xmlns:a16="http://schemas.microsoft.com/office/drawing/2014/main" id="{F5050122-BD73-EE27-DEAD-9EC33560208F}"/>
                 </a:ext>
               </a:extLst>
             </p:cNvPr>
@@ -27598,8 +28121,8 @@
           </p:nvSpPr>
           <p:spPr>
             <a:xfrm>
-              <a:off x="3151686" y="4104525"/>
-              <a:ext cx="2512951" cy="215444"/>
+              <a:off x="190686" y="2754152"/>
+              <a:ext cx="3307057" cy="215444"/>
             </a:xfrm>
             <a:prstGeom prst="rect">
               <a:avLst/>
@@ -27651,37 +28174,7 @@
                   <a:effectLst/>
                   <a:latin typeface="Fira Code" panose="020B0809050000020004" pitchFamily="49" charset="0"/>
                 </a:rPr>
-                <a:t>_</a:t>
-              </a:r>
-              <a:r>
-                <a:rPr lang="fr-FR" sz="800" b="0" dirty="0">
-                  <a:solidFill>
-                    <a:srgbClr val="D19A66"/>
-                  </a:solidFill>
-                  <a:effectLst/>
-                  <a:latin typeface="Fira Code" panose="020B0809050000020004" pitchFamily="49" charset="0"/>
-                </a:rPr>
-                <a:t>{md}</a:t>
-              </a:r>
-              <a:r>
-                <a:rPr lang="fr-FR" sz="800" b="0" dirty="0">
-                  <a:solidFill>
-                    <a:srgbClr val="98C379"/>
-                  </a:solidFill>
-                  <a:effectLst/>
-                  <a:latin typeface="Fira Code" panose="020B0809050000020004" pitchFamily="49" charset="0"/>
-                </a:rPr>
-                <a:t>_</a:t>
-              </a:r>
-              <a:r>
-                <a:rPr lang="fr-FR" sz="800" b="0" dirty="0">
-                  <a:solidFill>
-                    <a:srgbClr val="D19A66"/>
-                  </a:solidFill>
-                  <a:effectLst/>
-                  <a:latin typeface="Fira Code" panose="020B0809050000020004" pitchFamily="49" charset="0"/>
-                </a:rPr>
-                <a:t>{mc}</a:t>
+                <a:t>.</a:t>
               </a:r>
               <a:r>
                 <a:rPr lang="fr-FR" sz="800" b="0" dirty="0" err="1">
@@ -27691,7 +28184,7 @@
                   <a:effectLst/>
                   <a:latin typeface="Fira Code" panose="020B0809050000020004" pitchFamily="49" charset="0"/>
                 </a:rPr>
-                <a:t>X_hardfiltered.vcf</a:t>
+                <a:t>vcf.gz</a:t>
               </a:r>
               <a:endParaRPr lang="fr-FR" sz="800" b="0" dirty="0">
                 <a:solidFill>
@@ -27703,29 +28196,384 @@
             </a:p>
           </p:txBody>
         </p:sp>
+        <p:grpSp>
+          <p:nvGrpSpPr>
+            <p:cNvPr id="8" name="Groupe 7">
+              <a:extLst>
+                <a:ext uri="{FF2B5EF4-FFF2-40B4-BE49-F238E27FC236}">
+                  <a16:creationId xmlns:a16="http://schemas.microsoft.com/office/drawing/2014/main" id="{563DB41B-D1CF-7AA5-AB9C-C0FD2A9F04C2}"/>
+                </a:ext>
+              </a:extLst>
+            </p:cNvPr>
+            <p:cNvGrpSpPr/>
+            <p:nvPr/>
+          </p:nvGrpSpPr>
+          <p:grpSpPr>
+            <a:xfrm>
+              <a:off x="190685" y="1295185"/>
+              <a:ext cx="3307484" cy="1925733"/>
+              <a:chOff x="130428" y="1236296"/>
+              <a:chExt cx="2490528" cy="1137491"/>
+            </a:xfrm>
+          </p:grpSpPr>
+          <p:grpSp>
+            <p:nvGrpSpPr>
+              <p:cNvPr id="9" name="Groupe 8">
+                <a:extLst>
+                  <a:ext uri="{FF2B5EF4-FFF2-40B4-BE49-F238E27FC236}">
+                    <a16:creationId xmlns:a16="http://schemas.microsoft.com/office/drawing/2014/main" id="{40E17576-714E-D238-3A2D-DE919C0461A3}"/>
+                  </a:ext>
+                </a:extLst>
+              </p:cNvPr>
+              <p:cNvGrpSpPr/>
+              <p:nvPr/>
+            </p:nvGrpSpPr>
+            <p:grpSpPr>
+              <a:xfrm>
+                <a:off x="130749" y="1236296"/>
+                <a:ext cx="2490207" cy="1137491"/>
+                <a:chOff x="127001" y="1228245"/>
+                <a:chExt cx="3009831" cy="1240433"/>
+              </a:xfrm>
+            </p:grpSpPr>
+            <p:grpSp>
+              <p:nvGrpSpPr>
+                <p:cNvPr id="12" name="Groupe 11">
+                  <a:extLst>
+                    <a:ext uri="{FF2B5EF4-FFF2-40B4-BE49-F238E27FC236}">
+                      <a16:creationId xmlns:a16="http://schemas.microsoft.com/office/drawing/2014/main" id="{0192A5EC-7857-A5E8-0C61-74C6C06DC727}"/>
+                    </a:ext>
+                  </a:extLst>
+                </p:cNvPr>
+                <p:cNvGrpSpPr/>
+                <p:nvPr/>
+              </p:nvGrpSpPr>
+              <p:grpSpPr>
+                <a:xfrm>
+                  <a:off x="127001" y="1228245"/>
+                  <a:ext cx="3009831" cy="1240433"/>
+                  <a:chOff x="374651" y="1751447"/>
+                  <a:chExt cx="3009831" cy="1602231"/>
+                </a:xfrm>
+              </p:grpSpPr>
+              <p:sp>
+                <p:nvSpPr>
+                  <p:cNvPr id="15" name="ZoneTexte 14">
+                    <a:extLst>
+                      <a:ext uri="{FF2B5EF4-FFF2-40B4-BE49-F238E27FC236}">
+                        <a16:creationId xmlns:a16="http://schemas.microsoft.com/office/drawing/2014/main" id="{F2B30F8E-8771-3C68-CA43-37771EF89B95}"/>
+                      </a:ext>
+                    </a:extLst>
+                  </p:cNvPr>
+                  <p:cNvSpPr txBox="1"/>
+                  <p:nvPr/>
+                </p:nvSpPr>
+                <p:spPr>
+                  <a:xfrm>
+                    <a:off x="374651" y="1751447"/>
+                    <a:ext cx="3009831" cy="192054"/>
+                  </a:xfrm>
+                  <a:prstGeom prst="rect">
+                    <a:avLst/>
+                  </a:prstGeom>
+                  <a:noFill/>
+                </p:spPr>
+                <p:txBody>
+                  <a:bodyPr wrap="square" rtlCol="0">
+                    <a:spAutoFit/>
+                  </a:bodyPr>
+                  <a:lstStyle/>
+                  <a:p>
+                    <a:pPr algn="ctr"/>
+                    <a:r>
+                      <a:rPr lang="fr-FR" sz="900" dirty="0">
+                        <a:solidFill>
+                          <a:schemeClr val="accent6"/>
+                        </a:solidFill>
+                        <a:latin typeface="SF Pro Display" pitchFamily="2" charset="0"/>
+                        <a:ea typeface="SF Pro Display" pitchFamily="2" charset="0"/>
+                        <a:cs typeface="SF Pro Display" pitchFamily="2" charset="0"/>
+                      </a:rPr>
+                      <a:t>VCF COMPRESSION</a:t>
+                    </a:r>
+                  </a:p>
+                </p:txBody>
+              </p:sp>
+              <p:sp>
+                <p:nvSpPr>
+                  <p:cNvPr id="16" name="Rectangle 15">
+                    <a:extLst>
+                      <a:ext uri="{FF2B5EF4-FFF2-40B4-BE49-F238E27FC236}">
+                        <a16:creationId xmlns:a16="http://schemas.microsoft.com/office/drawing/2014/main" id="{B9B8ABFD-67DB-DA80-7E1C-C19C39ABE6FE}"/>
+                      </a:ext>
+                    </a:extLst>
+                  </p:cNvPr>
+                  <p:cNvSpPr/>
+                  <p:nvPr/>
+                </p:nvSpPr>
+                <p:spPr>
+                  <a:xfrm>
+                    <a:off x="374651" y="1953483"/>
+                    <a:ext cx="3009830" cy="1400195"/>
+                  </a:xfrm>
+                  <a:prstGeom prst="rect">
+                    <a:avLst/>
+                  </a:prstGeom>
+                  <a:noFill/>
+                  <a:ln>
+                    <a:solidFill>
+                      <a:schemeClr val="bg1"/>
+                    </a:solidFill>
+                  </a:ln>
+                </p:spPr>
+                <p:style>
+                  <a:lnRef idx="2">
+                    <a:schemeClr val="accent1">
+                      <a:shade val="50000"/>
+                    </a:schemeClr>
+                  </a:lnRef>
+                  <a:fillRef idx="1">
+                    <a:schemeClr val="accent1"/>
+                  </a:fillRef>
+                  <a:effectRef idx="0">
+                    <a:schemeClr val="accent1"/>
+                  </a:effectRef>
+                  <a:fontRef idx="minor">
+                    <a:schemeClr val="lt1"/>
+                  </a:fontRef>
+                </p:style>
+                <p:txBody>
+                  <a:bodyPr rtlCol="0" anchor="ctr"/>
+                  <a:lstStyle/>
+                  <a:p>
+                    <a:pPr algn="ctr"/>
+                    <a:endParaRPr lang="fr-FR" sz="1400" dirty="0">
+                      <a:latin typeface="SF Pro Display" pitchFamily="2" charset="0"/>
+                      <a:ea typeface="SF Pro Display" pitchFamily="2" charset="0"/>
+                      <a:cs typeface="SF Pro Display" pitchFamily="2" charset="0"/>
+                    </a:endParaRPr>
+                  </a:p>
+                </p:txBody>
+              </p:sp>
+            </p:grpSp>
+            <p:sp>
+              <p:nvSpPr>
+                <p:cNvPr id="13" name="ZoneTexte 12">
+                  <a:extLst>
+                    <a:ext uri="{FF2B5EF4-FFF2-40B4-BE49-F238E27FC236}">
+                      <a16:creationId xmlns:a16="http://schemas.microsoft.com/office/drawing/2014/main" id="{92868257-00D8-57BD-C1B0-32687C7ABE7A}"/>
+                    </a:ext>
+                  </a:extLst>
+                </p:cNvPr>
+                <p:cNvSpPr txBox="1"/>
+                <p:nvPr/>
+              </p:nvSpPr>
+              <p:spPr>
+                <a:xfrm>
+                  <a:off x="538986" y="1801423"/>
+                  <a:ext cx="2073364" cy="148687"/>
+                </a:xfrm>
+                <a:prstGeom prst="rect">
+                  <a:avLst/>
+                </a:prstGeom>
+                <a:noFill/>
+              </p:spPr>
+              <p:txBody>
+                <a:bodyPr wrap="square" rtlCol="0">
+                  <a:spAutoFit/>
+                </a:bodyPr>
+                <a:lstStyle/>
+                <a:p>
+                  <a:pPr algn="ctr"/>
+                  <a:r>
+                    <a:rPr lang="en-US" sz="900" dirty="0" err="1">
+                      <a:solidFill>
+                        <a:srgbClr val="FF0000"/>
+                      </a:solidFill>
+                      <a:latin typeface="Menlo" panose="020B0609030804020204" pitchFamily="49" charset="0"/>
+                      <a:ea typeface="Menlo" panose="020B0609030804020204" pitchFamily="49" charset="0"/>
+                      <a:cs typeface="Menlo" panose="020B0609030804020204" pitchFamily="49" charset="0"/>
+                    </a:rPr>
+                    <a:t>bcftools</a:t>
+                  </a:r>
+                  <a:r>
+                    <a:rPr lang="en-US" sz="900" dirty="0">
+                      <a:solidFill>
+                        <a:srgbClr val="FF0000"/>
+                      </a:solidFill>
+                      <a:latin typeface="Menlo" panose="020B0609030804020204" pitchFamily="49" charset="0"/>
+                      <a:ea typeface="Menlo" panose="020B0609030804020204" pitchFamily="49" charset="0"/>
+                      <a:cs typeface="Menlo" panose="020B0609030804020204" pitchFamily="49" charset="0"/>
+                    </a:rPr>
+                    <a:t> view</a:t>
+                  </a:r>
+                </a:p>
+              </p:txBody>
+            </p:sp>
+          </p:grpSp>
+          <p:sp>
+            <p:nvSpPr>
+              <p:cNvPr id="10" name="ZoneTexte 9">
+                <a:extLst>
+                  <a:ext uri="{FF2B5EF4-FFF2-40B4-BE49-F238E27FC236}">
+                    <a16:creationId xmlns:a16="http://schemas.microsoft.com/office/drawing/2014/main" id="{09C586F6-0CC5-413D-F28F-A118365958FA}"/>
+                  </a:ext>
+                </a:extLst>
+              </p:cNvPr>
+              <p:cNvSpPr txBox="1"/>
+              <p:nvPr/>
+            </p:nvSpPr>
+            <p:spPr>
+              <a:xfrm>
+                <a:off x="130428" y="1462127"/>
+                <a:ext cx="2490207" cy="127258"/>
+              </a:xfrm>
+              <a:prstGeom prst="rect">
+                <a:avLst/>
+              </a:prstGeom>
+              <a:noFill/>
+            </p:spPr>
+            <p:txBody>
+              <a:bodyPr wrap="square" rtlCol="0">
+                <a:spAutoFit/>
+              </a:bodyPr>
+              <a:lstStyle/>
+              <a:p>
+                <a:pPr algn="ctr"/>
+                <a:r>
+                  <a:rPr lang="fr-FR" sz="800" b="0" dirty="0">
+                    <a:solidFill>
+                      <a:srgbClr val="D19A66"/>
+                    </a:solidFill>
+                    <a:effectLst/>
+                    <a:latin typeface="Fira Code" panose="020B0809050000020004" pitchFamily="49" charset="0"/>
+                  </a:rPr>
+                  <a:t>{s}</a:t>
+                </a:r>
+                <a:r>
+                  <a:rPr lang="fr-FR" sz="800" b="0" dirty="0">
+                    <a:solidFill>
+                      <a:srgbClr val="98C379"/>
+                    </a:solidFill>
+                    <a:effectLst/>
+                    <a:latin typeface="Fira Code" panose="020B0809050000020004" pitchFamily="49" charset="0"/>
+                  </a:rPr>
+                  <a:t>_</a:t>
+                </a:r>
+                <a:r>
+                  <a:rPr lang="fr-FR" sz="800" b="0" dirty="0">
+                    <a:solidFill>
+                      <a:srgbClr val="D19A66"/>
+                    </a:solidFill>
+                    <a:effectLst/>
+                    <a:latin typeface="Fira Code" panose="020B0809050000020004" pitchFamily="49" charset="0"/>
+                  </a:rPr>
+                  <a:t>{a}</a:t>
+                </a:r>
+                <a:r>
+                  <a:rPr lang="fr-FR" sz="800" b="0" dirty="0">
+                    <a:solidFill>
+                      <a:srgbClr val="98C379"/>
+                    </a:solidFill>
+                    <a:effectLst/>
+                    <a:latin typeface="Fira Code" panose="020B0809050000020004" pitchFamily="49" charset="0"/>
+                  </a:rPr>
+                  <a:t>.</a:t>
+                </a:r>
+                <a:r>
+                  <a:rPr lang="fr-FR" sz="800" b="0" dirty="0" err="1">
+                    <a:solidFill>
+                      <a:srgbClr val="98C379"/>
+                    </a:solidFill>
+                    <a:effectLst/>
+                    <a:latin typeface="Fira Code" panose="020B0809050000020004" pitchFamily="49" charset="0"/>
+                  </a:rPr>
+                  <a:t>vcf</a:t>
+                </a:r>
+                <a:endParaRPr lang="fr-FR" sz="800" b="0" dirty="0">
+                  <a:solidFill>
+                    <a:srgbClr val="ABB2BF"/>
+                  </a:solidFill>
+                  <a:effectLst/>
+                  <a:latin typeface="Fira Code" panose="020B0809050000020004" pitchFamily="49" charset="0"/>
+                </a:endParaRPr>
+              </a:p>
+            </p:txBody>
+          </p:sp>
+          <p:sp>
+            <p:nvSpPr>
+              <p:cNvPr id="11" name="Rectangle 10">
+                <a:extLst>
+                  <a:ext uri="{FF2B5EF4-FFF2-40B4-BE49-F238E27FC236}">
+                    <a16:creationId xmlns:a16="http://schemas.microsoft.com/office/drawing/2014/main" id="{2DFD593F-F09D-223B-7E30-B961FF1E30B5}"/>
+                  </a:ext>
+                </a:extLst>
+              </p:cNvPr>
+              <p:cNvSpPr/>
+              <p:nvPr/>
+            </p:nvSpPr>
+            <p:spPr>
+              <a:xfrm>
+                <a:off x="471652" y="1685369"/>
+                <a:ext cx="1728872" cy="275160"/>
+              </a:xfrm>
+              <a:prstGeom prst="rect">
+                <a:avLst/>
+              </a:prstGeom>
+              <a:noFill/>
+            </p:spPr>
+            <p:style>
+              <a:lnRef idx="2">
+                <a:schemeClr val="accent1">
+                  <a:shade val="50000"/>
+                </a:schemeClr>
+              </a:lnRef>
+              <a:fillRef idx="1">
+                <a:schemeClr val="accent1"/>
+              </a:fillRef>
+              <a:effectRef idx="0">
+                <a:schemeClr val="accent1"/>
+              </a:effectRef>
+              <a:fontRef idx="minor">
+                <a:schemeClr val="lt1"/>
+              </a:fontRef>
+            </p:style>
+            <p:txBody>
+              <a:bodyPr rtlCol="0" anchor="ctr"/>
+              <a:lstStyle/>
+              <a:p>
+                <a:pPr algn="ctr"/>
+                <a:endParaRPr lang="fr-FR" dirty="0"/>
+              </a:p>
+            </p:txBody>
+          </p:sp>
+        </p:grpSp>
       </p:grpSp>
       <p:cxnSp>
         <p:nvCxnSpPr>
-          <p:cNvPr id="111" name="Connecteur en angle 110">
+          <p:cNvPr id="30" name="Connecteur en angle 29">
             <a:extLst>
               <a:ext uri="{FF2B5EF4-FFF2-40B4-BE49-F238E27FC236}">
-                <a16:creationId xmlns:a16="http://schemas.microsoft.com/office/drawing/2014/main" id="{21D3DDBD-930E-9612-3E6D-43653333DA4D}"/>
+                <a16:creationId xmlns:a16="http://schemas.microsoft.com/office/drawing/2014/main" id="{568717FF-736D-12CE-A84A-3156E1CA5CD0}"/>
               </a:ext>
             </a:extLst>
           </p:cNvPr>
           <p:cNvCxnSpPr>
             <a:cxnSpLocks/>
-            <a:endCxn id="33" idx="0"/>
+            <a:endCxn id="41" idx="0"/>
           </p:cNvCxnSpPr>
           <p:nvPr/>
         </p:nvCxnSpPr>
         <p:spPr>
-          <a:xfrm>
-            <a:off x="17302" y="1138009"/>
-            <a:ext cx="3360390" cy="338041"/>
+          <a:xfrm flipV="1">
+            <a:off x="7691467" y="3656446"/>
+            <a:ext cx="2250787" cy="64544"/>
           </a:xfrm>
-          <a:prstGeom prst="bentConnector2">
-            <a:avLst/>
+          <a:prstGeom prst="bentConnector4">
+            <a:avLst>
+              <a:gd name="adj1" fmla="val 13732"/>
+              <a:gd name="adj2" fmla="val 454177"/>
+            </a:avLst>
           </a:prstGeom>
           <a:ln w="12700">
             <a:solidFill>
@@ -27749,1193 +28597,400 @@
           </a:fontRef>
         </p:style>
       </p:cxnSp>
-      <p:cxnSp>
-        <p:nvCxnSpPr>
-          <p:cNvPr id="115" name="Connecteur en angle 114">
+      <p:grpSp>
+        <p:nvGrpSpPr>
+          <p:cNvPr id="35" name="Groupe 34">
             <a:extLst>
               <a:ext uri="{FF2B5EF4-FFF2-40B4-BE49-F238E27FC236}">
-                <a16:creationId xmlns:a16="http://schemas.microsoft.com/office/drawing/2014/main" id="{6B23D0F4-5382-000E-C147-3A36372F4DEF}"/>
+                <a16:creationId xmlns:a16="http://schemas.microsoft.com/office/drawing/2014/main" id="{253D8A5A-B2E3-6D03-16DA-68071AA4D4C7}"/>
               </a:ext>
             </a:extLst>
           </p:cNvPr>
-          <p:cNvCxnSpPr>
-            <a:cxnSpLocks/>
-          </p:cNvCxnSpPr>
+          <p:cNvGrpSpPr/>
           <p:nvPr/>
-        </p:nvCxnSpPr>
-        <p:spPr>
+        </p:nvGrpSpPr>
+        <p:grpSpPr>
           <a:xfrm>
-            <a:off x="5031220" y="2565452"/>
-            <a:ext cx="2914111" cy="242892"/>
+            <a:off x="8309600" y="3656446"/>
+            <a:ext cx="3265306" cy="2211723"/>
+            <a:chOff x="3151686" y="2324720"/>
+            <a:chExt cx="2512951" cy="2211723"/>
           </a:xfrm>
-          <a:prstGeom prst="bentConnector2">
-            <a:avLst/>
-          </a:prstGeom>
-          <a:ln w="12700">
-            <a:solidFill>
-              <a:schemeClr val="bg1"/>
-            </a:solidFill>
-            <a:tailEnd type="arrow"/>
-          </a:ln>
-        </p:spPr>
-        <p:style>
-          <a:lnRef idx="1">
-            <a:schemeClr val="accent1"/>
-          </a:lnRef>
-          <a:fillRef idx="0">
-            <a:schemeClr val="accent1"/>
-          </a:fillRef>
-          <a:effectRef idx="0">
-            <a:schemeClr val="accent1"/>
-          </a:effectRef>
-          <a:fontRef idx="minor">
-            <a:schemeClr val="tx1"/>
-          </a:fontRef>
-        </p:style>
-      </p:cxnSp>
-      <p:cxnSp>
-        <p:nvCxnSpPr>
-          <p:cNvPr id="124" name="Connecteur en angle 123">
-            <a:extLst>
-              <a:ext uri="{FF2B5EF4-FFF2-40B4-BE49-F238E27FC236}">
-                <a16:creationId xmlns:a16="http://schemas.microsoft.com/office/drawing/2014/main" id="{FAE9078B-4E10-79E2-3BDB-5FE0E1F78474}"/>
-              </a:ext>
-            </a:extLst>
-          </p:cNvPr>
-          <p:cNvCxnSpPr>
-            <a:cxnSpLocks/>
-          </p:cNvCxnSpPr>
-          <p:nvPr/>
-        </p:nvCxnSpPr>
-        <p:spPr>
-          <a:xfrm flipV="1">
-            <a:off x="5858867" y="5375922"/>
-            <a:ext cx="1545906" cy="251161"/>
-          </a:xfrm>
-          <a:prstGeom prst="bentConnector3">
-            <a:avLst>
-              <a:gd name="adj1" fmla="val 50000"/>
-            </a:avLst>
-          </a:prstGeom>
-          <a:ln w="12700">
-            <a:solidFill>
-              <a:schemeClr val="bg1"/>
-            </a:solidFill>
-          </a:ln>
-        </p:spPr>
-        <p:style>
-          <a:lnRef idx="1">
-            <a:schemeClr val="accent1"/>
-          </a:lnRef>
-          <a:fillRef idx="0">
-            <a:schemeClr val="accent1"/>
-          </a:fillRef>
-          <a:effectRef idx="0">
-            <a:schemeClr val="accent1"/>
-          </a:effectRef>
-          <a:fontRef idx="minor">
-            <a:schemeClr val="tx1"/>
-          </a:fontRef>
-        </p:style>
-      </p:cxnSp>
-      <p:sp>
-        <p:nvSpPr>
-          <p:cNvPr id="126" name="ZoneTexte 125">
-            <a:extLst>
-              <a:ext uri="{FF2B5EF4-FFF2-40B4-BE49-F238E27FC236}">
-                <a16:creationId xmlns:a16="http://schemas.microsoft.com/office/drawing/2014/main" id="{E032582F-5DC8-1DFE-795B-40445218F550}"/>
-              </a:ext>
-            </a:extLst>
-          </p:cNvPr>
-          <p:cNvSpPr txBox="1"/>
-          <p:nvPr/>
-        </p:nvSpPr>
-        <p:spPr>
-          <a:xfrm>
-            <a:off x="5816986" y="5602701"/>
-            <a:ext cx="6137604" cy="1277273"/>
-          </a:xfrm>
-          <a:prstGeom prst="rect">
-            <a:avLst/>
-          </a:prstGeom>
-          <a:noFill/>
-        </p:spPr>
-        <p:txBody>
-          <a:bodyPr wrap="square" rtlCol="0">
-            <a:spAutoFit/>
-          </a:bodyPr>
-          <a:lstStyle/>
-          <a:p>
-            <a:r>
-              <a:rPr lang="en-US" sz="700" b="1" i="1" dirty="0" err="1">
-                <a:solidFill>
-                  <a:srgbClr val="FF0000"/>
-                </a:solidFill>
-                <a:latin typeface="Menlo" panose="020B0609030804020204" pitchFamily="49" charset="0"/>
-                <a:ea typeface="Menlo" panose="020B0609030804020204" pitchFamily="49" charset="0"/>
-                <a:cs typeface="Menlo" panose="020B0609030804020204" pitchFamily="49" charset="0"/>
-              </a:rPr>
-              <a:t>config.yaml</a:t>
-            </a:r>
-            <a:r>
-              <a:rPr lang="en-US" sz="700" b="1" i="1" dirty="0">
-                <a:solidFill>
-                  <a:srgbClr val="FF0000"/>
-                </a:solidFill>
-                <a:latin typeface="Menlo" panose="020B0609030804020204" pitchFamily="49" charset="0"/>
-                <a:ea typeface="Menlo" panose="020B0609030804020204" pitchFamily="49" charset="0"/>
-                <a:cs typeface="Menlo" panose="020B0609030804020204" pitchFamily="49" charset="0"/>
-              </a:rPr>
-              <a:t>:</a:t>
-            </a:r>
-          </a:p>
-          <a:p>
-            <a:r>
-              <a:rPr lang="en-US" sz="700" i="1" dirty="0">
-                <a:solidFill>
-                  <a:schemeClr val="bg1"/>
-                </a:solidFill>
-                <a:latin typeface="Menlo" panose="020B0609030804020204" pitchFamily="49" charset="0"/>
-                <a:ea typeface="Menlo" panose="020B0609030804020204" pitchFamily="49" charset="0"/>
-                <a:cs typeface="Menlo" panose="020B0609030804020204" pitchFamily="49" charset="0"/>
-              </a:rPr>
-              <a:t>filtering:</a:t>
-            </a:r>
-          </a:p>
-          <a:p>
-            <a:pPr>
-              <a:tabLst>
-                <a:tab pos="174625" algn="l"/>
-              </a:tabLst>
-            </a:pPr>
-            <a:r>
-              <a:rPr lang="en-US" sz="700" i="1" dirty="0">
-                <a:solidFill>
-                  <a:schemeClr val="bg1"/>
-                </a:solidFill>
-                <a:latin typeface="Menlo" panose="020B0609030804020204" pitchFamily="49" charset="0"/>
-                <a:ea typeface="Menlo" panose="020B0609030804020204" pitchFamily="49" charset="0"/>
-                <a:cs typeface="Menlo" panose="020B0609030804020204" pitchFamily="49" charset="0"/>
-              </a:rPr>
-              <a:t>	</a:t>
-            </a:r>
-            <a:r>
-              <a:rPr lang="en-US" sz="700" i="1" dirty="0" err="1">
-                <a:solidFill>
-                  <a:schemeClr val="bg1"/>
-                </a:solidFill>
-                <a:latin typeface="Menlo" panose="020B0609030804020204" pitchFamily="49" charset="0"/>
-                <a:ea typeface="Menlo" panose="020B0609030804020204" pitchFamily="49" charset="0"/>
-                <a:cs typeface="Menlo" panose="020B0609030804020204" pitchFamily="49" charset="0"/>
-              </a:rPr>
-              <a:t>vqsr</a:t>
-            </a:r>
-            <a:r>
-              <a:rPr lang="en-US" sz="700" i="1" dirty="0">
-                <a:solidFill>
-                  <a:schemeClr val="bg1"/>
-                </a:solidFill>
-                <a:latin typeface="Menlo" panose="020B0609030804020204" pitchFamily="49" charset="0"/>
-                <a:ea typeface="Menlo" panose="020B0609030804020204" pitchFamily="49" charset="0"/>
-                <a:cs typeface="Menlo" panose="020B0609030804020204" pitchFamily="49" charset="0"/>
-              </a:rPr>
-              <a:t>: false</a:t>
-            </a:r>
-          </a:p>
-          <a:p>
-            <a:pPr>
-              <a:tabLst>
-                <a:tab pos="174625" algn="l"/>
-              </a:tabLst>
-            </a:pPr>
-            <a:r>
-              <a:rPr lang="en-US" sz="700" i="1" dirty="0">
-                <a:solidFill>
-                  <a:schemeClr val="bg1"/>
-                </a:solidFill>
-                <a:latin typeface="Menlo" panose="020B0609030804020204" pitchFamily="49" charset="0"/>
-                <a:ea typeface="Menlo" panose="020B0609030804020204" pitchFamily="49" charset="0"/>
-                <a:cs typeface="Menlo" panose="020B0609030804020204" pitchFamily="49" charset="0"/>
-              </a:rPr>
-              <a:t>	hard:</a:t>
-            </a:r>
-          </a:p>
-          <a:p>
-            <a:pPr>
-              <a:tabLst>
-                <a:tab pos="174625" algn="l"/>
-                <a:tab pos="444500" algn="l"/>
-              </a:tabLst>
-            </a:pPr>
-            <a:r>
-              <a:rPr lang="en-US" sz="700" b="0" i="1" dirty="0">
-                <a:solidFill>
-                  <a:schemeClr val="bg1"/>
-                </a:solidFill>
-                <a:effectLst/>
-                <a:latin typeface="Menlo" panose="020B0609030804020204" pitchFamily="49" charset="0"/>
-                <a:ea typeface="Menlo" panose="020B0609030804020204" pitchFamily="49" charset="0"/>
-                <a:cs typeface="Menlo" panose="020B0609030804020204" pitchFamily="49" charset="0"/>
-              </a:rPr>
-              <a:t>	</a:t>
-            </a:r>
-            <a:r>
-              <a:rPr lang="en-US" sz="700" i="1" dirty="0">
-                <a:solidFill>
-                  <a:schemeClr val="bg1"/>
-                </a:solidFill>
-                <a:latin typeface="Menlo" panose="020B0609030804020204" pitchFamily="49" charset="0"/>
-                <a:ea typeface="Menlo" panose="020B0609030804020204" pitchFamily="49" charset="0"/>
-                <a:cs typeface="Menlo" panose="020B0609030804020204" pitchFamily="49" charset="0"/>
-              </a:rPr>
-              <a:t>	</a:t>
-            </a:r>
-            <a:r>
-              <a:rPr lang="en-US" sz="700" i="1" dirty="0" err="1">
-                <a:solidFill>
-                  <a:schemeClr val="bg1"/>
-                </a:solidFill>
-                <a:latin typeface="Menlo" panose="020B0609030804020204" pitchFamily="49" charset="0"/>
-                <a:ea typeface="Menlo" panose="020B0609030804020204" pitchFamily="49" charset="0"/>
-                <a:cs typeface="Menlo" panose="020B0609030804020204" pitchFamily="49" charset="0"/>
-              </a:rPr>
-              <a:t>snvs</a:t>
-            </a:r>
-            <a:r>
-              <a:rPr lang="en-US" sz="700" i="1" dirty="0">
-                <a:solidFill>
-                  <a:schemeClr val="bg1"/>
-                </a:solidFill>
-                <a:latin typeface="Menlo" panose="020B0609030804020204" pitchFamily="49" charset="0"/>
-                <a:ea typeface="Menlo" panose="020B0609030804020204" pitchFamily="49" charset="0"/>
-                <a:cs typeface="Menlo" panose="020B0609030804020204" pitchFamily="49" charset="0"/>
-              </a:rPr>
-              <a:t>:</a:t>
-            </a:r>
-          </a:p>
-          <a:p>
-            <a:pPr>
-              <a:tabLst>
-                <a:tab pos="663575" algn="l"/>
-              </a:tabLst>
-            </a:pPr>
-            <a:r>
-              <a:rPr lang="en-US" sz="700" i="1" dirty="0">
-                <a:solidFill>
-                  <a:schemeClr val="bg1"/>
-                </a:solidFill>
-                <a:latin typeface="Menlo" panose="020B0609030804020204" pitchFamily="49" charset="0"/>
-                <a:ea typeface="Menlo" panose="020B0609030804020204" pitchFamily="49" charset="0"/>
-                <a:cs typeface="Menlo" panose="020B0609030804020204" pitchFamily="49" charset="0"/>
-              </a:rPr>
-              <a:t>	</a:t>
-            </a:r>
-            <a:r>
-              <a:rPr lang="fr-FR" sz="700" b="0" dirty="0">
+        </p:grpSpPr>
+        <p:grpSp>
+          <p:nvGrpSpPr>
+            <p:cNvPr id="36" name="Groupe 35">
+              <a:extLst>
+                <a:ext uri="{FF2B5EF4-FFF2-40B4-BE49-F238E27FC236}">
+                  <a16:creationId xmlns:a16="http://schemas.microsoft.com/office/drawing/2014/main" id="{775389C6-6BFF-9916-85CB-83E759A09C64}"/>
+                </a:ext>
+              </a:extLst>
+            </p:cNvPr>
+            <p:cNvGrpSpPr/>
+            <p:nvPr/>
+          </p:nvGrpSpPr>
+          <p:grpSpPr>
+            <a:xfrm>
+              <a:off x="3151687" y="2324720"/>
+              <a:ext cx="2512950" cy="2211723"/>
+              <a:chOff x="3288604" y="2618112"/>
+              <a:chExt cx="2512950" cy="2211723"/>
+            </a:xfrm>
+          </p:grpSpPr>
+          <p:sp>
+            <p:nvSpPr>
+              <p:cNvPr id="38" name="ZoneTexte 37">
+                <a:extLst>
+                  <a:ext uri="{FF2B5EF4-FFF2-40B4-BE49-F238E27FC236}">
+                    <a16:creationId xmlns:a16="http://schemas.microsoft.com/office/drawing/2014/main" id="{BE02FA17-22D0-3E50-E9EB-9050629CBC79}"/>
+                  </a:ext>
+                </a:extLst>
+              </p:cNvPr>
+              <p:cNvSpPr txBox="1"/>
+              <p:nvPr/>
+            </p:nvSpPr>
+            <p:spPr>
+              <a:xfrm>
+                <a:off x="3288604" y="2966322"/>
+                <a:ext cx="2512950" cy="461665"/>
+              </a:xfrm>
+              <a:prstGeom prst="rect">
+                <a:avLst/>
+              </a:prstGeom>
+              <a:noFill/>
+            </p:spPr>
+            <p:txBody>
+              <a:bodyPr wrap="square">
+                <a:spAutoFit/>
+              </a:bodyPr>
+              <a:lstStyle/>
+              <a:p>
+                <a:pPr algn="ctr"/>
+                <a:r>
+                  <a:rPr lang="fr-FR" sz="800" dirty="0" err="1">
+                    <a:solidFill>
+                      <a:srgbClr val="D19A66"/>
+                    </a:solidFill>
+                    <a:latin typeface="Fira Code" panose="020B0809050000020004" pitchFamily="49" charset="0"/>
+                  </a:rPr>
+                  <a:t>fastqc</a:t>
+                </a:r>
+                <a:endParaRPr lang="fr-FR" sz="800" dirty="0">
+                  <a:solidFill>
+                    <a:srgbClr val="D19A66"/>
+                  </a:solidFill>
+                  <a:latin typeface="Fira Code" panose="020B0809050000020004" pitchFamily="49" charset="0"/>
+                </a:endParaRPr>
+              </a:p>
+              <a:p>
+                <a:pPr algn="ctr"/>
+                <a:r>
+                  <a:rPr lang="fr-FR" sz="800" b="0" dirty="0" err="1">
+                    <a:solidFill>
+                      <a:srgbClr val="D19A66"/>
+                    </a:solidFill>
+                    <a:effectLst/>
+                    <a:latin typeface="Fira Code" panose="020B0809050000020004" pitchFamily="49" charset="0"/>
+                  </a:rPr>
+                  <a:t>fastq</a:t>
+                </a:r>
+                <a:r>
+                  <a:rPr lang="fr-FR" sz="800" b="0" dirty="0">
+                    <a:solidFill>
+                      <a:srgbClr val="D19A66"/>
+                    </a:solidFill>
+                    <a:effectLst/>
+                    <a:latin typeface="Fira Code" panose="020B0809050000020004" pitchFamily="49" charset="0"/>
+                  </a:rPr>
+                  <a:t>-screen</a:t>
+                </a:r>
+              </a:p>
+              <a:p>
+                <a:pPr algn="ctr"/>
+                <a:r>
+                  <a:rPr lang="fr-FR" sz="800" dirty="0" err="1">
+                    <a:solidFill>
+                      <a:srgbClr val="D19A66"/>
+                    </a:solidFill>
+                    <a:latin typeface="Fira Code" panose="020B0809050000020004" pitchFamily="49" charset="0"/>
+                  </a:rPr>
+                  <a:t>qualimap</a:t>
+                </a:r>
+                <a:endParaRPr lang="fr-FR" sz="800" b="0" dirty="0">
+                  <a:solidFill>
+                    <a:srgbClr val="ABB2BF"/>
+                  </a:solidFill>
+                  <a:effectLst/>
+                  <a:latin typeface="Fira Code" panose="020B0809050000020004" pitchFamily="49" charset="0"/>
+                </a:endParaRPr>
+              </a:p>
+            </p:txBody>
+          </p:sp>
+          <p:grpSp>
+            <p:nvGrpSpPr>
+              <p:cNvPr id="39" name="Groupe 38">
+                <a:extLst>
+                  <a:ext uri="{FF2B5EF4-FFF2-40B4-BE49-F238E27FC236}">
+                    <a16:creationId xmlns:a16="http://schemas.microsoft.com/office/drawing/2014/main" id="{3E345BB7-7623-C925-6F13-C286E53B2F5E}"/>
+                  </a:ext>
+                </a:extLst>
+              </p:cNvPr>
+              <p:cNvGrpSpPr/>
+              <p:nvPr/>
+            </p:nvGrpSpPr>
+            <p:grpSpPr>
+              <a:xfrm>
+                <a:off x="3288604" y="2618112"/>
+                <a:ext cx="2512950" cy="2211723"/>
+                <a:chOff x="7555043" y="2564583"/>
+                <a:chExt cx="2512950" cy="2211723"/>
+              </a:xfrm>
+            </p:grpSpPr>
+            <p:sp>
+              <p:nvSpPr>
+                <p:cNvPr id="40" name="ZoneTexte 39">
+                  <a:extLst>
+                    <a:ext uri="{FF2B5EF4-FFF2-40B4-BE49-F238E27FC236}">
+                      <a16:creationId xmlns:a16="http://schemas.microsoft.com/office/drawing/2014/main" id="{3E0550D3-F398-3D80-9561-251D5051EE78}"/>
+                    </a:ext>
+                  </a:extLst>
+                </p:cNvPr>
+                <p:cNvSpPr txBox="1"/>
+                <p:nvPr/>
+              </p:nvSpPr>
+              <p:spPr>
+                <a:xfrm>
+                  <a:off x="7743739" y="3657143"/>
+                  <a:ext cx="2156421" cy="230832"/>
+                </a:xfrm>
+                <a:prstGeom prst="rect">
+                  <a:avLst/>
+                </a:prstGeom>
+                <a:noFill/>
+              </p:spPr>
+              <p:txBody>
+                <a:bodyPr wrap="square" rtlCol="0">
+                  <a:spAutoFit/>
+                </a:bodyPr>
+                <a:lstStyle/>
+                <a:p>
+                  <a:pPr algn="ctr"/>
+                  <a:r>
+                    <a:rPr lang="en-US" sz="900" dirty="0" err="1">
+                      <a:solidFill>
+                        <a:srgbClr val="FF0000"/>
+                      </a:solidFill>
+                      <a:latin typeface="Menlo" panose="020B0609030804020204" pitchFamily="49" charset="0"/>
+                      <a:ea typeface="Menlo" panose="020B0609030804020204" pitchFamily="49" charset="0"/>
+                      <a:cs typeface="Menlo" panose="020B0609030804020204" pitchFamily="49" charset="0"/>
+                    </a:rPr>
+                    <a:t>multiqc</a:t>
+                  </a:r>
+                  <a:endParaRPr lang="en-US" sz="900" dirty="0">
+                    <a:solidFill>
+                      <a:srgbClr val="FF0000"/>
+                    </a:solidFill>
+                    <a:latin typeface="SF Pro Display" pitchFamily="2" charset="0"/>
+                    <a:ea typeface="SF Pro Display" pitchFamily="2" charset="0"/>
+                    <a:cs typeface="SF Pro Display" pitchFamily="2" charset="0"/>
+                  </a:endParaRPr>
+                </a:p>
+              </p:txBody>
+            </p:sp>
+            <p:sp>
+              <p:nvSpPr>
+                <p:cNvPr id="41" name="ZoneTexte 40">
+                  <a:extLst>
+                    <a:ext uri="{FF2B5EF4-FFF2-40B4-BE49-F238E27FC236}">
+                      <a16:creationId xmlns:a16="http://schemas.microsoft.com/office/drawing/2014/main" id="{9772237E-31DA-2C6F-2E7D-D3D032B1AA6B}"/>
+                    </a:ext>
+                  </a:extLst>
+                </p:cNvPr>
+                <p:cNvSpPr txBox="1"/>
+                <p:nvPr/>
+              </p:nvSpPr>
+              <p:spPr>
+                <a:xfrm>
+                  <a:off x="7555043" y="2564583"/>
+                  <a:ext cx="2512950" cy="230832"/>
+                </a:xfrm>
+                <a:prstGeom prst="rect">
+                  <a:avLst/>
+                </a:prstGeom>
+                <a:noFill/>
+              </p:spPr>
+              <p:txBody>
+                <a:bodyPr wrap="square" rtlCol="0">
+                  <a:spAutoFit/>
+                </a:bodyPr>
+                <a:lstStyle/>
+                <a:p>
+                  <a:pPr algn="ctr"/>
+                  <a:r>
+                    <a:rPr lang="fr-FR" sz="900" dirty="0">
+                      <a:solidFill>
+                        <a:schemeClr val="accent2"/>
+                      </a:solidFill>
+                      <a:latin typeface="SF Pro Display" pitchFamily="2" charset="0"/>
+                      <a:ea typeface="SF Pro Display" pitchFamily="2" charset="0"/>
+                      <a:cs typeface="SF Pro Display" pitchFamily="2" charset="0"/>
+                    </a:rPr>
+                    <a:t>MULTIQC REPORT</a:t>
+                  </a:r>
+                </a:p>
+              </p:txBody>
+            </p:sp>
+            <p:sp>
+              <p:nvSpPr>
+                <p:cNvPr id="42" name="Rectangle 41">
+                  <a:extLst>
+                    <a:ext uri="{FF2B5EF4-FFF2-40B4-BE49-F238E27FC236}">
+                      <a16:creationId xmlns:a16="http://schemas.microsoft.com/office/drawing/2014/main" id="{0115DB79-2D3B-F73F-6A39-CBAC67A0157D}"/>
+                    </a:ext>
+                  </a:extLst>
+                </p:cNvPr>
+                <p:cNvSpPr/>
+                <p:nvPr/>
+              </p:nvSpPr>
+              <p:spPr>
+                <a:xfrm>
+                  <a:off x="7555043" y="2805514"/>
+                  <a:ext cx="2512950" cy="1970792"/>
+                </a:xfrm>
+                <a:prstGeom prst="rect">
+                  <a:avLst/>
+                </a:prstGeom>
+                <a:noFill/>
+                <a:ln>
+                  <a:solidFill>
+                    <a:schemeClr val="bg1"/>
+                  </a:solidFill>
+                </a:ln>
+              </p:spPr>
+              <p:style>
+                <a:lnRef idx="2">
+                  <a:schemeClr val="accent1">
+                    <a:shade val="50000"/>
+                  </a:schemeClr>
+                </a:lnRef>
+                <a:fillRef idx="1">
+                  <a:schemeClr val="accent1"/>
+                </a:fillRef>
+                <a:effectRef idx="0">
+                  <a:schemeClr val="accent1"/>
+                </a:effectRef>
+                <a:fontRef idx="minor">
+                  <a:schemeClr val="lt1"/>
+                </a:fontRef>
+              </p:style>
+              <p:txBody>
+                <a:bodyPr rtlCol="0" anchor="ctr"/>
+                <a:lstStyle/>
+                <a:p>
+                  <a:pPr algn="ctr"/>
+                  <a:endParaRPr lang="fr-FR" dirty="0"/>
+                </a:p>
+              </p:txBody>
+            </p:sp>
+            <p:sp>
+              <p:nvSpPr>
+                <p:cNvPr id="43" name="Rectangle 42">
+                  <a:extLst>
+                    <a:ext uri="{FF2B5EF4-FFF2-40B4-BE49-F238E27FC236}">
+                      <a16:creationId xmlns:a16="http://schemas.microsoft.com/office/drawing/2014/main" id="{D6C8080F-E8FC-CC66-4141-9A7CFDC716E6}"/>
+                    </a:ext>
+                  </a:extLst>
+                </p:cNvPr>
+                <p:cNvSpPr/>
+                <p:nvPr/>
+              </p:nvSpPr>
+              <p:spPr>
+                <a:xfrm>
+                  <a:off x="7743739" y="3438186"/>
+                  <a:ext cx="2156421" cy="681059"/>
+                </a:xfrm>
+                <a:prstGeom prst="rect">
+                  <a:avLst/>
+                </a:prstGeom>
+                <a:noFill/>
+              </p:spPr>
+              <p:style>
+                <a:lnRef idx="2">
+                  <a:schemeClr val="accent1">
+                    <a:shade val="50000"/>
+                  </a:schemeClr>
+                </a:lnRef>
+                <a:fillRef idx="1">
+                  <a:schemeClr val="accent1"/>
+                </a:fillRef>
+                <a:effectRef idx="0">
+                  <a:schemeClr val="accent1"/>
+                </a:effectRef>
+                <a:fontRef idx="minor">
+                  <a:schemeClr val="lt1"/>
+                </a:fontRef>
+              </p:style>
+              <p:txBody>
+                <a:bodyPr rtlCol="0" anchor="ctr"/>
+                <a:lstStyle/>
+                <a:p>
+                  <a:pPr algn="ctr"/>
+                  <a:endParaRPr lang="fr-FR" dirty="0"/>
+                </a:p>
+              </p:txBody>
+            </p:sp>
+          </p:grpSp>
+        </p:grpSp>
+        <p:sp>
+          <p:nvSpPr>
+            <p:cNvPr id="37" name="ZoneTexte 36">
+              <a:extLst>
+                <a:ext uri="{FF2B5EF4-FFF2-40B4-BE49-F238E27FC236}">
+                  <a16:creationId xmlns:a16="http://schemas.microsoft.com/office/drawing/2014/main" id="{B724B976-6CB8-AD07-D519-F800486A82D8}"/>
+                </a:ext>
+              </a:extLst>
+            </p:cNvPr>
+            <p:cNvSpPr txBox="1"/>
+            <p:nvPr/>
+          </p:nvSpPr>
+          <p:spPr>
+            <a:xfrm>
+              <a:off x="3151686" y="4104525"/>
+              <a:ext cx="2512951" cy="215444"/>
+            </a:xfrm>
+            <a:prstGeom prst="rect">
+              <a:avLst/>
+            </a:prstGeom>
+            <a:noFill/>
+          </p:spPr>
+          <p:txBody>
+            <a:bodyPr wrap="square" rtlCol="0">
+              <a:spAutoFit/>
+            </a:bodyPr>
+            <a:lstStyle/>
+            <a:p>
+              <a:pPr algn="ctr"/>
+              <a:r>
+                <a:rPr lang="fr-FR" sz="800" b="0" dirty="0">
+                  <a:solidFill>
+                    <a:srgbClr val="D19A66"/>
+                  </a:solidFill>
+                  <a:effectLst/>
+                  <a:latin typeface="Fira Code" panose="020B0809050000020004" pitchFamily="49" charset="0"/>
+                </a:rPr>
+                <a:t>html file</a:t>
+              </a:r>
+              <a:endParaRPr lang="fr-FR" sz="800" b="0" dirty="0">
                 <a:solidFill>
                   <a:srgbClr val="ABB2BF"/>
-                </a:solidFill>
-                <a:effectLst/>
-                <a:latin typeface="Menlo" panose="020B0609030804020204" pitchFamily="49" charset="0"/>
-                <a:ea typeface="Menlo" panose="020B0609030804020204" pitchFamily="49" charset="0"/>
-                <a:cs typeface="Menlo" panose="020B0609030804020204" pitchFamily="49" charset="0"/>
-              </a:rPr>
-              <a:t>{</a:t>
-            </a:r>
-          </a:p>
-          <a:p>
-            <a:pPr>
-              <a:tabLst>
-                <a:tab pos="663575" algn="l"/>
-              </a:tabLst>
-            </a:pPr>
-            <a:r>
-              <a:rPr lang="fr-FR" sz="700" dirty="0">
-                <a:solidFill>
-                  <a:srgbClr val="98C379"/>
-                </a:solidFill>
-                <a:latin typeface="Menlo" panose="020B0609030804020204" pitchFamily="49" charset="0"/>
-                <a:ea typeface="Menlo" panose="020B0609030804020204" pitchFamily="49" charset="0"/>
-                <a:cs typeface="Menlo" panose="020B0609030804020204" pitchFamily="49" charset="0"/>
-              </a:rPr>
-              <a:t>	 </a:t>
-            </a:r>
-            <a:r>
-              <a:rPr lang="fr-FR" sz="700" b="0" dirty="0">
-                <a:solidFill>
-                  <a:srgbClr val="98C379"/>
-                </a:solidFill>
-                <a:effectLst/>
-                <a:latin typeface="Menlo" panose="020B0609030804020204" pitchFamily="49" charset="0"/>
-                <a:ea typeface="Menlo" panose="020B0609030804020204" pitchFamily="49" charset="0"/>
-                <a:cs typeface="Menlo" panose="020B0609030804020204" pitchFamily="49" charset="0"/>
-              </a:rPr>
-              <a:t> "</a:t>
-            </a:r>
-            <a:r>
-              <a:rPr lang="fr-FR" sz="700" b="0" dirty="0" err="1">
-                <a:solidFill>
-                  <a:srgbClr val="98C379"/>
-                </a:solidFill>
-                <a:effectLst/>
-                <a:latin typeface="Menlo" panose="020B0609030804020204" pitchFamily="49" charset="0"/>
-                <a:ea typeface="Menlo" panose="020B0609030804020204" pitchFamily="49" charset="0"/>
-                <a:cs typeface="Menlo" panose="020B0609030804020204" pitchFamily="49" charset="0"/>
-              </a:rPr>
-              <a:t>myfilter</a:t>
-            </a:r>
-            <a:r>
-              <a:rPr lang="fr-FR" sz="700" b="0" dirty="0">
-                <a:solidFill>
-                  <a:srgbClr val="98C379"/>
-                </a:solidFill>
-                <a:effectLst/>
-                <a:latin typeface="Menlo" panose="020B0609030804020204" pitchFamily="49" charset="0"/>
-                <a:ea typeface="Menlo" panose="020B0609030804020204" pitchFamily="49" charset="0"/>
-                <a:cs typeface="Menlo" panose="020B0609030804020204" pitchFamily="49" charset="0"/>
-              </a:rPr>
-              <a:t>"</a:t>
-            </a:r>
-            <a:r>
-              <a:rPr lang="fr-FR" sz="700" b="0" dirty="0">
-                <a:solidFill>
-                  <a:srgbClr val="ABB2BF"/>
-                </a:solidFill>
-                <a:effectLst/>
-                <a:latin typeface="Menlo" panose="020B0609030804020204" pitchFamily="49" charset="0"/>
-                <a:ea typeface="Menlo" panose="020B0609030804020204" pitchFamily="49" charset="0"/>
-                <a:cs typeface="Menlo" panose="020B0609030804020204" pitchFamily="49" charset="0"/>
-              </a:rPr>
-              <a:t>: </a:t>
-            </a:r>
-            <a:r>
-              <a:rPr lang="fr-FR" sz="700" b="0" dirty="0">
-                <a:solidFill>
-                  <a:srgbClr val="98C379"/>
-                </a:solidFill>
-                <a:effectLst/>
-                <a:latin typeface="Menlo" panose="020B0609030804020204" pitchFamily="49" charset="0"/>
-                <a:ea typeface="Menlo" panose="020B0609030804020204" pitchFamily="49" charset="0"/>
-                <a:cs typeface="Menlo" panose="020B0609030804020204" pitchFamily="49" charset="0"/>
-              </a:rPr>
-              <a:t>"QD &lt; 2.0 || FS &gt; 60.0 || MQ &lt; 40.0 || </a:t>
-            </a:r>
-            <a:r>
-              <a:rPr lang="fr-FR" sz="700" b="0" dirty="0" err="1">
-                <a:solidFill>
-                  <a:srgbClr val="98C379"/>
-                </a:solidFill>
-                <a:effectLst/>
-                <a:latin typeface="Menlo" panose="020B0609030804020204" pitchFamily="49" charset="0"/>
-                <a:ea typeface="Menlo" panose="020B0609030804020204" pitchFamily="49" charset="0"/>
-                <a:cs typeface="Menlo" panose="020B0609030804020204" pitchFamily="49" charset="0"/>
-              </a:rPr>
-              <a:t>MQRankSum</a:t>
-            </a:r>
-            <a:r>
-              <a:rPr lang="fr-FR" sz="700" b="0" dirty="0">
-                <a:solidFill>
-                  <a:srgbClr val="98C379"/>
-                </a:solidFill>
-                <a:effectLst/>
-                <a:latin typeface="Menlo" panose="020B0609030804020204" pitchFamily="49" charset="0"/>
-                <a:ea typeface="Menlo" panose="020B0609030804020204" pitchFamily="49" charset="0"/>
-                <a:cs typeface="Menlo" panose="020B0609030804020204" pitchFamily="49" charset="0"/>
-              </a:rPr>
-              <a:t> &lt; -12.5 || </a:t>
-            </a:r>
-            <a:r>
-              <a:rPr lang="fr-FR" sz="700" b="0" dirty="0" err="1">
-                <a:solidFill>
-                  <a:srgbClr val="98C379"/>
-                </a:solidFill>
-                <a:effectLst/>
-                <a:latin typeface="Menlo" panose="020B0609030804020204" pitchFamily="49" charset="0"/>
-                <a:ea typeface="Menlo" panose="020B0609030804020204" pitchFamily="49" charset="0"/>
-                <a:cs typeface="Menlo" panose="020B0609030804020204" pitchFamily="49" charset="0"/>
-              </a:rPr>
-              <a:t>ReadPosRankSum</a:t>
-            </a:r>
-            <a:r>
-              <a:rPr lang="fr-FR" sz="700" b="0" dirty="0">
-                <a:solidFill>
-                  <a:srgbClr val="98C379"/>
-                </a:solidFill>
-                <a:effectLst/>
-                <a:latin typeface="Menlo" panose="020B0609030804020204" pitchFamily="49" charset="0"/>
-                <a:ea typeface="Menlo" panose="020B0609030804020204" pitchFamily="49" charset="0"/>
-                <a:cs typeface="Menlo" panose="020B0609030804020204" pitchFamily="49" charset="0"/>
-              </a:rPr>
-              <a:t> &lt; -8.0"</a:t>
-            </a:r>
-            <a:r>
-              <a:rPr lang="fr-FR" sz="700" b="0" dirty="0">
-                <a:solidFill>
-                  <a:srgbClr val="ABB2BF"/>
-                </a:solidFill>
-                <a:effectLst/>
-                <a:latin typeface="Menlo" panose="020B0609030804020204" pitchFamily="49" charset="0"/>
-                <a:ea typeface="Menlo" panose="020B0609030804020204" pitchFamily="49" charset="0"/>
-                <a:cs typeface="Menlo" panose="020B0609030804020204" pitchFamily="49" charset="0"/>
-              </a:rPr>
-              <a:t>,</a:t>
-            </a:r>
-          </a:p>
-          <a:p>
-            <a:pPr>
-              <a:tabLst>
-                <a:tab pos="663575" algn="l"/>
-              </a:tabLst>
-            </a:pPr>
-            <a:r>
-              <a:rPr lang="fr-FR" sz="700" dirty="0">
-                <a:solidFill>
-                  <a:srgbClr val="ABB2BF"/>
-                </a:solidFill>
-                <a:latin typeface="Menlo" panose="020B0609030804020204" pitchFamily="49" charset="0"/>
-                <a:ea typeface="Menlo" panose="020B0609030804020204" pitchFamily="49" charset="0"/>
-                <a:cs typeface="Menlo" panose="020B0609030804020204" pitchFamily="49" charset="0"/>
-              </a:rPr>
-              <a:t>	</a:t>
-            </a:r>
-            <a:r>
-              <a:rPr lang="fr-FR" sz="700" b="0" dirty="0">
-                <a:solidFill>
-                  <a:srgbClr val="ABB2BF"/>
-                </a:solidFill>
-                <a:effectLst/>
-                <a:latin typeface="Menlo" panose="020B0609030804020204" pitchFamily="49" charset="0"/>
-                <a:ea typeface="Menlo" panose="020B0609030804020204" pitchFamily="49" charset="0"/>
-                <a:cs typeface="Menlo" panose="020B0609030804020204" pitchFamily="49" charset="0"/>
-              </a:rPr>
-              <a:t>}</a:t>
-            </a:r>
-          </a:p>
-          <a:p>
-            <a:pPr>
-              <a:tabLst>
-                <a:tab pos="444500" algn="l"/>
-              </a:tabLst>
-            </a:pPr>
-            <a:r>
-              <a:rPr lang="fr-FR" sz="700" b="0" dirty="0">
-                <a:solidFill>
-                  <a:srgbClr val="ABB2BF"/>
-                </a:solidFill>
-                <a:effectLst/>
-                <a:latin typeface="Menlo" panose="020B0609030804020204" pitchFamily="49" charset="0"/>
-                <a:ea typeface="Menlo" panose="020B0609030804020204" pitchFamily="49" charset="0"/>
-                <a:cs typeface="Menlo" panose="020B0609030804020204" pitchFamily="49" charset="0"/>
-              </a:rPr>
-              <a:t>	</a:t>
-            </a:r>
-            <a:r>
-              <a:rPr lang="fr-FR" sz="700" b="0" i="1" dirty="0" err="1">
-                <a:solidFill>
-                  <a:schemeClr val="bg1"/>
-                </a:solidFill>
-                <a:effectLst/>
-                <a:latin typeface="Menlo" panose="020B0609030804020204" pitchFamily="49" charset="0"/>
-                <a:ea typeface="Menlo" panose="020B0609030804020204" pitchFamily="49" charset="0"/>
-                <a:cs typeface="Menlo" panose="020B0609030804020204" pitchFamily="49" charset="0"/>
-              </a:rPr>
-              <a:t>indels</a:t>
-            </a:r>
-            <a:r>
-              <a:rPr lang="fr-FR" sz="700" b="0" i="1" dirty="0">
-                <a:solidFill>
-                  <a:schemeClr val="bg1"/>
-                </a:solidFill>
-                <a:effectLst/>
-                <a:latin typeface="Menlo" panose="020B0609030804020204" pitchFamily="49" charset="0"/>
-                <a:ea typeface="Menlo" panose="020B0609030804020204" pitchFamily="49" charset="0"/>
-                <a:cs typeface="Menlo" panose="020B0609030804020204" pitchFamily="49" charset="0"/>
-              </a:rPr>
-              <a:t>:</a:t>
-            </a:r>
-            <a:r>
-              <a:rPr lang="fr-FR" sz="700" b="0" dirty="0">
-                <a:solidFill>
-                  <a:schemeClr val="bg1"/>
                 </a:solidFill>
                 <a:effectLst/>
                 <a:latin typeface="Fira Code" panose="020B0809050000020004" pitchFamily="49" charset="0"/>
-              </a:rPr>
-              <a:t> </a:t>
-            </a:r>
-            <a:r>
-              <a:rPr lang="fr-FR" sz="700" b="0" dirty="0">
-                <a:solidFill>
-                  <a:srgbClr val="ABB2BF"/>
-                </a:solidFill>
-                <a:effectLst/>
-                <a:latin typeface="Menlo" panose="020B0609030804020204" pitchFamily="49" charset="0"/>
-                <a:ea typeface="Menlo" panose="020B0609030804020204" pitchFamily="49" charset="0"/>
-                <a:cs typeface="Menlo" panose="020B0609030804020204" pitchFamily="49" charset="0"/>
-              </a:rPr>
-              <a:t>{ </a:t>
-            </a:r>
-            <a:r>
-              <a:rPr lang="fr-FR" sz="700" b="0" dirty="0">
-                <a:solidFill>
-                  <a:srgbClr val="98C379"/>
-                </a:solidFill>
-                <a:effectLst/>
-                <a:latin typeface="Menlo" panose="020B0609030804020204" pitchFamily="49" charset="0"/>
-                <a:ea typeface="Menlo" panose="020B0609030804020204" pitchFamily="49" charset="0"/>
-                <a:cs typeface="Menlo" panose="020B0609030804020204" pitchFamily="49" charset="0"/>
-              </a:rPr>
-              <a:t>"QD &lt; 2.0 || FS &gt; 200.0 || </a:t>
-            </a:r>
-            <a:r>
-              <a:rPr lang="fr-FR" sz="700" b="0" dirty="0" err="1">
-                <a:solidFill>
-                  <a:srgbClr val="98C379"/>
-                </a:solidFill>
-                <a:effectLst/>
-                <a:latin typeface="Menlo" panose="020B0609030804020204" pitchFamily="49" charset="0"/>
-                <a:ea typeface="Menlo" panose="020B0609030804020204" pitchFamily="49" charset="0"/>
-                <a:cs typeface="Menlo" panose="020B0609030804020204" pitchFamily="49" charset="0"/>
-              </a:rPr>
-              <a:t>ReadPosRankSum</a:t>
-            </a:r>
-            <a:r>
-              <a:rPr lang="fr-FR" sz="700" b="0" dirty="0">
-                <a:solidFill>
-                  <a:srgbClr val="98C379"/>
-                </a:solidFill>
-                <a:effectLst/>
-                <a:latin typeface="Menlo" panose="020B0609030804020204" pitchFamily="49" charset="0"/>
-                <a:ea typeface="Menlo" panose="020B0609030804020204" pitchFamily="49" charset="0"/>
-                <a:cs typeface="Menlo" panose="020B0609030804020204" pitchFamily="49" charset="0"/>
-              </a:rPr>
-              <a:t> &lt; -20.0"</a:t>
-            </a:r>
-            <a:r>
-              <a:rPr lang="fr-FR" sz="700" b="0" dirty="0">
-                <a:solidFill>
-                  <a:srgbClr val="ABB2BF"/>
-                </a:solidFill>
-                <a:effectLst/>
-                <a:latin typeface="Menlo" panose="020B0609030804020204" pitchFamily="49" charset="0"/>
-                <a:ea typeface="Menlo" panose="020B0609030804020204" pitchFamily="49" charset="0"/>
-                <a:cs typeface="Menlo" panose="020B0609030804020204" pitchFamily="49" charset="0"/>
-              </a:rPr>
-              <a:t> }</a:t>
-            </a:r>
-          </a:p>
-          <a:p>
-            <a:pPr>
-              <a:tabLst>
-                <a:tab pos="444500" algn="l"/>
-              </a:tabLst>
-            </a:pPr>
-            <a:endParaRPr lang="fr-FR" sz="700" b="0" dirty="0">
-              <a:solidFill>
-                <a:srgbClr val="ABB2BF"/>
-              </a:solidFill>
-              <a:effectLst/>
-              <a:latin typeface="Menlo" panose="020B0609030804020204" pitchFamily="49" charset="0"/>
-              <a:ea typeface="Menlo" panose="020B0609030804020204" pitchFamily="49" charset="0"/>
-              <a:cs typeface="Menlo" panose="020B0609030804020204" pitchFamily="49" charset="0"/>
-            </a:endParaRPr>
-          </a:p>
-          <a:p>
-            <a:pPr>
-              <a:tabLst>
-                <a:tab pos="174625" algn="l"/>
-                <a:tab pos="444500" algn="l"/>
-                <a:tab pos="709613" algn="l"/>
-              </a:tabLst>
-            </a:pPr>
-            <a:endParaRPr lang="fr-FR" sz="700" b="0" i="1" dirty="0">
-              <a:solidFill>
-                <a:schemeClr val="bg1"/>
-              </a:solidFill>
-              <a:effectLst/>
-              <a:latin typeface="Menlo" panose="020B0609030804020204" pitchFamily="49" charset="0"/>
-              <a:ea typeface="Menlo" panose="020B0609030804020204" pitchFamily="49" charset="0"/>
-              <a:cs typeface="Menlo" panose="020B0609030804020204" pitchFamily="49" charset="0"/>
-            </a:endParaRPr>
-          </a:p>
-        </p:txBody>
-      </p:sp>
-      <p:cxnSp>
-        <p:nvCxnSpPr>
-          <p:cNvPr id="142" name="Connecteur droit avec flèche 141">
-            <a:extLst>
-              <a:ext uri="{FF2B5EF4-FFF2-40B4-BE49-F238E27FC236}">
-                <a16:creationId xmlns:a16="http://schemas.microsoft.com/office/drawing/2014/main" id="{B26077FF-3DDD-93A4-E16A-5D674C0B6000}"/>
-              </a:ext>
-            </a:extLst>
-          </p:cNvPr>
-          <p:cNvCxnSpPr>
-            <a:cxnSpLocks/>
-          </p:cNvCxnSpPr>
-          <p:nvPr/>
-        </p:nvCxnSpPr>
-        <p:spPr>
-          <a:xfrm>
-            <a:off x="9804679" y="4238932"/>
-            <a:ext cx="2392999" cy="0"/>
-          </a:xfrm>
-          <a:prstGeom prst="straightConnector1">
-            <a:avLst/>
-          </a:prstGeom>
-          <a:ln w="12700">
-            <a:solidFill>
-              <a:schemeClr val="bg1"/>
-            </a:solidFill>
-            <a:tailEnd type="arrow"/>
-          </a:ln>
-        </p:spPr>
-        <p:style>
-          <a:lnRef idx="1">
-            <a:schemeClr val="accent1"/>
-          </a:lnRef>
-          <a:fillRef idx="0">
-            <a:schemeClr val="accent1"/>
-          </a:fillRef>
-          <a:effectRef idx="0">
-            <a:schemeClr val="accent1"/>
-          </a:effectRef>
-          <a:fontRef idx="minor">
-            <a:schemeClr val="tx1"/>
-          </a:fontRef>
-        </p:style>
-      </p:cxnSp>
-      <p:sp>
-        <p:nvSpPr>
-          <p:cNvPr id="51" name="ZoneTexte 50">
-            <a:extLst>
-              <a:ext uri="{FF2B5EF4-FFF2-40B4-BE49-F238E27FC236}">
-                <a16:creationId xmlns:a16="http://schemas.microsoft.com/office/drawing/2014/main" id="{6BB52E0C-24B9-E3DE-0629-4EA880A648DD}"/>
-              </a:ext>
-            </a:extLst>
-          </p:cNvPr>
-          <p:cNvSpPr txBox="1"/>
-          <p:nvPr/>
-        </p:nvSpPr>
-        <p:spPr>
-          <a:xfrm>
-            <a:off x="4809" y="5863037"/>
-            <a:ext cx="1642180" cy="584775"/>
-          </a:xfrm>
-          <a:prstGeom prst="rect">
-            <a:avLst/>
-          </a:prstGeom>
-          <a:noFill/>
-          <a:ln>
-            <a:solidFill>
-              <a:schemeClr val="accent1"/>
-            </a:solidFill>
-          </a:ln>
-        </p:spPr>
-        <p:txBody>
-          <a:bodyPr wrap="square" rtlCol="0">
-            <a:spAutoFit/>
-          </a:bodyPr>
-          <a:lstStyle/>
-          <a:p>
-            <a:r>
-              <a:rPr lang="fr-FR" sz="800" b="0" dirty="0">
-                <a:solidFill>
-                  <a:srgbClr val="D19A66"/>
-                </a:solidFill>
-                <a:effectLst/>
-                <a:latin typeface="Fira Code" panose="020B0809050000020004" pitchFamily="49" charset="0"/>
-              </a:rPr>
-              <a:t>{</a:t>
-            </a:r>
-            <a:r>
-              <a:rPr lang="fr-FR" sz="800" dirty="0">
-                <a:solidFill>
-                  <a:srgbClr val="D19A66"/>
-                </a:solidFill>
-                <a:latin typeface="Fira Code" panose="020B0809050000020004" pitchFamily="49" charset="0"/>
-              </a:rPr>
-              <a:t>s}:</a:t>
-            </a:r>
-            <a:r>
-              <a:rPr lang="fr-FR" sz="800" dirty="0">
-                <a:solidFill>
-                  <a:srgbClr val="98C379"/>
-                </a:solidFill>
-                <a:latin typeface="Fira Code" panose="020B0809050000020004" pitchFamily="49" charset="0"/>
-              </a:rPr>
-              <a:t> {</a:t>
-            </a:r>
-            <a:r>
-              <a:rPr lang="fr-FR" sz="800" dirty="0" err="1">
-                <a:solidFill>
-                  <a:srgbClr val="98C379"/>
-                </a:solidFill>
-                <a:latin typeface="Fira Code" panose="020B0809050000020004" pitchFamily="49" charset="0"/>
-              </a:rPr>
-              <a:t>sample</a:t>
-            </a:r>
-            <a:r>
-              <a:rPr lang="fr-FR" sz="800" dirty="0">
-                <a:solidFill>
-                  <a:srgbClr val="98C379"/>
-                </a:solidFill>
-                <a:latin typeface="Fira Code" panose="020B0809050000020004" pitchFamily="49" charset="0"/>
-              </a:rPr>
-              <a:t>}</a:t>
-            </a:r>
-          </a:p>
-          <a:p>
-            <a:r>
-              <a:rPr lang="fr-FR" sz="800" b="0" dirty="0">
-                <a:solidFill>
-                  <a:srgbClr val="D19A66"/>
-                </a:solidFill>
-                <a:effectLst/>
-                <a:latin typeface="Fira Code" panose="020B0809050000020004" pitchFamily="49" charset="0"/>
-              </a:rPr>
-              <a:t>{a}: </a:t>
-            </a:r>
-            <a:r>
-              <a:rPr lang="fr-FR" sz="800" dirty="0">
-                <a:solidFill>
-                  <a:srgbClr val="98C379"/>
-                </a:solidFill>
-                <a:latin typeface="Fira Code" panose="020B0809050000020004" pitchFamily="49" charset="0"/>
-              </a:rPr>
-              <a:t>{aligner}</a:t>
-            </a:r>
-          </a:p>
-          <a:p>
-            <a:r>
-              <a:rPr lang="fr-FR" sz="800" b="0" dirty="0">
-                <a:solidFill>
-                  <a:srgbClr val="D19A66"/>
-                </a:solidFill>
-                <a:effectLst/>
-                <a:latin typeface="Fira Code" panose="020B0809050000020004" pitchFamily="49" charset="0"/>
-              </a:rPr>
-              <a:t>{md}:</a:t>
-            </a:r>
-            <a:r>
-              <a:rPr lang="fr-FR" sz="800" b="0" dirty="0">
-                <a:solidFill>
-                  <a:srgbClr val="98C379"/>
-                </a:solidFill>
-                <a:effectLst/>
-                <a:latin typeface="Fira Code" panose="020B0809050000020004" pitchFamily="49" charset="0"/>
-              </a:rPr>
-              <a:t> {</a:t>
-            </a:r>
-            <a:r>
-              <a:rPr lang="fr-FR" sz="800" b="0" dirty="0" err="1">
-                <a:solidFill>
-                  <a:srgbClr val="98C379"/>
-                </a:solidFill>
-                <a:effectLst/>
-                <a:latin typeface="Fira Code" panose="020B0809050000020004" pitchFamily="49" charset="0"/>
-              </a:rPr>
-              <a:t>markdup</a:t>
-            </a:r>
-            <a:r>
-              <a:rPr lang="fr-FR" sz="800" b="0" dirty="0">
-                <a:solidFill>
-                  <a:srgbClr val="98C379"/>
-                </a:solidFill>
-                <a:effectLst/>
-                <a:latin typeface="Fira Code" panose="020B0809050000020004" pitchFamily="49" charset="0"/>
-              </a:rPr>
-              <a:t>}</a:t>
-            </a:r>
-          </a:p>
-          <a:p>
-            <a:r>
-              <a:rPr lang="fr-FR" sz="800" dirty="0">
-                <a:solidFill>
-                  <a:srgbClr val="D19A66"/>
-                </a:solidFill>
-                <a:latin typeface="Fira Code" panose="020B0809050000020004" pitchFamily="49" charset="0"/>
-              </a:rPr>
-              <a:t>{mc}:</a:t>
-            </a:r>
-            <a:r>
-              <a:rPr lang="fr-FR" sz="800" dirty="0">
-                <a:solidFill>
-                  <a:srgbClr val="98C379"/>
-                </a:solidFill>
-                <a:latin typeface="Fira Code" panose="020B0809050000020004" pitchFamily="49" charset="0"/>
-              </a:rPr>
-              <a:t> {</a:t>
-            </a:r>
-            <a:r>
-              <a:rPr lang="fr-FR" sz="800" dirty="0" err="1">
-                <a:solidFill>
-                  <a:srgbClr val="98C379"/>
-                </a:solidFill>
-                <a:latin typeface="Fira Code" panose="020B0809050000020004" pitchFamily="49" charset="0"/>
-              </a:rPr>
-              <a:t>minimumcoverage</a:t>
-            </a:r>
-            <a:r>
-              <a:rPr lang="fr-FR" sz="800" dirty="0">
-                <a:solidFill>
-                  <a:srgbClr val="98C379"/>
-                </a:solidFill>
-                <a:latin typeface="Fira Code" panose="020B0809050000020004" pitchFamily="49" charset="0"/>
-              </a:rPr>
-              <a:t>}</a:t>
-            </a:r>
-            <a:endParaRPr lang="fr-FR" sz="800" b="0" dirty="0">
-              <a:solidFill>
-                <a:srgbClr val="D19A66"/>
-              </a:solidFill>
-              <a:effectLst/>
-              <a:latin typeface="Fira Code" panose="020B0809050000020004" pitchFamily="49" charset="0"/>
-            </a:endParaRPr>
-          </a:p>
-        </p:txBody>
-      </p:sp>
-      <p:sp>
-        <p:nvSpPr>
-          <p:cNvPr id="76" name="Rectangle : coins arrondis 75">
-            <a:extLst>
-              <a:ext uri="{FF2B5EF4-FFF2-40B4-BE49-F238E27FC236}">
-                <a16:creationId xmlns:a16="http://schemas.microsoft.com/office/drawing/2014/main" id="{CD92DA49-08CC-90D0-A46A-896A53DAA776}"/>
-              </a:ext>
-            </a:extLst>
-          </p:cNvPr>
-          <p:cNvSpPr/>
-          <p:nvPr/>
-        </p:nvSpPr>
-        <p:spPr>
-          <a:xfrm>
-            <a:off x="8785656" y="1351470"/>
-            <a:ext cx="1863986" cy="749552"/>
-          </a:xfrm>
-          <a:prstGeom prst="roundRect">
-            <a:avLst/>
-          </a:prstGeom>
-          <a:noFill/>
-          <a:ln>
-            <a:solidFill>
-              <a:schemeClr val="accent2"/>
-            </a:solidFill>
-          </a:ln>
-        </p:spPr>
-        <p:style>
-          <a:lnRef idx="2">
-            <a:schemeClr val="accent1">
-              <a:shade val="50000"/>
-            </a:schemeClr>
-          </a:lnRef>
-          <a:fillRef idx="1">
-            <a:schemeClr val="accent1"/>
-          </a:fillRef>
-          <a:effectRef idx="0">
-            <a:schemeClr val="accent1"/>
-          </a:effectRef>
-          <a:fontRef idx="minor">
-            <a:schemeClr val="lt1"/>
-          </a:fontRef>
-        </p:style>
-        <p:txBody>
-          <a:bodyPr rtlCol="0" anchor="ctr"/>
-          <a:lstStyle/>
-          <a:p>
-            <a:pPr algn="ctr"/>
-            <a:r>
-              <a:rPr lang="fr-FR" sz="1000" dirty="0" err="1">
-                <a:solidFill>
-                  <a:schemeClr val="accent2"/>
-                </a:solidFill>
-                <a:latin typeface="SF Pro Display" pitchFamily="2" charset="0"/>
-                <a:ea typeface="SF Pro Display" pitchFamily="2" charset="0"/>
-                <a:cs typeface="SF Pro Display" pitchFamily="2" charset="0"/>
-              </a:rPr>
-              <a:t>Can't</a:t>
-            </a:r>
-            <a:r>
-              <a:rPr lang="fr-FR" sz="1000" dirty="0">
-                <a:solidFill>
-                  <a:schemeClr val="accent2"/>
-                </a:solidFill>
-                <a:latin typeface="SF Pro Display" pitchFamily="2" charset="0"/>
-                <a:ea typeface="SF Pro Display" pitchFamily="2" charset="0"/>
-                <a:cs typeface="SF Pro Display" pitchFamily="2" charset="0"/>
-              </a:rPr>
-              <a:t> </a:t>
-            </a:r>
-            <a:r>
-              <a:rPr lang="fr-FR" sz="1000" dirty="0" err="1">
-                <a:solidFill>
-                  <a:schemeClr val="accent2"/>
-                </a:solidFill>
-                <a:latin typeface="SF Pro Display" pitchFamily="2" charset="0"/>
-                <a:ea typeface="SF Pro Display" pitchFamily="2" charset="0"/>
-                <a:cs typeface="SF Pro Display" pitchFamily="2" charset="0"/>
-              </a:rPr>
-              <a:t>perform</a:t>
-            </a:r>
-            <a:r>
-              <a:rPr lang="fr-FR" sz="1000" dirty="0">
-                <a:solidFill>
-                  <a:schemeClr val="accent2"/>
-                </a:solidFill>
-                <a:latin typeface="SF Pro Display" pitchFamily="2" charset="0"/>
-                <a:ea typeface="SF Pro Display" pitchFamily="2" charset="0"/>
-                <a:cs typeface="SF Pro Display" pitchFamily="2" charset="0"/>
-              </a:rPr>
-              <a:t> VQSR? </a:t>
-            </a:r>
-          </a:p>
-          <a:p>
-            <a:pPr algn="ctr"/>
-            <a:r>
-              <a:rPr lang="fr-FR" sz="1000" i="1" dirty="0">
-                <a:solidFill>
-                  <a:schemeClr val="bg1"/>
-                </a:solidFill>
-                <a:latin typeface="SF Pro Display" pitchFamily="2" charset="0"/>
-                <a:ea typeface="SF Pro Display" pitchFamily="2" charset="0"/>
-                <a:cs typeface="SF Pro Display" pitchFamily="2" charset="0"/>
-              </a:rPr>
-              <a:t>N</a:t>
-            </a:r>
-            <a:r>
-              <a:rPr lang="fr-FR" sz="1000" b="0" i="1" u="none" strike="noStrike" dirty="0">
-                <a:solidFill>
-                  <a:schemeClr val="bg1"/>
-                </a:solidFill>
-                <a:effectLst/>
-                <a:latin typeface="SF Pro Display" pitchFamily="2" charset="0"/>
-                <a:ea typeface="SF Pro Display" pitchFamily="2" charset="0"/>
-                <a:cs typeface="SF Pro Display" pitchFamily="2" charset="0"/>
-              </a:rPr>
-              <a:t>o </a:t>
-            </a:r>
-            <a:r>
-              <a:rPr lang="fr-FR" sz="1000" b="0" i="1" u="none" strike="noStrike" dirty="0" err="1">
-                <a:solidFill>
-                  <a:schemeClr val="bg1"/>
-                </a:solidFill>
-                <a:effectLst/>
-                <a:latin typeface="SF Pro Display" pitchFamily="2" charset="0"/>
-                <a:ea typeface="SF Pro Display" pitchFamily="2" charset="0"/>
-                <a:cs typeface="SF Pro Display" pitchFamily="2" charset="0"/>
-              </a:rPr>
-              <a:t>highly</a:t>
-            </a:r>
-            <a:r>
-              <a:rPr lang="fr-FR" sz="1000" b="0" i="1" u="none" strike="noStrike" dirty="0">
-                <a:solidFill>
-                  <a:schemeClr val="bg1"/>
-                </a:solidFill>
-                <a:effectLst/>
-                <a:latin typeface="SF Pro Display" pitchFamily="2" charset="0"/>
-                <a:ea typeface="SF Pro Display" pitchFamily="2" charset="0"/>
-                <a:cs typeface="SF Pro Display" pitchFamily="2" charset="0"/>
-              </a:rPr>
-              <a:t> </a:t>
-            </a:r>
-            <a:r>
-              <a:rPr lang="fr-FR" sz="1000" b="0" i="1" u="none" strike="noStrike" dirty="0" err="1">
-                <a:solidFill>
-                  <a:schemeClr val="bg1"/>
-                </a:solidFill>
-                <a:effectLst/>
-                <a:latin typeface="SF Pro Display" pitchFamily="2" charset="0"/>
-                <a:ea typeface="SF Pro Display" pitchFamily="2" charset="0"/>
-                <a:cs typeface="SF Pro Display" pitchFamily="2" charset="0"/>
-              </a:rPr>
-              <a:t>validated</a:t>
-            </a:r>
-            <a:r>
-              <a:rPr lang="fr-FR" sz="1000" b="0" i="1" u="none" strike="noStrike" dirty="0">
-                <a:solidFill>
-                  <a:schemeClr val="bg1"/>
-                </a:solidFill>
-                <a:effectLst/>
-                <a:latin typeface="SF Pro Display" pitchFamily="2" charset="0"/>
-                <a:ea typeface="SF Pro Display" pitchFamily="2" charset="0"/>
-                <a:cs typeface="SF Pro Display" pitchFamily="2" charset="0"/>
-              </a:rPr>
-              <a:t> variant </a:t>
-            </a:r>
-            <a:r>
-              <a:rPr lang="fr-FR" sz="1000" b="0" i="1" u="none" strike="noStrike" dirty="0" err="1">
-                <a:solidFill>
-                  <a:schemeClr val="bg1"/>
-                </a:solidFill>
-                <a:effectLst/>
-                <a:latin typeface="SF Pro Display" pitchFamily="2" charset="0"/>
-                <a:ea typeface="SF Pro Display" pitchFamily="2" charset="0"/>
-                <a:cs typeface="SF Pro Display" pitchFamily="2" charset="0"/>
-              </a:rPr>
-              <a:t>resource</a:t>
-            </a:r>
-            <a:r>
-              <a:rPr lang="fr-FR" sz="1000" b="0" i="1" u="none" strike="noStrike" dirty="0">
-                <a:solidFill>
-                  <a:schemeClr val="bg1"/>
-                </a:solidFill>
-                <a:effectLst/>
-                <a:latin typeface="SF Pro Display" pitchFamily="2" charset="0"/>
-                <a:ea typeface="SF Pro Display" pitchFamily="2" charset="0"/>
-                <a:cs typeface="SF Pro Display" pitchFamily="2" charset="0"/>
-              </a:rPr>
-              <a:t> </a:t>
-            </a:r>
-            <a:r>
-              <a:rPr lang="fr-FR" sz="1000" b="0" i="1" u="none" strike="noStrike" dirty="0" err="1">
-                <a:solidFill>
-                  <a:schemeClr val="bg1"/>
-                </a:solidFill>
-                <a:effectLst/>
-                <a:latin typeface="SF Pro Display" pitchFamily="2" charset="0"/>
-                <a:ea typeface="SF Pro Display" pitchFamily="2" charset="0"/>
-                <a:cs typeface="SF Pro Display" pitchFamily="2" charset="0"/>
-              </a:rPr>
-              <a:t>is</a:t>
-            </a:r>
-            <a:r>
-              <a:rPr lang="fr-FR" sz="1000" b="0" i="1" u="none" strike="noStrike" dirty="0">
-                <a:solidFill>
-                  <a:schemeClr val="bg1"/>
-                </a:solidFill>
-                <a:effectLst/>
-                <a:latin typeface="SF Pro Display" pitchFamily="2" charset="0"/>
-                <a:ea typeface="SF Pro Display" pitchFamily="2" charset="0"/>
-                <a:cs typeface="SF Pro Display" pitchFamily="2" charset="0"/>
-              </a:rPr>
-              <a:t> </a:t>
-            </a:r>
-            <a:r>
-              <a:rPr lang="fr-FR" sz="1000" b="0" i="1" u="none" strike="noStrike" dirty="0" err="1">
-                <a:solidFill>
-                  <a:schemeClr val="bg1"/>
-                </a:solidFill>
-                <a:effectLst/>
-                <a:latin typeface="SF Pro Display" pitchFamily="2" charset="0"/>
-                <a:ea typeface="SF Pro Display" pitchFamily="2" charset="0"/>
-                <a:cs typeface="SF Pro Display" pitchFamily="2" charset="0"/>
-              </a:rPr>
-              <a:t>available</a:t>
-            </a:r>
-            <a:r>
-              <a:rPr lang="fr-FR" sz="1000" b="0" i="1" u="none" strike="noStrike" dirty="0">
-                <a:solidFill>
-                  <a:schemeClr val="bg1"/>
-                </a:solidFill>
-                <a:effectLst/>
-                <a:latin typeface="SF Pro Display" pitchFamily="2" charset="0"/>
-                <a:ea typeface="SF Pro Display" pitchFamily="2" charset="0"/>
-                <a:cs typeface="SF Pro Display" pitchFamily="2" charset="0"/>
-              </a:rPr>
-              <a:t> for </a:t>
-            </a:r>
-            <a:r>
-              <a:rPr lang="fr-FR" sz="1000" b="0" i="1" u="none" strike="noStrike" dirty="0" err="1">
-                <a:solidFill>
-                  <a:schemeClr val="bg1"/>
-                </a:solidFill>
-                <a:effectLst/>
-                <a:latin typeface="SF Pro Display" pitchFamily="2" charset="0"/>
-                <a:ea typeface="SF Pro Display" pitchFamily="2" charset="0"/>
-                <a:cs typeface="SF Pro Display" pitchFamily="2" charset="0"/>
-              </a:rPr>
-              <a:t>mosquitoes</a:t>
-            </a:r>
-            <a:r>
-              <a:rPr lang="fr-FR" sz="1000" b="0" i="1" u="none" strike="noStrike" dirty="0">
-                <a:solidFill>
-                  <a:schemeClr val="bg1"/>
-                </a:solidFill>
-                <a:effectLst/>
-                <a:latin typeface="SF Pro Display" pitchFamily="2" charset="0"/>
-                <a:ea typeface="SF Pro Display" pitchFamily="2" charset="0"/>
-                <a:cs typeface="SF Pro Display" pitchFamily="2" charset="0"/>
-              </a:rPr>
-              <a:t> at </a:t>
-            </a:r>
-            <a:r>
-              <a:rPr lang="fr-FR" sz="1000" b="0" i="1" u="none" strike="noStrike" dirty="0" err="1">
-                <a:solidFill>
-                  <a:schemeClr val="bg1"/>
-                </a:solidFill>
-                <a:effectLst/>
-                <a:latin typeface="SF Pro Display" pitchFamily="2" charset="0"/>
-                <a:ea typeface="SF Pro Display" pitchFamily="2" charset="0"/>
-                <a:cs typeface="SF Pro Display" pitchFamily="2" charset="0"/>
-              </a:rPr>
-              <a:t>this</a:t>
-            </a:r>
-            <a:r>
-              <a:rPr lang="fr-FR" sz="1000" b="0" i="1" u="none" strike="noStrike" dirty="0">
-                <a:solidFill>
-                  <a:schemeClr val="bg1"/>
-                </a:solidFill>
-                <a:effectLst/>
-                <a:latin typeface="SF Pro Display" pitchFamily="2" charset="0"/>
-                <a:ea typeface="SF Pro Display" pitchFamily="2" charset="0"/>
-                <a:cs typeface="SF Pro Display" pitchFamily="2" charset="0"/>
-              </a:rPr>
-              <a:t> time</a:t>
-            </a:r>
-            <a:endParaRPr lang="fr-FR" sz="1000" i="1" dirty="0">
-              <a:solidFill>
-                <a:schemeClr val="bg1"/>
-              </a:solidFill>
-              <a:latin typeface="SF Pro Display" pitchFamily="2" charset="0"/>
-              <a:ea typeface="SF Pro Display" pitchFamily="2" charset="0"/>
-              <a:cs typeface="SF Pro Display" pitchFamily="2" charset="0"/>
-            </a:endParaRPr>
-          </a:p>
-        </p:txBody>
-      </p:sp>
-      <p:cxnSp>
-        <p:nvCxnSpPr>
-          <p:cNvPr id="78" name="Connecteur droit 77">
-            <a:extLst>
-              <a:ext uri="{FF2B5EF4-FFF2-40B4-BE49-F238E27FC236}">
-                <a16:creationId xmlns:a16="http://schemas.microsoft.com/office/drawing/2014/main" id="{3F2612B2-F0C9-BE38-B9B1-6F9033072D71}"/>
-              </a:ext>
-            </a:extLst>
-          </p:cNvPr>
-          <p:cNvCxnSpPr>
-            <a:cxnSpLocks/>
-            <a:stCxn id="76" idx="2"/>
-            <a:endCxn id="86" idx="0"/>
-          </p:cNvCxnSpPr>
-          <p:nvPr/>
-        </p:nvCxnSpPr>
-        <p:spPr>
-          <a:xfrm flipH="1">
-            <a:off x="7945331" y="2101022"/>
-            <a:ext cx="1772318" cy="791175"/>
-          </a:xfrm>
-          <a:prstGeom prst="line">
-            <a:avLst/>
-          </a:prstGeom>
-          <a:ln>
-            <a:solidFill>
-              <a:schemeClr val="accent2"/>
-            </a:solidFill>
-          </a:ln>
-        </p:spPr>
-        <p:style>
-          <a:lnRef idx="1">
-            <a:schemeClr val="accent1"/>
-          </a:lnRef>
-          <a:fillRef idx="0">
-            <a:schemeClr val="accent1"/>
-          </a:fillRef>
-          <a:effectRef idx="0">
-            <a:schemeClr val="accent1"/>
-          </a:effectRef>
-          <a:fontRef idx="minor">
-            <a:schemeClr val="tx1"/>
-          </a:fontRef>
-        </p:style>
-      </p:cxnSp>
+              </a:endParaRPr>
+            </a:p>
+          </p:txBody>
+        </p:sp>
+      </p:grpSp>
     </p:spTree>
     <p:extLst>
       <p:ext uri="{BB962C8B-B14F-4D97-AF65-F5344CB8AC3E}">

</xml_diff>